<commit_message>
Mar 24 - Just a save
</commit_message>
<xml_diff>
--- a/Documentation/TeamScoreLayout.pptx
+++ b/Documentation/TeamScoreLayout.pptx
@@ -837,7 +837,7 @@
           <a:p>
             <a:fld id="{955A69D3-FF78-44E1-BB41-3D13FA416A59}" type="datetimeFigureOut">
               <a:rPr lang="en-US" smtClean="0"/>
-              <a:t>3/19/2024</a:t>
+              <a:t>Thursday,Mar/21/24</a:t>
             </a:fld>
             <a:endParaRPr lang="en-US"/>
           </a:p>
@@ -1035,7 +1035,7 @@
           <a:p>
             <a:fld id="{955A69D3-FF78-44E1-BB41-3D13FA416A59}" type="datetimeFigureOut">
               <a:rPr lang="en-US" smtClean="0"/>
-              <a:t>3/19/2024</a:t>
+              <a:t>Thursday,Mar/21/24</a:t>
             </a:fld>
             <a:endParaRPr lang="en-US"/>
           </a:p>
@@ -1243,7 +1243,7 @@
           <a:p>
             <a:fld id="{955A69D3-FF78-44E1-BB41-3D13FA416A59}" type="datetimeFigureOut">
               <a:rPr lang="en-US" smtClean="0"/>
-              <a:t>3/19/2024</a:t>
+              <a:t>Thursday,Mar/21/24</a:t>
             </a:fld>
             <a:endParaRPr lang="en-US"/>
           </a:p>
@@ -1441,7 +1441,7 @@
           <a:p>
             <a:fld id="{955A69D3-FF78-44E1-BB41-3D13FA416A59}" type="datetimeFigureOut">
               <a:rPr lang="en-US" smtClean="0"/>
-              <a:t>3/19/2024</a:t>
+              <a:t>Thursday,Mar/21/24</a:t>
             </a:fld>
             <a:endParaRPr lang="en-US"/>
           </a:p>
@@ -1716,7 +1716,7 @@
           <a:p>
             <a:fld id="{955A69D3-FF78-44E1-BB41-3D13FA416A59}" type="datetimeFigureOut">
               <a:rPr lang="en-US" smtClean="0"/>
-              <a:t>3/19/2024</a:t>
+              <a:t>Thursday,Mar/21/24</a:t>
             </a:fld>
             <a:endParaRPr lang="en-US"/>
           </a:p>
@@ -1981,7 +1981,7 @@
           <a:p>
             <a:fld id="{955A69D3-FF78-44E1-BB41-3D13FA416A59}" type="datetimeFigureOut">
               <a:rPr lang="en-US" smtClean="0"/>
-              <a:t>3/19/2024</a:t>
+              <a:t>Thursday,Mar/21/24</a:t>
             </a:fld>
             <a:endParaRPr lang="en-US"/>
           </a:p>
@@ -2393,7 +2393,7 @@
           <a:p>
             <a:fld id="{955A69D3-FF78-44E1-BB41-3D13FA416A59}" type="datetimeFigureOut">
               <a:rPr lang="en-US" smtClean="0"/>
-              <a:t>3/19/2024</a:t>
+              <a:t>Thursday,Mar/21/24</a:t>
             </a:fld>
             <a:endParaRPr lang="en-US"/>
           </a:p>
@@ -2534,7 +2534,7 @@
           <a:p>
             <a:fld id="{955A69D3-FF78-44E1-BB41-3D13FA416A59}" type="datetimeFigureOut">
               <a:rPr lang="en-US" smtClean="0"/>
-              <a:t>3/19/2024</a:t>
+              <a:t>Thursday,Mar/21/24</a:t>
             </a:fld>
             <a:endParaRPr lang="en-US"/>
           </a:p>
@@ -2647,7 +2647,7 @@
           <a:p>
             <a:fld id="{955A69D3-FF78-44E1-BB41-3D13FA416A59}" type="datetimeFigureOut">
               <a:rPr lang="en-US" smtClean="0"/>
-              <a:t>3/19/2024</a:t>
+              <a:t>Thursday,Mar/21/24</a:t>
             </a:fld>
             <a:endParaRPr lang="en-US"/>
           </a:p>
@@ -2958,7 +2958,7 @@
           <a:p>
             <a:fld id="{955A69D3-FF78-44E1-BB41-3D13FA416A59}" type="datetimeFigureOut">
               <a:rPr lang="en-US" smtClean="0"/>
-              <a:t>3/19/2024</a:t>
+              <a:t>Thursday,Mar/21/24</a:t>
             </a:fld>
             <a:endParaRPr lang="en-US"/>
           </a:p>
@@ -3246,7 +3246,7 @@
           <a:p>
             <a:fld id="{955A69D3-FF78-44E1-BB41-3D13FA416A59}" type="datetimeFigureOut">
               <a:rPr lang="en-US" smtClean="0"/>
-              <a:t>3/19/2024</a:t>
+              <a:t>Thursday,Mar/21/24</a:t>
             </a:fld>
             <a:endParaRPr lang="en-US"/>
           </a:p>
@@ -3487,7 +3487,7 @@
           <a:p>
             <a:fld id="{955A69D3-FF78-44E1-BB41-3D13FA416A59}" type="datetimeFigureOut">
               <a:rPr lang="en-US" smtClean="0"/>
-              <a:t>3/19/2024</a:t>
+              <a:t>Thursday,Mar/21/24</a:t>
             </a:fld>
             <a:endParaRPr lang="en-US"/>
           </a:p>
@@ -17336,7 +17336,7 @@
         </p:nvSpPr>
         <p:spPr>
           <a:xfrm>
-            <a:off x="745402" y="777089"/>
+            <a:off x="745402" y="399213"/>
             <a:ext cx="10701196" cy="5694630"/>
           </a:xfrm>
           <a:prstGeom prst="rect">
@@ -17362,7 +17362,7 @@
           <a:lstStyle/>
           <a:p>
             <a:pPr algn="ctr"/>
-            <a:endParaRPr lang="en-US"/>
+            <a:endParaRPr lang="en-US" dirty="0"/>
           </a:p>
         </p:txBody>
       </p:sp>
@@ -17380,7 +17380,7 @@
         </p:nvSpPr>
         <p:spPr>
           <a:xfrm>
-            <a:off x="1104522" y="995881"/>
+            <a:off x="1104522" y="630305"/>
             <a:ext cx="1430448" cy="280657"/>
           </a:xfrm>
           <a:prstGeom prst="rect">
@@ -17429,8 +17429,8 @@
         </p:nvSpPr>
         <p:spPr>
           <a:xfrm>
-            <a:off x="2777904" y="995880"/>
-            <a:ext cx="1430448" cy="280657"/>
+            <a:off x="2777903" y="630304"/>
+            <a:ext cx="1763633" cy="280657"/>
           </a:xfrm>
           <a:prstGeom prst="rect">
             <a:avLst/>
@@ -17459,7 +17459,7 @@
             <a:pPr algn="ctr"/>
             <a:r>
               <a:rPr lang="en-US" sz="1200" dirty="0"/>
-              <a:t>Score &lt;Type&gt;</a:t>
+              <a:t>Score &lt;Display Type&gt;</a:t>
             </a:r>
           </a:p>
         </p:txBody>
@@ -17478,7 +17478,7 @@
         </p:nvSpPr>
         <p:spPr>
           <a:xfrm>
-            <a:off x="1077738" y="1497872"/>
+            <a:off x="1077738" y="1132296"/>
             <a:ext cx="9777743" cy="3829015"/>
           </a:xfrm>
           <a:prstGeom prst="rect">
@@ -17508,8 +17508,8 @@
           </a:p>
         </p:txBody>
       </p:sp>
-      <mc:AlternateContent xmlns:mc="http://schemas.openxmlformats.org/markup-compatibility/2006" xmlns:p14="http://schemas.microsoft.com/office/powerpoint/2010/main" xmlns:aink="http://schemas.microsoft.com/office/drawing/2016/ink">
-        <mc:Choice Requires="p14 aink">
+      <mc:AlternateContent xmlns:mc="http://schemas.openxmlformats.org/markup-compatibility/2006">
+        <mc:Choice xmlns:p14="http://schemas.microsoft.com/office/powerpoint/2010/main" xmlns:aink="http://schemas.microsoft.com/office/drawing/2016/ink" Requires="p14 aink">
           <p:contentPart p14:bwMode="auto" r:id="rId2">
             <p14:nvContentPartPr>
               <p14:cNvPr id="6" name="Ink 5">
@@ -17523,12 +17523,12 @@
               <p14:nvPr/>
             </p14:nvContentPartPr>
             <p14:xfrm>
-              <a:off x="1113263" y="1801558"/>
+              <a:off x="1113263" y="1435982"/>
               <a:ext cx="360" cy="360"/>
             </p14:xfrm>
           </p:contentPart>
         </mc:Choice>
-        <mc:Fallback xmlns="">
+        <mc:Fallback>
           <p:pic>
             <p:nvPicPr>
               <p:cNvPr id="6" name="Ink 5">
@@ -17549,7 +17549,7 @@
             </p:blipFill>
             <p:spPr>
               <a:xfrm>
-                <a:off x="1095623" y="1693558"/>
+                <a:off x="1095263" y="1327982"/>
                 <a:ext cx="36000" cy="216000"/>
               </a:xfrm>
               <a:prstGeom prst="rect">
@@ -17559,8 +17559,8 @@
           </p:pic>
         </mc:Fallback>
       </mc:AlternateContent>
-      <mc:AlternateContent xmlns:mc="http://schemas.openxmlformats.org/markup-compatibility/2006" xmlns:p14="http://schemas.microsoft.com/office/powerpoint/2010/main">
-        <mc:Choice Requires="p14">
+      <mc:AlternateContent xmlns:mc="http://schemas.openxmlformats.org/markup-compatibility/2006">
+        <mc:Choice xmlns:p14="http://schemas.microsoft.com/office/powerpoint/2010/main" Requires="p14">
           <p:contentPart p14:bwMode="auto" r:id="rId4">
             <p14:nvContentPartPr>
               <p14:cNvPr id="9" name="Ink 8">
@@ -17574,12 +17574,12 @@
               <p14:nvPr/>
             </p14:nvContentPartPr>
             <p14:xfrm>
-              <a:off x="1122263" y="2077678"/>
+              <a:off x="1122263" y="1712102"/>
               <a:ext cx="360" cy="360"/>
             </p14:xfrm>
           </p:contentPart>
         </mc:Choice>
-        <mc:Fallback xmlns="">
+        <mc:Fallback>
           <p:pic>
             <p:nvPicPr>
               <p:cNvPr id="9" name="Ink 8">
@@ -17600,7 +17600,7 @@
             </p:blipFill>
             <p:spPr>
               <a:xfrm>
-                <a:off x="1113263" y="2068678"/>
+                <a:off x="1113263" y="1703102"/>
                 <a:ext cx="18000" cy="18000"/>
               </a:xfrm>
               <a:prstGeom prst="rect">
@@ -17610,8 +17610,8 @@
           </p:pic>
         </mc:Fallback>
       </mc:AlternateContent>
-      <mc:AlternateContent xmlns:mc="http://schemas.openxmlformats.org/markup-compatibility/2006" xmlns:p14="http://schemas.microsoft.com/office/powerpoint/2010/main">
-        <mc:Choice Requires="p14">
+      <mc:AlternateContent xmlns:mc="http://schemas.openxmlformats.org/markup-compatibility/2006">
+        <mc:Choice xmlns:p14="http://schemas.microsoft.com/office/powerpoint/2010/main" Requires="p14">
           <p:contentPart p14:bwMode="auto" r:id="rId6">
             <p14:nvContentPartPr>
               <p14:cNvPr id="10" name="Ink 9">
@@ -17625,12 +17625,12 @@
               <p14:nvPr/>
             </p14:nvContentPartPr>
             <p14:xfrm>
-              <a:off x="1104521" y="1921615"/>
+              <a:off x="1104521" y="1556039"/>
               <a:ext cx="9750960" cy="360"/>
             </p14:xfrm>
           </p:contentPart>
         </mc:Choice>
-        <mc:Fallback xmlns="">
+        <mc:Fallback>
           <p:pic>
             <p:nvPicPr>
               <p:cNvPr id="10" name="Ink 9">
@@ -17651,7 +17651,7 @@
             </p:blipFill>
             <p:spPr>
               <a:xfrm>
-                <a:off x="1095521" y="1912615"/>
+                <a:off x="1095521" y="1547039"/>
                 <a:ext cx="9768600" cy="18000"/>
               </a:xfrm>
               <a:prstGeom prst="rect">
@@ -17661,8 +17661,8 @@
           </p:pic>
         </mc:Fallback>
       </mc:AlternateContent>
-      <mc:AlternateContent xmlns:mc="http://schemas.openxmlformats.org/markup-compatibility/2006" xmlns:p14="http://schemas.microsoft.com/office/powerpoint/2010/main">
-        <mc:Choice Requires="p14">
+      <mc:AlternateContent xmlns:mc="http://schemas.openxmlformats.org/markup-compatibility/2006">
+        <mc:Choice xmlns:p14="http://schemas.microsoft.com/office/powerpoint/2010/main" Requires="p14">
           <p:contentPart p14:bwMode="auto" r:id="rId8">
             <p14:nvContentPartPr>
               <p14:cNvPr id="11" name="Ink 10">
@@ -17676,12 +17676,12 @@
               <p14:nvPr/>
             </p14:nvContentPartPr>
             <p14:xfrm>
-              <a:off x="1104521" y="2328633"/>
+              <a:off x="1104521" y="1963057"/>
               <a:ext cx="9750960" cy="360"/>
             </p14:xfrm>
           </p:contentPart>
         </mc:Choice>
-        <mc:Fallback xmlns="">
+        <mc:Fallback>
           <p:pic>
             <p:nvPicPr>
               <p:cNvPr id="11" name="Ink 10">
@@ -17702,7 +17702,7 @@
             </p:blipFill>
             <p:spPr>
               <a:xfrm>
-                <a:off x="1095521" y="2319633"/>
+                <a:off x="1095521" y="1954057"/>
                 <a:ext cx="9768600" cy="18000"/>
               </a:xfrm>
               <a:prstGeom prst="rect">
@@ -17712,8 +17712,8 @@
           </p:pic>
         </mc:Fallback>
       </mc:AlternateContent>
-      <mc:AlternateContent xmlns:mc="http://schemas.openxmlformats.org/markup-compatibility/2006" xmlns:p14="http://schemas.microsoft.com/office/powerpoint/2010/main">
-        <mc:Choice Requires="p14">
+      <mc:AlternateContent xmlns:mc="http://schemas.openxmlformats.org/markup-compatibility/2006">
+        <mc:Choice xmlns:p14="http://schemas.microsoft.com/office/powerpoint/2010/main" Requires="p14">
           <p:contentPart p14:bwMode="auto" r:id="rId9">
             <p14:nvContentPartPr>
               <p14:cNvPr id="12" name="Ink 11">
@@ -17727,12 +17727,12 @@
               <p14:nvPr/>
             </p14:nvContentPartPr>
             <p14:xfrm>
-              <a:off x="1104521" y="2735651"/>
+              <a:off x="1104521" y="2370075"/>
               <a:ext cx="9750960" cy="360"/>
             </p14:xfrm>
           </p:contentPart>
         </mc:Choice>
-        <mc:Fallback xmlns="">
+        <mc:Fallback>
           <p:pic>
             <p:nvPicPr>
               <p:cNvPr id="12" name="Ink 11">
@@ -17753,7 +17753,7 @@
             </p:blipFill>
             <p:spPr>
               <a:xfrm>
-                <a:off x="1095521" y="2726651"/>
+                <a:off x="1095521" y="2361075"/>
                 <a:ext cx="9768600" cy="18000"/>
               </a:xfrm>
               <a:prstGeom prst="rect">
@@ -17763,8 +17763,8 @@
           </p:pic>
         </mc:Fallback>
       </mc:AlternateContent>
-      <mc:AlternateContent xmlns:mc="http://schemas.openxmlformats.org/markup-compatibility/2006" xmlns:p14="http://schemas.microsoft.com/office/powerpoint/2010/main">
-        <mc:Choice Requires="p14">
+      <mc:AlternateContent xmlns:mc="http://schemas.openxmlformats.org/markup-compatibility/2006">
+        <mc:Choice xmlns:p14="http://schemas.microsoft.com/office/powerpoint/2010/main" Requires="p14">
           <p:contentPart p14:bwMode="auto" r:id="rId10">
             <p14:nvContentPartPr>
               <p14:cNvPr id="13" name="Ink 12">
@@ -17778,12 +17778,12 @@
               <p14:nvPr/>
             </p14:nvContentPartPr>
             <p14:xfrm>
-              <a:off x="1104521" y="3142669"/>
+              <a:off x="1104521" y="2777093"/>
               <a:ext cx="9750960" cy="360"/>
             </p14:xfrm>
           </p:contentPart>
         </mc:Choice>
-        <mc:Fallback xmlns="">
+        <mc:Fallback>
           <p:pic>
             <p:nvPicPr>
               <p:cNvPr id="13" name="Ink 12">
@@ -17804,7 +17804,7 @@
             </p:blipFill>
             <p:spPr>
               <a:xfrm>
-                <a:off x="1095521" y="3133669"/>
+                <a:off x="1095521" y="2768093"/>
                 <a:ext cx="9768600" cy="18000"/>
               </a:xfrm>
               <a:prstGeom prst="rect">
@@ -17814,8 +17814,8 @@
           </p:pic>
         </mc:Fallback>
       </mc:AlternateContent>
-      <mc:AlternateContent xmlns:mc="http://schemas.openxmlformats.org/markup-compatibility/2006" xmlns:p14="http://schemas.microsoft.com/office/powerpoint/2010/main">
-        <mc:Choice Requires="p14">
+      <mc:AlternateContent xmlns:mc="http://schemas.openxmlformats.org/markup-compatibility/2006">
+        <mc:Choice xmlns:p14="http://schemas.microsoft.com/office/powerpoint/2010/main" Requires="p14">
           <p:contentPart p14:bwMode="auto" r:id="rId11">
             <p14:nvContentPartPr>
               <p14:cNvPr id="14" name="Ink 13">
@@ -17829,12 +17829,12 @@
               <p14:nvPr/>
             </p14:nvContentPartPr>
             <p14:xfrm>
-              <a:off x="1104521" y="3549687"/>
+              <a:off x="1104521" y="3184111"/>
               <a:ext cx="9750960" cy="360"/>
             </p14:xfrm>
           </p:contentPart>
         </mc:Choice>
-        <mc:Fallback xmlns="">
+        <mc:Fallback>
           <p:pic>
             <p:nvPicPr>
               <p:cNvPr id="14" name="Ink 13">
@@ -17855,7 +17855,7 @@
             </p:blipFill>
             <p:spPr>
               <a:xfrm>
-                <a:off x="1095521" y="3540687"/>
+                <a:off x="1095521" y="3175111"/>
                 <a:ext cx="9768600" cy="18000"/>
               </a:xfrm>
               <a:prstGeom prst="rect">
@@ -17865,8 +17865,8 @@
           </p:pic>
         </mc:Fallback>
       </mc:AlternateContent>
-      <mc:AlternateContent xmlns:mc="http://schemas.openxmlformats.org/markup-compatibility/2006" xmlns:p14="http://schemas.microsoft.com/office/powerpoint/2010/main">
-        <mc:Choice Requires="p14">
+      <mc:AlternateContent xmlns:mc="http://schemas.openxmlformats.org/markup-compatibility/2006">
+        <mc:Choice xmlns:p14="http://schemas.microsoft.com/office/powerpoint/2010/main" Requires="p14">
           <p:contentPart p14:bwMode="auto" r:id="rId12">
             <p14:nvContentPartPr>
               <p14:cNvPr id="15" name="Ink 14">
@@ -17880,12 +17880,12 @@
               <p14:nvPr/>
             </p14:nvContentPartPr>
             <p14:xfrm>
-              <a:off x="1104521" y="3956705"/>
+              <a:off x="1104521" y="3591129"/>
               <a:ext cx="9750960" cy="360"/>
             </p14:xfrm>
           </p:contentPart>
         </mc:Choice>
-        <mc:Fallback xmlns="">
+        <mc:Fallback>
           <p:pic>
             <p:nvPicPr>
               <p:cNvPr id="15" name="Ink 14">
@@ -17906,7 +17906,7 @@
             </p:blipFill>
             <p:spPr>
               <a:xfrm>
-                <a:off x="1095521" y="3947705"/>
+                <a:off x="1095521" y="3582129"/>
                 <a:ext cx="9768600" cy="18000"/>
               </a:xfrm>
               <a:prstGeom prst="rect">
@@ -17916,8 +17916,8 @@
           </p:pic>
         </mc:Fallback>
       </mc:AlternateContent>
-      <mc:AlternateContent xmlns:mc="http://schemas.openxmlformats.org/markup-compatibility/2006" xmlns:p14="http://schemas.microsoft.com/office/powerpoint/2010/main">
-        <mc:Choice Requires="p14">
+      <mc:AlternateContent xmlns:mc="http://schemas.openxmlformats.org/markup-compatibility/2006">
+        <mc:Choice xmlns:p14="http://schemas.microsoft.com/office/powerpoint/2010/main" Requires="p14">
           <p:contentPart p14:bwMode="auto" r:id="rId13">
             <p14:nvContentPartPr>
               <p14:cNvPr id="16" name="Ink 15">
@@ -17931,12 +17931,12 @@
               <p14:nvPr/>
             </p14:nvContentPartPr>
             <p14:xfrm>
-              <a:off x="1113263" y="4363723"/>
+              <a:off x="1113263" y="3998147"/>
               <a:ext cx="9750960" cy="360"/>
             </p14:xfrm>
           </p:contentPart>
         </mc:Choice>
-        <mc:Fallback xmlns="">
+        <mc:Fallback>
           <p:pic>
             <p:nvPicPr>
               <p:cNvPr id="16" name="Ink 15">
@@ -17957,7 +17957,7 @@
             </p:blipFill>
             <p:spPr>
               <a:xfrm>
-                <a:off x="1104263" y="4354723"/>
+                <a:off x="1104263" y="3989147"/>
                 <a:ext cx="9768600" cy="18000"/>
               </a:xfrm>
               <a:prstGeom prst="rect">
@@ -17967,8 +17967,8 @@
           </p:pic>
         </mc:Fallback>
       </mc:AlternateContent>
-      <mc:AlternateContent xmlns:mc="http://schemas.openxmlformats.org/markup-compatibility/2006" xmlns:p14="http://schemas.microsoft.com/office/powerpoint/2010/main">
-        <mc:Choice Requires="p14">
+      <mc:AlternateContent xmlns:mc="http://schemas.openxmlformats.org/markup-compatibility/2006">
+        <mc:Choice xmlns:p14="http://schemas.microsoft.com/office/powerpoint/2010/main" Requires="p14">
           <p:contentPart p14:bwMode="auto" r:id="rId14">
             <p14:nvContentPartPr>
               <p14:cNvPr id="17" name="Ink 16">
@@ -17982,12 +17982,12 @@
               <p14:nvPr/>
             </p14:nvContentPartPr>
             <p14:xfrm>
-              <a:off x="3315942" y="1530033"/>
+              <a:off x="3315942" y="1164457"/>
               <a:ext cx="360" cy="3796854"/>
             </p14:xfrm>
           </p:contentPart>
         </mc:Choice>
-        <mc:Fallback xmlns="">
+        <mc:Fallback>
           <p:pic>
             <p:nvPicPr>
               <p:cNvPr id="17" name="Ink 16">
@@ -18008,7 +18008,7 @@
             </p:blipFill>
             <p:spPr>
               <a:xfrm>
-                <a:off x="3306942" y="1521033"/>
+                <a:off x="3306942" y="1155457"/>
                 <a:ext cx="18000" cy="3814494"/>
               </a:xfrm>
               <a:prstGeom prst="rect">
@@ -18018,8 +18018,8 @@
           </p:pic>
         </mc:Fallback>
       </mc:AlternateContent>
-      <mc:AlternateContent xmlns:mc="http://schemas.openxmlformats.org/markup-compatibility/2006" xmlns:p14="http://schemas.microsoft.com/office/powerpoint/2010/main">
-        <mc:Choice Requires="p14">
+      <mc:AlternateContent xmlns:mc="http://schemas.openxmlformats.org/markup-compatibility/2006">
+        <mc:Choice xmlns:p14="http://schemas.microsoft.com/office/powerpoint/2010/main" Requires="p14">
           <p:contentPart p14:bwMode="auto" r:id="rId16">
             <p14:nvContentPartPr>
               <p14:cNvPr id="18" name="Ink 17">
@@ -18033,12 +18033,12 @@
               <p14:nvPr/>
             </p14:nvContentPartPr>
             <p14:xfrm>
-              <a:off x="3946823" y="1623358"/>
+              <a:off x="3946823" y="1257782"/>
               <a:ext cx="360" cy="360"/>
             </p14:xfrm>
           </p:contentPart>
         </mc:Choice>
-        <mc:Fallback xmlns="">
+        <mc:Fallback>
           <p:pic>
             <p:nvPicPr>
               <p:cNvPr id="18" name="Ink 17">
@@ -18059,7 +18059,7 @@
             </p:blipFill>
             <p:spPr>
               <a:xfrm>
-                <a:off x="3938183" y="1614358"/>
+                <a:off x="3937823" y="1248782"/>
                 <a:ext cx="18000" cy="18000"/>
               </a:xfrm>
               <a:prstGeom prst="rect">
@@ -18069,8 +18069,8 @@
           </p:pic>
         </mc:Fallback>
       </mc:AlternateContent>
-      <mc:AlternateContent xmlns:mc="http://schemas.openxmlformats.org/markup-compatibility/2006" xmlns:p14="http://schemas.microsoft.com/office/powerpoint/2010/main">
-        <mc:Choice Requires="p14">
+      <mc:AlternateContent xmlns:mc="http://schemas.openxmlformats.org/markup-compatibility/2006">
+        <mc:Choice xmlns:p14="http://schemas.microsoft.com/office/powerpoint/2010/main" Requires="p14">
           <p:contentPart p14:bwMode="auto" r:id="rId17">
             <p14:nvContentPartPr>
               <p14:cNvPr id="20" name="Ink 19">
@@ -18084,12 +18084,12 @@
               <p14:nvPr/>
             </p14:nvContentPartPr>
             <p14:xfrm>
-              <a:off x="4036136" y="1276537"/>
+              <a:off x="4036136" y="910961"/>
               <a:ext cx="360" cy="3997100"/>
             </p14:xfrm>
           </p:contentPart>
         </mc:Choice>
-        <mc:Fallback xmlns="">
+        <mc:Fallback>
           <p:pic>
             <p:nvPicPr>
               <p:cNvPr id="20" name="Ink 19">
@@ -18110,7 +18110,7 @@
             </p:blipFill>
             <p:spPr>
               <a:xfrm>
-                <a:off x="4027136" y="1267537"/>
+                <a:off x="4027136" y="901961"/>
                 <a:ext cx="18000" cy="4014740"/>
               </a:xfrm>
               <a:prstGeom prst="rect">
@@ -18120,8 +18120,8 @@
           </p:pic>
         </mc:Fallback>
       </mc:AlternateContent>
-      <mc:AlternateContent xmlns:mc="http://schemas.openxmlformats.org/markup-compatibility/2006" xmlns:p14="http://schemas.microsoft.com/office/powerpoint/2010/main">
-        <mc:Choice Requires="p14">
+      <mc:AlternateContent xmlns:mc="http://schemas.openxmlformats.org/markup-compatibility/2006">
+        <mc:Choice xmlns:p14="http://schemas.microsoft.com/office/powerpoint/2010/main" Requires="p14">
           <p:contentPart p14:bwMode="auto" r:id="rId19">
             <p14:nvContentPartPr>
               <p14:cNvPr id="21" name="Ink 20">
@@ -18135,12 +18135,12 @@
               <p14:nvPr/>
             </p14:nvContentPartPr>
             <p14:xfrm>
-              <a:off x="4767512" y="1530033"/>
+              <a:off x="4767512" y="1164457"/>
               <a:ext cx="360" cy="3740567"/>
             </p14:xfrm>
           </p:contentPart>
         </mc:Choice>
-        <mc:Fallback xmlns="">
+        <mc:Fallback>
           <p:pic>
             <p:nvPicPr>
               <p:cNvPr id="21" name="Ink 20">
@@ -18161,7 +18161,7 @@
             </p:blipFill>
             <p:spPr>
               <a:xfrm>
-                <a:off x="4758512" y="1521033"/>
+                <a:off x="4758512" y="1155457"/>
                 <a:ext cx="18000" cy="3758208"/>
               </a:xfrm>
               <a:prstGeom prst="rect">
@@ -18171,8 +18171,8 @@
           </p:pic>
         </mc:Fallback>
       </mc:AlternateContent>
-      <mc:AlternateContent xmlns:mc="http://schemas.openxmlformats.org/markup-compatibility/2006" xmlns:p14="http://schemas.microsoft.com/office/powerpoint/2010/main">
-        <mc:Choice Requires="p14">
+      <mc:AlternateContent xmlns:mc="http://schemas.openxmlformats.org/markup-compatibility/2006">
+        <mc:Choice xmlns:p14="http://schemas.microsoft.com/office/powerpoint/2010/main" Requires="p14">
           <p:contentPart p14:bwMode="auto" r:id="rId21">
             <p14:nvContentPartPr>
               <p14:cNvPr id="22" name="Ink 21">
@@ -18186,12 +18186,12 @@
               <p14:nvPr/>
             </p14:nvContentPartPr>
             <p14:xfrm>
-              <a:off x="5493297" y="1530033"/>
+              <a:off x="5493297" y="1164457"/>
               <a:ext cx="360" cy="3796854"/>
             </p14:xfrm>
           </p:contentPart>
         </mc:Choice>
-        <mc:Fallback xmlns="">
+        <mc:Fallback>
           <p:pic>
             <p:nvPicPr>
               <p:cNvPr id="22" name="Ink 21">
@@ -18212,7 +18212,7 @@
             </p:blipFill>
             <p:spPr>
               <a:xfrm>
-                <a:off x="5484297" y="1521033"/>
+                <a:off x="5484297" y="1155457"/>
                 <a:ext cx="18000" cy="3814494"/>
               </a:xfrm>
               <a:prstGeom prst="rect">
@@ -18222,8 +18222,8 @@
           </p:pic>
         </mc:Fallback>
       </mc:AlternateContent>
-      <mc:AlternateContent xmlns:mc="http://schemas.openxmlformats.org/markup-compatibility/2006" xmlns:p14="http://schemas.microsoft.com/office/powerpoint/2010/main">
-        <mc:Choice Requires="p14">
+      <mc:AlternateContent xmlns:mc="http://schemas.openxmlformats.org/markup-compatibility/2006">
+        <mc:Choice xmlns:p14="http://schemas.microsoft.com/office/powerpoint/2010/main" Requires="p14">
           <p:contentPart p14:bwMode="auto" r:id="rId22">
             <p14:nvContentPartPr>
               <p14:cNvPr id="23" name="Ink 22">
@@ -18237,12 +18237,12 @@
               <p14:nvPr/>
             </p14:nvContentPartPr>
             <p14:xfrm>
-              <a:off x="6219082" y="1530033"/>
+              <a:off x="6219082" y="1164457"/>
               <a:ext cx="360" cy="3740567"/>
             </p14:xfrm>
           </p:contentPart>
         </mc:Choice>
-        <mc:Fallback xmlns="">
+        <mc:Fallback>
           <p:pic>
             <p:nvPicPr>
               <p:cNvPr id="23" name="Ink 22">
@@ -18263,7 +18263,7 @@
             </p:blipFill>
             <p:spPr>
               <a:xfrm>
-                <a:off x="6210082" y="1521033"/>
+                <a:off x="6210082" y="1155457"/>
                 <a:ext cx="18000" cy="3758208"/>
               </a:xfrm>
               <a:prstGeom prst="rect">
@@ -18273,8 +18273,8 @@
           </p:pic>
         </mc:Fallback>
       </mc:AlternateContent>
-      <mc:AlternateContent xmlns:mc="http://schemas.openxmlformats.org/markup-compatibility/2006" xmlns:p14="http://schemas.microsoft.com/office/powerpoint/2010/main">
-        <mc:Choice Requires="p14">
+      <mc:AlternateContent xmlns:mc="http://schemas.openxmlformats.org/markup-compatibility/2006">
+        <mc:Choice xmlns:p14="http://schemas.microsoft.com/office/powerpoint/2010/main" Requires="p14">
           <p:contentPart p14:bwMode="auto" r:id="rId23">
             <p14:nvContentPartPr>
               <p14:cNvPr id="24" name="Ink 23">
@@ -18288,12 +18288,12 @@
               <p14:nvPr/>
             </p14:nvContentPartPr>
             <p14:xfrm>
-              <a:off x="6944867" y="1530033"/>
+              <a:off x="6944867" y="1164457"/>
               <a:ext cx="360" cy="3740567"/>
             </p14:xfrm>
           </p:contentPart>
         </mc:Choice>
-        <mc:Fallback xmlns="">
+        <mc:Fallback>
           <p:pic>
             <p:nvPicPr>
               <p:cNvPr id="24" name="Ink 23">
@@ -18314,7 +18314,7 @@
             </p:blipFill>
             <p:spPr>
               <a:xfrm>
-                <a:off x="6935867" y="1521033"/>
+                <a:off x="6935867" y="1155457"/>
                 <a:ext cx="18000" cy="3758208"/>
               </a:xfrm>
               <a:prstGeom prst="rect">
@@ -18324,8 +18324,8 @@
           </p:pic>
         </mc:Fallback>
       </mc:AlternateContent>
-      <mc:AlternateContent xmlns:mc="http://schemas.openxmlformats.org/markup-compatibility/2006" xmlns:p14="http://schemas.microsoft.com/office/powerpoint/2010/main">
-        <mc:Choice Requires="p14">
+      <mc:AlternateContent xmlns:mc="http://schemas.openxmlformats.org/markup-compatibility/2006">
+        <mc:Choice xmlns:p14="http://schemas.microsoft.com/office/powerpoint/2010/main" Requires="p14">
           <p:contentPart p14:bwMode="auto" r:id="rId24">
             <p14:nvContentPartPr>
               <p14:cNvPr id="25" name="Ink 24">
@@ -18339,12 +18339,12 @@
               <p14:nvPr/>
             </p14:nvContentPartPr>
             <p14:xfrm>
-              <a:off x="7670652" y="1530033"/>
+              <a:off x="7670652" y="1164457"/>
               <a:ext cx="360" cy="3740567"/>
             </p14:xfrm>
           </p:contentPart>
         </mc:Choice>
-        <mc:Fallback xmlns="">
+        <mc:Fallback>
           <p:pic>
             <p:nvPicPr>
               <p:cNvPr id="25" name="Ink 24">
@@ -18365,7 +18365,7 @@
             </p:blipFill>
             <p:spPr>
               <a:xfrm>
-                <a:off x="7661652" y="1521033"/>
+                <a:off x="7661652" y="1155457"/>
                 <a:ext cx="18000" cy="3758208"/>
               </a:xfrm>
               <a:prstGeom prst="rect">
@@ -18375,8 +18375,8 @@
           </p:pic>
         </mc:Fallback>
       </mc:AlternateContent>
-      <mc:AlternateContent xmlns:mc="http://schemas.openxmlformats.org/markup-compatibility/2006" xmlns:p14="http://schemas.microsoft.com/office/powerpoint/2010/main">
-        <mc:Choice Requires="p14">
+      <mc:AlternateContent xmlns:mc="http://schemas.openxmlformats.org/markup-compatibility/2006">
+        <mc:Choice xmlns:p14="http://schemas.microsoft.com/office/powerpoint/2010/main" Requires="p14">
           <p:contentPart p14:bwMode="auto" r:id="rId25">
             <p14:nvContentPartPr>
               <p14:cNvPr id="26" name="Ink 25">
@@ -18390,12 +18390,12 @@
               <p14:nvPr/>
             </p14:nvContentPartPr>
             <p14:xfrm>
-              <a:off x="8396437" y="1530033"/>
+              <a:off x="8396437" y="1164457"/>
               <a:ext cx="360" cy="3796854"/>
             </p14:xfrm>
           </p:contentPart>
         </mc:Choice>
-        <mc:Fallback xmlns="">
+        <mc:Fallback>
           <p:pic>
             <p:nvPicPr>
               <p:cNvPr id="26" name="Ink 25">
@@ -18416,7 +18416,7 @@
             </p:blipFill>
             <p:spPr>
               <a:xfrm>
-                <a:off x="8387437" y="1521033"/>
+                <a:off x="8387437" y="1155457"/>
                 <a:ext cx="18000" cy="3814494"/>
               </a:xfrm>
               <a:prstGeom prst="rect">
@@ -18426,8 +18426,8 @@
           </p:pic>
         </mc:Fallback>
       </mc:AlternateContent>
-      <mc:AlternateContent xmlns:mc="http://schemas.openxmlformats.org/markup-compatibility/2006" xmlns:p14="http://schemas.microsoft.com/office/powerpoint/2010/main">
-        <mc:Choice Requires="p14">
+      <mc:AlternateContent xmlns:mc="http://schemas.openxmlformats.org/markup-compatibility/2006">
+        <mc:Choice xmlns:p14="http://schemas.microsoft.com/office/powerpoint/2010/main" Requires="p14">
           <p:contentPart p14:bwMode="auto" r:id="rId26">
             <p14:nvContentPartPr>
               <p14:cNvPr id="28" name="Ink 27">
@@ -18441,12 +18441,12 @@
               <p14:nvPr/>
             </p14:nvContentPartPr>
             <p14:xfrm>
-              <a:off x="9122222" y="1530033"/>
+              <a:off x="9122222" y="1164457"/>
               <a:ext cx="360" cy="3796854"/>
             </p14:xfrm>
           </p:contentPart>
         </mc:Choice>
-        <mc:Fallback xmlns="">
+        <mc:Fallback>
           <p:pic>
             <p:nvPicPr>
               <p:cNvPr id="28" name="Ink 27">
@@ -18467,7 +18467,7 @@
             </p:blipFill>
             <p:spPr>
               <a:xfrm>
-                <a:off x="9113222" y="1521033"/>
+                <a:off x="9113222" y="1155457"/>
                 <a:ext cx="18000" cy="3814494"/>
               </a:xfrm>
               <a:prstGeom prst="rect">
@@ -18477,8 +18477,8 @@
           </p:pic>
         </mc:Fallback>
       </mc:AlternateContent>
-      <mc:AlternateContent xmlns:mc="http://schemas.openxmlformats.org/markup-compatibility/2006" xmlns:p14="http://schemas.microsoft.com/office/powerpoint/2010/main">
-        <mc:Choice Requires="p14">
+      <mc:AlternateContent xmlns:mc="http://schemas.openxmlformats.org/markup-compatibility/2006">
+        <mc:Choice xmlns:p14="http://schemas.microsoft.com/office/powerpoint/2010/main" Requires="p14">
           <p:contentPart p14:bwMode="auto" r:id="rId27">
             <p14:nvContentPartPr>
               <p14:cNvPr id="30" name="Ink 29">
@@ -18492,12 +18492,12 @@
               <p14:nvPr/>
             </p14:nvContentPartPr>
             <p14:xfrm>
-              <a:off x="9848007" y="1921615"/>
+              <a:off x="9848007" y="1556039"/>
               <a:ext cx="360" cy="3405272"/>
             </p14:xfrm>
           </p:contentPart>
         </mc:Choice>
-        <mc:Fallback xmlns="">
+        <mc:Fallback>
           <p:pic>
             <p:nvPicPr>
               <p:cNvPr id="30" name="Ink 29">
@@ -18518,7 +18518,7 @@
             </p:blipFill>
             <p:spPr>
               <a:xfrm>
-                <a:off x="9839007" y="1912615"/>
+                <a:off x="9839007" y="1547039"/>
                 <a:ext cx="18000" cy="3422912"/>
               </a:xfrm>
               <a:prstGeom prst="rect">
@@ -18542,7 +18542,7 @@
         </p:nvSpPr>
         <p:spPr>
           <a:xfrm>
-            <a:off x="1403646" y="5682891"/>
+            <a:off x="1403646" y="5317315"/>
             <a:ext cx="1374258" cy="327524"/>
           </a:xfrm>
           <a:prstGeom prst="rect">
@@ -18591,7 +18591,7 @@
         </p:nvSpPr>
         <p:spPr>
           <a:xfrm>
-            <a:off x="9973450" y="1552349"/>
+            <a:off x="9973450" y="1186773"/>
             <a:ext cx="638555" cy="327524"/>
           </a:xfrm>
           <a:prstGeom prst="rect">
@@ -18628,10 +18628,10 @@
       </p:sp>
       <p:sp>
         <p:nvSpPr>
-          <p:cNvPr id="19" name="Rectangle 18">
-            <a:extLst>
-              <a:ext uri="{FF2B5EF4-FFF2-40B4-BE49-F238E27FC236}">
-                <a16:creationId xmlns:a16="http://schemas.microsoft.com/office/drawing/2014/main" id="{A30B062E-9D7D-295C-C8DB-592D6E18D696}"/>
+          <p:cNvPr id="27" name="Rectangle 26">
+            <a:extLst>
+              <a:ext uri="{FF2B5EF4-FFF2-40B4-BE49-F238E27FC236}">
+                <a16:creationId xmlns:a16="http://schemas.microsoft.com/office/drawing/2014/main" id="{93913341-3787-0B27-BCA2-DCCA616D2987}"/>
               </a:ext>
             </a:extLst>
           </p:cNvPr>
@@ -18640,8 +18640,8 @@
         </p:nvSpPr>
         <p:spPr>
           <a:xfrm>
-            <a:off x="5865478" y="5692297"/>
-            <a:ext cx="5433063" cy="327524"/>
+            <a:off x="1148055" y="4577500"/>
+            <a:ext cx="2077345" cy="327524"/>
           </a:xfrm>
           <a:prstGeom prst="rect">
             <a:avLst/>
@@ -18667,44 +18667,20 @@
           <a:bodyPr rtlCol="0" anchor="ctr"/>
           <a:lstStyle/>
           <a:p>
-            <a:r>
-              <a:rPr lang="en-US" sz="1000" dirty="0"/>
-              <a:t>Display – Gross – GHIN – Net - </a:t>
-            </a:r>
-            <a:r>
-              <a:rPr lang="en-US" sz="1000" dirty="0">
-                <a:effectLst/>
-                <a:latin typeface="Times New Roman" panose="02020603050405020304" pitchFamily="18" charset="0"/>
-                <a:ea typeface="Calibri" panose="020F0502020204030204" pitchFamily="34" charset="0"/>
-              </a:rPr>
-              <a:t>Stableford</a:t>
-            </a:r>
-            <a:r>
-              <a:rPr lang="en-US" sz="1800" dirty="0">
-                <a:effectLst/>
-                <a:latin typeface="Times New Roman" panose="02020603050405020304" pitchFamily="18" charset="0"/>
-                <a:ea typeface="Calibri" panose="020F0502020204030204" pitchFamily="34" charset="0"/>
-              </a:rPr>
-              <a:t> </a:t>
-            </a:r>
-            <a:r>
-              <a:rPr lang="en-US" sz="1000" dirty="0">
-                <a:effectLst/>
-                <a:latin typeface="Times New Roman" panose="02020603050405020304" pitchFamily="18" charset="0"/>
-                <a:ea typeface="Calibri" panose="020F0502020204030204" pitchFamily="34" charset="0"/>
-              </a:rPr>
-              <a:t>– Quota – Team Match – Player Match – 9 Pts  </a:t>
-            </a:r>
-            <a:endParaRPr lang="en-US" sz="1000" dirty="0"/>
-          </a:p>
-        </p:txBody>
-      </p:sp>
-      <p:sp>
-        <p:nvSpPr>
-          <p:cNvPr id="27" name="Rectangle 26">
-            <a:extLst>
-              <a:ext uri="{FF2B5EF4-FFF2-40B4-BE49-F238E27FC236}">
-                <a16:creationId xmlns:a16="http://schemas.microsoft.com/office/drawing/2014/main" id="{93913341-3787-0B27-BCA2-DCCA616D2987}"/>
+            <a:pPr algn="ctr"/>
+            <a:r>
+              <a:rPr lang="en-US" sz="1200" dirty="0"/>
+              <a:t>Used</a:t>
+            </a:r>
+          </a:p>
+        </p:txBody>
+      </p:sp>
+      <p:sp>
+        <p:nvSpPr>
+          <p:cNvPr id="29" name="Rectangle 28">
+            <a:extLst>
+              <a:ext uri="{FF2B5EF4-FFF2-40B4-BE49-F238E27FC236}">
+                <a16:creationId xmlns:a16="http://schemas.microsoft.com/office/drawing/2014/main" id="{C80CE0BD-1111-62BD-81DC-D3EBCF95BFD1}"/>
               </a:ext>
             </a:extLst>
           </p:cNvPr>
@@ -18713,8 +18689,8 @@
         </p:nvSpPr>
         <p:spPr>
           <a:xfrm>
-            <a:off x="1148055" y="4943076"/>
-            <a:ext cx="2077345" cy="327524"/>
+            <a:off x="1122262" y="4091834"/>
+            <a:ext cx="2067852" cy="327524"/>
           </a:xfrm>
           <a:prstGeom prst="rect">
             <a:avLst/>
@@ -18743,17 +18719,17 @@
             <a:pPr algn="ctr"/>
             <a:r>
               <a:rPr lang="en-US" sz="1200" dirty="0"/>
-              <a:t>Used</a:t>
-            </a:r>
-          </a:p>
-        </p:txBody>
-      </p:sp>
-      <p:sp>
-        <p:nvSpPr>
-          <p:cNvPr id="29" name="Rectangle 28">
-            <a:extLst>
-              <a:ext uri="{FF2B5EF4-FFF2-40B4-BE49-F238E27FC236}">
-                <a16:creationId xmlns:a16="http://schemas.microsoft.com/office/drawing/2014/main" id="{C80CE0BD-1111-62BD-81DC-D3EBCF95BFD1}"/>
+              <a:t>Team</a:t>
+            </a:r>
+          </a:p>
+        </p:txBody>
+      </p:sp>
+      <p:sp>
+        <p:nvSpPr>
+          <p:cNvPr id="31" name="Rectangle 30">
+            <a:extLst>
+              <a:ext uri="{FF2B5EF4-FFF2-40B4-BE49-F238E27FC236}">
+                <a16:creationId xmlns:a16="http://schemas.microsoft.com/office/drawing/2014/main" id="{BB32B4CF-5C3F-C2A0-8EB4-A7A3BF724138}"/>
               </a:ext>
             </a:extLst>
           </p:cNvPr>
@@ -18762,8 +18738,8 @@
         </p:nvSpPr>
         <p:spPr>
           <a:xfrm>
-            <a:off x="1122262" y="4457410"/>
-            <a:ext cx="2067852" cy="327524"/>
+            <a:off x="1122262" y="2407589"/>
+            <a:ext cx="2107973" cy="327524"/>
           </a:xfrm>
           <a:prstGeom prst="rect">
             <a:avLst/>
@@ -18792,17 +18768,17 @@
             <a:pPr algn="ctr"/>
             <a:r>
               <a:rPr lang="en-US" sz="1200" dirty="0"/>
-              <a:t>Team</a:t>
-            </a:r>
-          </a:p>
-        </p:txBody>
-      </p:sp>
-      <p:sp>
-        <p:nvSpPr>
-          <p:cNvPr id="31" name="Rectangle 30">
-            <a:extLst>
-              <a:ext uri="{FF2B5EF4-FFF2-40B4-BE49-F238E27FC236}">
-                <a16:creationId xmlns:a16="http://schemas.microsoft.com/office/drawing/2014/main" id="{BB32B4CF-5C3F-C2A0-8EB4-A7A3BF724138}"/>
+              <a:t>Player 1</a:t>
+            </a:r>
+          </a:p>
+        </p:txBody>
+      </p:sp>
+      <p:sp>
+        <p:nvSpPr>
+          <p:cNvPr id="32" name="Rectangle 31">
+            <a:extLst>
+              <a:ext uri="{FF2B5EF4-FFF2-40B4-BE49-F238E27FC236}">
+                <a16:creationId xmlns:a16="http://schemas.microsoft.com/office/drawing/2014/main" id="{182C996E-F056-B42A-430C-E7F318D79B42}"/>
               </a:ext>
             </a:extLst>
           </p:cNvPr>
@@ -18811,8 +18787,8 @@
         </p:nvSpPr>
         <p:spPr>
           <a:xfrm>
-            <a:off x="1122262" y="2773165"/>
-            <a:ext cx="2107973" cy="327524"/>
+            <a:off x="1122262" y="2005397"/>
+            <a:ext cx="2126209" cy="327524"/>
           </a:xfrm>
           <a:prstGeom prst="rect">
             <a:avLst/>
@@ -18841,17 +18817,17 @@
             <a:pPr algn="ctr"/>
             <a:r>
               <a:rPr lang="en-US" sz="1200" dirty="0"/>
-              <a:t>Player 1</a:t>
-            </a:r>
-          </a:p>
-        </p:txBody>
-      </p:sp>
-      <p:sp>
-        <p:nvSpPr>
-          <p:cNvPr id="32" name="Rectangle 31">
-            <a:extLst>
-              <a:ext uri="{FF2B5EF4-FFF2-40B4-BE49-F238E27FC236}">
-                <a16:creationId xmlns:a16="http://schemas.microsoft.com/office/drawing/2014/main" id="{182C996E-F056-B42A-430C-E7F318D79B42}"/>
+              <a:t>Handicap</a:t>
+            </a:r>
+          </a:p>
+        </p:txBody>
+      </p:sp>
+      <p:sp>
+        <p:nvSpPr>
+          <p:cNvPr id="33" name="Rectangle 32">
+            <a:extLst>
+              <a:ext uri="{FF2B5EF4-FFF2-40B4-BE49-F238E27FC236}">
+                <a16:creationId xmlns:a16="http://schemas.microsoft.com/office/drawing/2014/main" id="{D55F8056-AF06-38C0-82CF-90047CFD8BC2}"/>
               </a:ext>
             </a:extLst>
           </p:cNvPr>
@@ -18860,8 +18836,8 @@
         </p:nvSpPr>
         <p:spPr>
           <a:xfrm>
-            <a:off x="1122262" y="2370973"/>
-            <a:ext cx="2126209" cy="327524"/>
+            <a:off x="1122262" y="1585545"/>
+            <a:ext cx="2142832" cy="327524"/>
           </a:xfrm>
           <a:prstGeom prst="rect">
             <a:avLst/>
@@ -18890,17 +18866,17 @@
             <a:pPr algn="ctr"/>
             <a:r>
               <a:rPr lang="en-US" sz="1200" dirty="0"/>
-              <a:t>Handicap</a:t>
-            </a:r>
-          </a:p>
-        </p:txBody>
-      </p:sp>
-      <p:sp>
-        <p:nvSpPr>
-          <p:cNvPr id="33" name="Rectangle 32">
-            <a:extLst>
-              <a:ext uri="{FF2B5EF4-FFF2-40B4-BE49-F238E27FC236}">
-                <a16:creationId xmlns:a16="http://schemas.microsoft.com/office/drawing/2014/main" id="{D55F8056-AF06-38C0-82CF-90047CFD8BC2}"/>
+              <a:t>Par</a:t>
+            </a:r>
+          </a:p>
+        </p:txBody>
+      </p:sp>
+      <p:sp>
+        <p:nvSpPr>
+          <p:cNvPr id="34" name="Rectangle 33">
+            <a:extLst>
+              <a:ext uri="{FF2B5EF4-FFF2-40B4-BE49-F238E27FC236}">
+                <a16:creationId xmlns:a16="http://schemas.microsoft.com/office/drawing/2014/main" id="{A9066AC1-496D-2EB7-FF88-17658E9D12F9}"/>
               </a:ext>
             </a:extLst>
           </p:cNvPr>
@@ -18909,8 +18885,8 @@
         </p:nvSpPr>
         <p:spPr>
           <a:xfrm>
-            <a:off x="1122262" y="1951121"/>
-            <a:ext cx="2142832" cy="327524"/>
+            <a:off x="1156945" y="1189120"/>
+            <a:ext cx="2106377" cy="327524"/>
           </a:xfrm>
           <a:prstGeom prst="rect">
             <a:avLst/>
@@ -18939,17 +18915,17 @@
             <a:pPr algn="ctr"/>
             <a:r>
               <a:rPr lang="en-US" sz="1200" dirty="0"/>
-              <a:t>Par</a:t>
-            </a:r>
-          </a:p>
-        </p:txBody>
-      </p:sp>
-      <p:sp>
-        <p:nvSpPr>
-          <p:cNvPr id="34" name="Rectangle 33">
-            <a:extLst>
-              <a:ext uri="{FF2B5EF4-FFF2-40B4-BE49-F238E27FC236}">
-                <a16:creationId xmlns:a16="http://schemas.microsoft.com/office/drawing/2014/main" id="{A9066AC1-496D-2EB7-FF88-17658E9D12F9}"/>
+              <a:t>Hole</a:t>
+            </a:r>
+          </a:p>
+        </p:txBody>
+      </p:sp>
+      <p:sp>
+        <p:nvSpPr>
+          <p:cNvPr id="35" name="Rectangle 34">
+            <a:extLst>
+              <a:ext uri="{FF2B5EF4-FFF2-40B4-BE49-F238E27FC236}">
+                <a16:creationId xmlns:a16="http://schemas.microsoft.com/office/drawing/2014/main" id="{C5DB1924-79E7-401A-0A38-8997E5AB9A1B}"/>
               </a:ext>
             </a:extLst>
           </p:cNvPr>
@@ -18958,12 +18934,15 @@
         </p:nvSpPr>
         <p:spPr>
           <a:xfrm>
-            <a:off x="1156945" y="1554696"/>
-            <a:ext cx="2106377" cy="327524"/>
+            <a:off x="3359736" y="1186773"/>
+            <a:ext cx="638555" cy="327524"/>
           </a:xfrm>
           <a:prstGeom prst="rect">
             <a:avLst/>
           </a:prstGeom>
+          <a:solidFill>
+            <a:srgbClr val="C00000"/>
+          </a:solidFill>
         </p:spPr>
         <p:style>
           <a:lnRef idx="2">
@@ -18988,17 +18967,17 @@
             <a:pPr algn="ctr"/>
             <a:r>
               <a:rPr lang="en-US" sz="1200" dirty="0"/>
-              <a:t>Hole</a:t>
-            </a:r>
-          </a:p>
-        </p:txBody>
-      </p:sp>
-      <p:sp>
-        <p:nvSpPr>
-          <p:cNvPr id="35" name="Rectangle 34">
-            <a:extLst>
-              <a:ext uri="{FF2B5EF4-FFF2-40B4-BE49-F238E27FC236}">
-                <a16:creationId xmlns:a16="http://schemas.microsoft.com/office/drawing/2014/main" id="{C5DB1924-79E7-401A-0A38-8997E5AB9A1B}"/>
+              <a:t>1</a:t>
+            </a:r>
+          </a:p>
+        </p:txBody>
+      </p:sp>
+      <p:sp>
+        <p:nvSpPr>
+          <p:cNvPr id="37" name="Rectangle 36">
+            <a:extLst>
+              <a:ext uri="{FF2B5EF4-FFF2-40B4-BE49-F238E27FC236}">
+                <a16:creationId xmlns:a16="http://schemas.microsoft.com/office/drawing/2014/main" id="{FE90EA08-FB02-7CB1-3CE5-FBF49069494C}"/>
               </a:ext>
             </a:extLst>
           </p:cNvPr>
@@ -19007,15 +18986,12 @@
         </p:nvSpPr>
         <p:spPr>
           <a:xfrm>
-            <a:off x="3359736" y="1552349"/>
+            <a:off x="6281058" y="1186773"/>
             <a:ext cx="638555" cy="327524"/>
           </a:xfrm>
           <a:prstGeom prst="rect">
             <a:avLst/>
           </a:prstGeom>
-          <a:solidFill>
-            <a:srgbClr val="C00000"/>
-          </a:solidFill>
         </p:spPr>
         <p:style>
           <a:lnRef idx="2">
@@ -19040,17 +19016,17 @@
             <a:pPr algn="ctr"/>
             <a:r>
               <a:rPr lang="en-US" sz="1200" dirty="0"/>
-              <a:t>1</a:t>
-            </a:r>
-          </a:p>
-        </p:txBody>
-      </p:sp>
-      <p:sp>
-        <p:nvSpPr>
-          <p:cNvPr id="37" name="Rectangle 36">
-            <a:extLst>
-              <a:ext uri="{FF2B5EF4-FFF2-40B4-BE49-F238E27FC236}">
-                <a16:creationId xmlns:a16="http://schemas.microsoft.com/office/drawing/2014/main" id="{FE90EA08-FB02-7CB1-3CE5-FBF49069494C}"/>
+              <a:t>5</a:t>
+            </a:r>
+          </a:p>
+        </p:txBody>
+      </p:sp>
+      <p:sp>
+        <p:nvSpPr>
+          <p:cNvPr id="38" name="Rectangle 37">
+            <a:extLst>
+              <a:ext uri="{FF2B5EF4-FFF2-40B4-BE49-F238E27FC236}">
+                <a16:creationId xmlns:a16="http://schemas.microsoft.com/office/drawing/2014/main" id="{02AC8C35-9CC9-EEAA-59CD-ED0271BD3D83}"/>
               </a:ext>
             </a:extLst>
           </p:cNvPr>
@@ -19059,7 +19035,7 @@
         </p:nvSpPr>
         <p:spPr>
           <a:xfrm>
-            <a:off x="6281058" y="1552349"/>
+            <a:off x="7006862" y="1186773"/>
             <a:ext cx="638555" cy="327524"/>
           </a:xfrm>
           <a:prstGeom prst="rect">
@@ -19089,17 +19065,17 @@
             <a:pPr algn="ctr"/>
             <a:r>
               <a:rPr lang="en-US" sz="1200" dirty="0"/>
-              <a:t>5</a:t>
-            </a:r>
-          </a:p>
-        </p:txBody>
-      </p:sp>
-      <p:sp>
-        <p:nvSpPr>
-          <p:cNvPr id="38" name="Rectangle 37">
-            <a:extLst>
-              <a:ext uri="{FF2B5EF4-FFF2-40B4-BE49-F238E27FC236}">
-                <a16:creationId xmlns:a16="http://schemas.microsoft.com/office/drawing/2014/main" id="{02AC8C35-9CC9-EEAA-59CD-ED0271BD3D83}"/>
+              <a:t>6</a:t>
+            </a:r>
+          </a:p>
+        </p:txBody>
+      </p:sp>
+      <p:sp>
+        <p:nvSpPr>
+          <p:cNvPr id="39" name="Rectangle 38">
+            <a:extLst>
+              <a:ext uri="{FF2B5EF4-FFF2-40B4-BE49-F238E27FC236}">
+                <a16:creationId xmlns:a16="http://schemas.microsoft.com/office/drawing/2014/main" id="{4333FBBE-F9F3-A60C-78F9-CCC031ACEFB2}"/>
               </a:ext>
             </a:extLst>
           </p:cNvPr>
@@ -19108,7 +19084,7 @@
         </p:nvSpPr>
         <p:spPr>
           <a:xfrm>
-            <a:off x="7006862" y="1552349"/>
+            <a:off x="7714560" y="1186773"/>
             <a:ext cx="638555" cy="327524"/>
           </a:xfrm>
           <a:prstGeom prst="rect">
@@ -19138,17 +19114,17 @@
             <a:pPr algn="ctr"/>
             <a:r>
               <a:rPr lang="en-US" sz="1200" dirty="0"/>
-              <a:t>6</a:t>
-            </a:r>
-          </a:p>
-        </p:txBody>
-      </p:sp>
-      <p:sp>
-        <p:nvSpPr>
-          <p:cNvPr id="39" name="Rectangle 38">
-            <a:extLst>
-              <a:ext uri="{FF2B5EF4-FFF2-40B4-BE49-F238E27FC236}">
-                <a16:creationId xmlns:a16="http://schemas.microsoft.com/office/drawing/2014/main" id="{4333FBBE-F9F3-A60C-78F9-CCC031ACEFB2}"/>
+              <a:t>7</a:t>
+            </a:r>
+          </a:p>
+        </p:txBody>
+      </p:sp>
+      <p:sp>
+        <p:nvSpPr>
+          <p:cNvPr id="40" name="Rectangle 39">
+            <a:extLst>
+              <a:ext uri="{FF2B5EF4-FFF2-40B4-BE49-F238E27FC236}">
+                <a16:creationId xmlns:a16="http://schemas.microsoft.com/office/drawing/2014/main" id="{1BF39B8D-7FC1-565C-C7C4-66AEEF929BDC}"/>
               </a:ext>
             </a:extLst>
           </p:cNvPr>
@@ -19157,7 +19133,7 @@
         </p:nvSpPr>
         <p:spPr>
           <a:xfrm>
-            <a:off x="7714560" y="1552349"/>
+            <a:off x="8449417" y="1186773"/>
             <a:ext cx="638555" cy="327524"/>
           </a:xfrm>
           <a:prstGeom prst="rect">
@@ -19187,17 +19163,17 @@
             <a:pPr algn="ctr"/>
             <a:r>
               <a:rPr lang="en-US" sz="1200" dirty="0"/>
-              <a:t>7</a:t>
-            </a:r>
-          </a:p>
-        </p:txBody>
-      </p:sp>
-      <p:sp>
-        <p:nvSpPr>
-          <p:cNvPr id="40" name="Rectangle 39">
-            <a:extLst>
-              <a:ext uri="{FF2B5EF4-FFF2-40B4-BE49-F238E27FC236}">
-                <a16:creationId xmlns:a16="http://schemas.microsoft.com/office/drawing/2014/main" id="{1BF39B8D-7FC1-565C-C7C4-66AEEF929BDC}"/>
+              <a:t>8</a:t>
+            </a:r>
+          </a:p>
+        </p:txBody>
+      </p:sp>
+      <p:sp>
+        <p:nvSpPr>
+          <p:cNvPr id="41" name="Rectangle 40">
+            <a:extLst>
+              <a:ext uri="{FF2B5EF4-FFF2-40B4-BE49-F238E27FC236}">
+                <a16:creationId xmlns:a16="http://schemas.microsoft.com/office/drawing/2014/main" id="{EC25B720-D4FE-B8DC-EAC7-0F06D83BC9FC}"/>
               </a:ext>
             </a:extLst>
           </p:cNvPr>
@@ -19206,7 +19182,7 @@
         </p:nvSpPr>
         <p:spPr>
           <a:xfrm>
-            <a:off x="8449417" y="1552349"/>
+            <a:off x="9184274" y="1186773"/>
             <a:ext cx="638555" cy="327524"/>
           </a:xfrm>
           <a:prstGeom prst="rect">
@@ -19236,17 +19212,17 @@
             <a:pPr algn="ctr"/>
             <a:r>
               <a:rPr lang="en-US" sz="1200" dirty="0"/>
-              <a:t>8</a:t>
-            </a:r>
-          </a:p>
-        </p:txBody>
-      </p:sp>
-      <p:sp>
-        <p:nvSpPr>
-          <p:cNvPr id="41" name="Rectangle 40">
-            <a:extLst>
-              <a:ext uri="{FF2B5EF4-FFF2-40B4-BE49-F238E27FC236}">
-                <a16:creationId xmlns:a16="http://schemas.microsoft.com/office/drawing/2014/main" id="{EC25B720-D4FE-B8DC-EAC7-0F06D83BC9FC}"/>
+              <a:t>9</a:t>
+            </a:r>
+          </a:p>
+        </p:txBody>
+      </p:sp>
+      <p:sp>
+        <p:nvSpPr>
+          <p:cNvPr id="42" name="Rectangle 41">
+            <a:extLst>
+              <a:ext uri="{FF2B5EF4-FFF2-40B4-BE49-F238E27FC236}">
+                <a16:creationId xmlns:a16="http://schemas.microsoft.com/office/drawing/2014/main" id="{433438A0-86F8-C49B-8764-77B906F8C68B}"/>
               </a:ext>
             </a:extLst>
           </p:cNvPr>
@@ -19255,7 +19231,7 @@
         </p:nvSpPr>
         <p:spPr>
           <a:xfrm>
-            <a:off x="9184274" y="1552349"/>
+            <a:off x="4094593" y="1186773"/>
             <a:ext cx="638555" cy="327524"/>
           </a:xfrm>
           <a:prstGeom prst="rect">
@@ -19285,17 +19261,17 @@
             <a:pPr algn="ctr"/>
             <a:r>
               <a:rPr lang="en-US" sz="1200" dirty="0"/>
-              <a:t>9</a:t>
-            </a:r>
-          </a:p>
-        </p:txBody>
-      </p:sp>
-      <p:sp>
-        <p:nvSpPr>
-          <p:cNvPr id="42" name="Rectangle 41">
-            <a:extLst>
-              <a:ext uri="{FF2B5EF4-FFF2-40B4-BE49-F238E27FC236}">
-                <a16:creationId xmlns:a16="http://schemas.microsoft.com/office/drawing/2014/main" id="{433438A0-86F8-C49B-8764-77B906F8C68B}"/>
+              <a:t>2</a:t>
+            </a:r>
+          </a:p>
+        </p:txBody>
+      </p:sp>
+      <p:sp>
+        <p:nvSpPr>
+          <p:cNvPr id="43" name="Rectangle 42">
+            <a:extLst>
+              <a:ext uri="{FF2B5EF4-FFF2-40B4-BE49-F238E27FC236}">
+                <a16:creationId xmlns:a16="http://schemas.microsoft.com/office/drawing/2014/main" id="{D8924BF7-E1F3-0B75-0899-163E7CDCC35B}"/>
               </a:ext>
             </a:extLst>
           </p:cNvPr>
@@ -19304,7 +19280,7 @@
         </p:nvSpPr>
         <p:spPr>
           <a:xfrm>
-            <a:off x="4094593" y="1552349"/>
+            <a:off x="4829450" y="1186773"/>
             <a:ext cx="638555" cy="327524"/>
           </a:xfrm>
           <a:prstGeom prst="rect">
@@ -19334,17 +19310,17 @@
             <a:pPr algn="ctr"/>
             <a:r>
               <a:rPr lang="en-US" sz="1200" dirty="0"/>
-              <a:t>2</a:t>
-            </a:r>
-          </a:p>
-        </p:txBody>
-      </p:sp>
-      <p:sp>
-        <p:nvSpPr>
-          <p:cNvPr id="43" name="Rectangle 42">
-            <a:extLst>
-              <a:ext uri="{FF2B5EF4-FFF2-40B4-BE49-F238E27FC236}">
-                <a16:creationId xmlns:a16="http://schemas.microsoft.com/office/drawing/2014/main" id="{D8924BF7-E1F3-0B75-0899-163E7CDCC35B}"/>
+              <a:t>3</a:t>
+            </a:r>
+          </a:p>
+        </p:txBody>
+      </p:sp>
+      <p:sp>
+        <p:nvSpPr>
+          <p:cNvPr id="44" name="Rectangle 43">
+            <a:extLst>
+              <a:ext uri="{FF2B5EF4-FFF2-40B4-BE49-F238E27FC236}">
+                <a16:creationId xmlns:a16="http://schemas.microsoft.com/office/drawing/2014/main" id="{B796F3FF-BC94-3673-8FEB-8FC9F8DA10D9}"/>
               </a:ext>
             </a:extLst>
           </p:cNvPr>
@@ -19353,7 +19329,7 @@
         </p:nvSpPr>
         <p:spPr>
           <a:xfrm>
-            <a:off x="4829450" y="1552349"/>
+            <a:off x="5546201" y="1186773"/>
             <a:ext cx="638555" cy="327524"/>
           </a:xfrm>
           <a:prstGeom prst="rect">
@@ -19383,17 +19359,17 @@
             <a:pPr algn="ctr"/>
             <a:r>
               <a:rPr lang="en-US" sz="1200" dirty="0"/>
-              <a:t>3</a:t>
-            </a:r>
-          </a:p>
-        </p:txBody>
-      </p:sp>
-      <p:sp>
-        <p:nvSpPr>
-          <p:cNvPr id="44" name="Rectangle 43">
-            <a:extLst>
-              <a:ext uri="{FF2B5EF4-FFF2-40B4-BE49-F238E27FC236}">
-                <a16:creationId xmlns:a16="http://schemas.microsoft.com/office/drawing/2014/main" id="{B796F3FF-BC94-3673-8FEB-8FC9F8DA10D9}"/>
+              <a:t>4</a:t>
+            </a:r>
+          </a:p>
+        </p:txBody>
+      </p:sp>
+      <p:sp>
+        <p:nvSpPr>
+          <p:cNvPr id="45" name="Rectangle 44">
+            <a:extLst>
+              <a:ext uri="{FF2B5EF4-FFF2-40B4-BE49-F238E27FC236}">
+                <a16:creationId xmlns:a16="http://schemas.microsoft.com/office/drawing/2014/main" id="{51F07959-1ED4-7FC4-B666-123640B87E6A}"/>
               </a:ext>
             </a:extLst>
           </p:cNvPr>
@@ -19402,8 +19378,8 @@
         </p:nvSpPr>
         <p:spPr>
           <a:xfrm>
-            <a:off x="5546201" y="1552349"/>
-            <a:ext cx="638555" cy="327524"/>
+            <a:off x="1122262" y="2848049"/>
+            <a:ext cx="2107973" cy="327524"/>
           </a:xfrm>
           <a:prstGeom prst="rect">
             <a:avLst/>
@@ -19432,17 +19408,17 @@
             <a:pPr algn="ctr"/>
             <a:r>
               <a:rPr lang="en-US" sz="1200" dirty="0"/>
-              <a:t>4</a:t>
-            </a:r>
-          </a:p>
-        </p:txBody>
-      </p:sp>
-      <p:sp>
-        <p:nvSpPr>
-          <p:cNvPr id="45" name="Rectangle 44">
-            <a:extLst>
-              <a:ext uri="{FF2B5EF4-FFF2-40B4-BE49-F238E27FC236}">
-                <a16:creationId xmlns:a16="http://schemas.microsoft.com/office/drawing/2014/main" id="{51F07959-1ED4-7FC4-B666-123640B87E6A}"/>
+              <a:t>Player 2</a:t>
+            </a:r>
+          </a:p>
+        </p:txBody>
+      </p:sp>
+      <p:sp>
+        <p:nvSpPr>
+          <p:cNvPr id="46" name="Rectangle 45">
+            <a:extLst>
+              <a:ext uri="{FF2B5EF4-FFF2-40B4-BE49-F238E27FC236}">
+                <a16:creationId xmlns:a16="http://schemas.microsoft.com/office/drawing/2014/main" id="{73685A6C-8F17-44FD-E006-8A839EC0640B}"/>
               </a:ext>
             </a:extLst>
           </p:cNvPr>
@@ -19451,7 +19427,7 @@
         </p:nvSpPr>
         <p:spPr>
           <a:xfrm>
-            <a:off x="1122262" y="3213625"/>
+            <a:off x="1122262" y="3639792"/>
             <a:ext cx="2107973" cy="327524"/>
           </a:xfrm>
           <a:prstGeom prst="rect">
@@ -19481,17 +19457,17 @@
             <a:pPr algn="ctr"/>
             <a:r>
               <a:rPr lang="en-US" sz="1200" dirty="0"/>
-              <a:t>Player 2</a:t>
-            </a:r>
-          </a:p>
-        </p:txBody>
-      </p:sp>
-      <p:sp>
-        <p:nvSpPr>
-          <p:cNvPr id="46" name="Rectangle 45">
-            <a:extLst>
-              <a:ext uri="{FF2B5EF4-FFF2-40B4-BE49-F238E27FC236}">
-                <a16:creationId xmlns:a16="http://schemas.microsoft.com/office/drawing/2014/main" id="{73685A6C-8F17-44FD-E006-8A839EC0640B}"/>
+              <a:t>Player 4</a:t>
+            </a:r>
+          </a:p>
+        </p:txBody>
+      </p:sp>
+      <p:sp>
+        <p:nvSpPr>
+          <p:cNvPr id="47" name="Rectangle 46">
+            <a:extLst>
+              <a:ext uri="{FF2B5EF4-FFF2-40B4-BE49-F238E27FC236}">
+                <a16:creationId xmlns:a16="http://schemas.microsoft.com/office/drawing/2014/main" id="{F95195AA-A352-C77E-80DC-C20203930079}"/>
               </a:ext>
             </a:extLst>
           </p:cNvPr>
@@ -19500,7 +19476,7 @@
         </p:nvSpPr>
         <p:spPr>
           <a:xfrm>
-            <a:off x="1122262" y="4005368"/>
+            <a:off x="1122262" y="3246528"/>
             <a:ext cx="2107973" cy="327524"/>
           </a:xfrm>
           <a:prstGeom prst="rect">
@@ -19530,62 +19506,13 @@
             <a:pPr algn="ctr"/>
             <a:r>
               <a:rPr lang="en-US" sz="1200" dirty="0"/>
-              <a:t>Player 4</a:t>
-            </a:r>
-          </a:p>
-        </p:txBody>
-      </p:sp>
-      <p:sp>
-        <p:nvSpPr>
-          <p:cNvPr id="47" name="Rectangle 46">
-            <a:extLst>
-              <a:ext uri="{FF2B5EF4-FFF2-40B4-BE49-F238E27FC236}">
-                <a16:creationId xmlns:a16="http://schemas.microsoft.com/office/drawing/2014/main" id="{F95195AA-A352-C77E-80DC-C20203930079}"/>
-              </a:ext>
-            </a:extLst>
-          </p:cNvPr>
-          <p:cNvSpPr/>
-          <p:nvPr/>
-        </p:nvSpPr>
-        <p:spPr>
-          <a:xfrm>
-            <a:off x="1122262" y="3612104"/>
-            <a:ext cx="2107973" cy="327524"/>
-          </a:xfrm>
-          <a:prstGeom prst="rect">
-            <a:avLst/>
-          </a:prstGeom>
-        </p:spPr>
-        <p:style>
-          <a:lnRef idx="2">
-            <a:schemeClr val="accent1">
-              <a:shade val="15000"/>
-            </a:schemeClr>
-          </a:lnRef>
-          <a:fillRef idx="1">
-            <a:schemeClr val="accent1"/>
-          </a:fillRef>
-          <a:effectRef idx="0">
-            <a:schemeClr val="accent1"/>
-          </a:effectRef>
-          <a:fontRef idx="minor">
-            <a:schemeClr val="lt1"/>
-          </a:fontRef>
-        </p:style>
-        <p:txBody>
-          <a:bodyPr rtlCol="0" anchor="ctr"/>
-          <a:lstStyle/>
-          <a:p>
-            <a:pPr algn="ctr"/>
-            <a:r>
-              <a:rPr lang="en-US" sz="1200" dirty="0"/>
               <a:t>Player 3</a:t>
             </a:r>
           </a:p>
         </p:txBody>
       </p:sp>
-      <mc:AlternateContent xmlns:mc="http://schemas.openxmlformats.org/markup-compatibility/2006" xmlns:p14="http://schemas.microsoft.com/office/powerpoint/2010/main">
-        <mc:Choice Requires="p14">
+      <mc:AlternateContent xmlns:mc="http://schemas.openxmlformats.org/markup-compatibility/2006">
+        <mc:Choice xmlns:p14="http://schemas.microsoft.com/office/powerpoint/2010/main" Requires="p14">
           <p:contentPart p14:bwMode="auto" r:id="rId29">
             <p14:nvContentPartPr>
               <p14:cNvPr id="48" name="Ink 47">
@@ -19599,12 +19526,12 @@
               <p14:nvPr/>
             </p14:nvContentPartPr>
             <p14:xfrm>
-              <a:off x="1093656" y="4878261"/>
+              <a:off x="1093656" y="4512685"/>
               <a:ext cx="9750960" cy="360"/>
             </p14:xfrm>
           </p:contentPart>
         </mc:Choice>
-        <mc:Fallback xmlns="">
+        <mc:Fallback>
           <p:pic>
             <p:nvPicPr>
               <p:cNvPr id="48" name="Ink 47">
@@ -19618,14 +19545,14 @@
               <p:nvPr/>
             </p:nvPicPr>
             <p:blipFill>
-              <a:blip r:embed="rId30"/>
+              <a:blip r:embed="rId7"/>
               <a:stretch>
                 <a:fillRect/>
               </a:stretch>
             </p:blipFill>
             <p:spPr>
               <a:xfrm>
-                <a:off x="1084656" y="4869261"/>
+                <a:off x="1084656" y="4503685"/>
                 <a:ext cx="9768600" cy="18000"/>
               </a:xfrm>
               <a:prstGeom prst="rect">
@@ -19649,7 +19576,7 @@
         </p:nvSpPr>
         <p:spPr>
           <a:xfrm>
-            <a:off x="4110621" y="5798296"/>
+            <a:off x="5832424" y="5406132"/>
             <a:ext cx="704663" cy="234662"/>
           </a:xfrm>
           <a:prstGeom prst="roundRect">
@@ -19698,7 +19625,7 @@
         </p:nvSpPr>
         <p:spPr>
           <a:xfrm>
-            <a:off x="5012758" y="5766844"/>
+            <a:off x="6828570" y="5406132"/>
             <a:ext cx="704663" cy="234662"/>
           </a:xfrm>
           <a:prstGeom prst="roundRect">
@@ -19747,7 +19674,7 @@
         </p:nvSpPr>
         <p:spPr>
           <a:xfrm>
-            <a:off x="3050948" y="5803221"/>
+            <a:off x="4656582" y="5406132"/>
             <a:ext cx="884359" cy="234662"/>
           </a:xfrm>
           <a:prstGeom prst="roundRect">
@@ -19779,6 +19706,100 @@
               <a:rPr lang="en-US" sz="1000" dirty="0"/>
               <a:t>Summary</a:t>
             </a:r>
+          </a:p>
+        </p:txBody>
+      </p:sp>
+      <p:sp>
+        <p:nvSpPr>
+          <p:cNvPr id="36" name="TextBox 35">
+            <a:extLst>
+              <a:ext uri="{FF2B5EF4-FFF2-40B4-BE49-F238E27FC236}">
+                <a16:creationId xmlns:a16="http://schemas.microsoft.com/office/drawing/2014/main" id="{FF52B13C-D861-6494-E250-532E9C703E94}"/>
+              </a:ext>
+            </a:extLst>
+          </p:cNvPr>
+          <p:cNvSpPr txBox="1"/>
+          <p:nvPr/>
+        </p:nvSpPr>
+        <p:spPr>
+          <a:xfrm>
+            <a:off x="2777904" y="6446487"/>
+            <a:ext cx="6599179" cy="276999"/>
+          </a:xfrm>
+          <a:prstGeom prst="rect">
+            <a:avLst/>
+          </a:prstGeom>
+          <a:noFill/>
+        </p:spPr>
+        <p:txBody>
+          <a:bodyPr wrap="none" rtlCol="0">
+            <a:spAutoFit/>
+          </a:bodyPr>
+          <a:lstStyle/>
+          <a:p>
+            <a:r>
+              <a:rPr lang="en-US" sz="1200" dirty="0"/>
+              <a:t> Display Button – Gross – GHIN – Net - </a:t>
+            </a:r>
+            <a:r>
+              <a:rPr lang="en-US" sz="1200" dirty="0">
+                <a:effectLst/>
+                <a:latin typeface="Times New Roman" panose="02020603050405020304" pitchFamily="18" charset="0"/>
+                <a:ea typeface="Calibri" panose="020F0502020204030204" pitchFamily="34" charset="0"/>
+              </a:rPr>
+              <a:t>Stableford – Quota – Team Match – Player Match – 9 Pts </a:t>
+            </a:r>
+            <a:endParaRPr lang="en-US" sz="1200" dirty="0"/>
+          </a:p>
+        </p:txBody>
+      </p:sp>
+      <p:sp>
+        <p:nvSpPr>
+          <p:cNvPr id="52" name="Rectangle: Rounded Corners 51">
+            <a:extLst>
+              <a:ext uri="{FF2B5EF4-FFF2-40B4-BE49-F238E27FC236}">
+                <a16:creationId xmlns:a16="http://schemas.microsoft.com/office/drawing/2014/main" id="{D7314D28-2174-D6FC-D0C2-8FE5785D14E2}"/>
+              </a:ext>
+            </a:extLst>
+          </p:cNvPr>
+          <p:cNvSpPr/>
+          <p:nvPr/>
+        </p:nvSpPr>
+        <p:spPr>
+          <a:xfrm>
+            <a:off x="7824716" y="5402018"/>
+            <a:ext cx="914400" cy="242890"/>
+          </a:xfrm>
+          <a:prstGeom prst="roundRect">
+            <a:avLst/>
+          </a:prstGeom>
+        </p:spPr>
+        <p:style>
+          <a:lnRef idx="2">
+            <a:schemeClr val="accent1">
+              <a:shade val="15000"/>
+            </a:schemeClr>
+          </a:lnRef>
+          <a:fillRef idx="1">
+            <a:schemeClr val="accent1"/>
+          </a:fillRef>
+          <a:effectRef idx="0">
+            <a:schemeClr val="accent1"/>
+          </a:effectRef>
+          <a:fontRef idx="minor">
+            <a:schemeClr val="lt1"/>
+          </a:fontRef>
+        </p:style>
+        <p:txBody>
+          <a:bodyPr rtlCol="0" anchor="ctr"/>
+          <a:lstStyle/>
+          <a:p>
+            <a:pPr algn="ctr"/>
+            <a:r>
+              <a:rPr lang="en-US" sz="1000" dirty="0" err="1"/>
+              <a:t>Displa</a:t>
+            </a:r>
+            <a:endParaRPr lang="en-US" sz="1000" dirty="0"/>
           </a:p>
         </p:txBody>
       </p:sp>

</xml_diff>

<commit_message>
May 8, 2024 Merge fix
</commit_message>
<xml_diff>
--- a/Documentation/TeamScoreLayout.pptx
+++ b/Documentation/TeamScoreLayout.pptx
@@ -21,6 +21,7 @@
     <p:sldId id="264" r:id="rId15"/>
     <p:sldId id="260" r:id="rId16"/>
     <p:sldId id="259" r:id="rId17"/>
+    <p:sldId id="275" r:id="rId18"/>
   </p:sldIdLst>
   <p:sldSz cx="12192000" cy="6858000"/>
   <p:notesSz cx="6858000" cy="9144000"/>
@@ -841,7 +842,7 @@
           <a:p>
             <a:fld id="{955A69D3-FF78-44E1-BB41-3D13FA416A59}" type="datetimeFigureOut">
               <a:rPr lang="en-US" smtClean="0"/>
-              <a:t>Sunday,Apr/28/24</a:t>
+              <a:t>05/06/24</a:t>
             </a:fld>
             <a:endParaRPr lang="en-US"/>
           </a:p>
@@ -1039,7 +1040,7 @@
           <a:p>
             <a:fld id="{955A69D3-FF78-44E1-BB41-3D13FA416A59}" type="datetimeFigureOut">
               <a:rPr lang="en-US" smtClean="0"/>
-              <a:t>Sunday,Apr/28/24</a:t>
+              <a:t>05/06/24</a:t>
             </a:fld>
             <a:endParaRPr lang="en-US"/>
           </a:p>
@@ -1247,7 +1248,7 @@
           <a:p>
             <a:fld id="{955A69D3-FF78-44E1-BB41-3D13FA416A59}" type="datetimeFigureOut">
               <a:rPr lang="en-US" smtClean="0"/>
-              <a:t>Sunday,Apr/28/24</a:t>
+              <a:t>05/06/24</a:t>
             </a:fld>
             <a:endParaRPr lang="en-US"/>
           </a:p>
@@ -1445,7 +1446,7 @@
           <a:p>
             <a:fld id="{955A69D3-FF78-44E1-BB41-3D13FA416A59}" type="datetimeFigureOut">
               <a:rPr lang="en-US" smtClean="0"/>
-              <a:t>Sunday,Apr/28/24</a:t>
+              <a:t>05/06/24</a:t>
             </a:fld>
             <a:endParaRPr lang="en-US"/>
           </a:p>
@@ -1720,7 +1721,7 @@
           <a:p>
             <a:fld id="{955A69D3-FF78-44E1-BB41-3D13FA416A59}" type="datetimeFigureOut">
               <a:rPr lang="en-US" smtClean="0"/>
-              <a:t>Sunday,Apr/28/24</a:t>
+              <a:t>05/06/24</a:t>
             </a:fld>
             <a:endParaRPr lang="en-US"/>
           </a:p>
@@ -1985,7 +1986,7 @@
           <a:p>
             <a:fld id="{955A69D3-FF78-44E1-BB41-3D13FA416A59}" type="datetimeFigureOut">
               <a:rPr lang="en-US" smtClean="0"/>
-              <a:t>Sunday,Apr/28/24</a:t>
+              <a:t>05/06/24</a:t>
             </a:fld>
             <a:endParaRPr lang="en-US"/>
           </a:p>
@@ -2397,7 +2398,7 @@
           <a:p>
             <a:fld id="{955A69D3-FF78-44E1-BB41-3D13FA416A59}" type="datetimeFigureOut">
               <a:rPr lang="en-US" smtClean="0"/>
-              <a:t>Sunday,Apr/28/24</a:t>
+              <a:t>05/06/24</a:t>
             </a:fld>
             <a:endParaRPr lang="en-US"/>
           </a:p>
@@ -2538,7 +2539,7 @@
           <a:p>
             <a:fld id="{955A69D3-FF78-44E1-BB41-3D13FA416A59}" type="datetimeFigureOut">
               <a:rPr lang="en-US" smtClean="0"/>
-              <a:t>Sunday,Apr/28/24</a:t>
+              <a:t>05/06/24</a:t>
             </a:fld>
             <a:endParaRPr lang="en-US"/>
           </a:p>
@@ -2651,7 +2652,7 @@
           <a:p>
             <a:fld id="{955A69D3-FF78-44E1-BB41-3D13FA416A59}" type="datetimeFigureOut">
               <a:rPr lang="en-US" smtClean="0"/>
-              <a:t>Sunday,Apr/28/24</a:t>
+              <a:t>05/06/24</a:t>
             </a:fld>
             <a:endParaRPr lang="en-US"/>
           </a:p>
@@ -2962,7 +2963,7 @@
           <a:p>
             <a:fld id="{955A69D3-FF78-44E1-BB41-3D13FA416A59}" type="datetimeFigureOut">
               <a:rPr lang="en-US" smtClean="0"/>
-              <a:t>Sunday,Apr/28/24</a:t>
+              <a:t>05/06/24</a:t>
             </a:fld>
             <a:endParaRPr lang="en-US"/>
           </a:p>
@@ -3250,7 +3251,7 @@
           <a:p>
             <a:fld id="{955A69D3-FF78-44E1-BB41-3D13FA416A59}" type="datetimeFigureOut">
               <a:rPr lang="en-US" smtClean="0"/>
-              <a:t>Sunday,Apr/28/24</a:t>
+              <a:t>05/06/24</a:t>
             </a:fld>
             <a:endParaRPr lang="en-US"/>
           </a:p>
@@ -3491,7 +3492,7 @@
           <a:p>
             <a:fld id="{955A69D3-FF78-44E1-BB41-3D13FA416A59}" type="datetimeFigureOut">
               <a:rPr lang="en-US" smtClean="0"/>
-              <a:t>Sunday,Apr/28/24</a:t>
+              <a:t>05/06/24</a:t>
             </a:fld>
             <a:endParaRPr lang="en-US"/>
           </a:p>
@@ -6938,7 +6939,7 @@
         </p:nvCxnSpPr>
         <p:spPr>
           <a:xfrm>
-            <a:off x="4312939" y="6172170"/>
+            <a:off x="5472767" y="3729240"/>
             <a:ext cx="1965939" cy="0"/>
           </a:xfrm>
           <a:prstGeom prst="line">
@@ -6976,7 +6977,7 @@
         </p:nvCxnSpPr>
         <p:spPr>
           <a:xfrm flipV="1">
-            <a:off x="4312939" y="5768258"/>
+            <a:off x="5472767" y="3325328"/>
             <a:ext cx="1965939" cy="15297"/>
           </a:xfrm>
           <a:prstGeom prst="line">
@@ -7014,7 +7015,7 @@
         </p:nvCxnSpPr>
         <p:spPr>
           <a:xfrm>
-            <a:off x="4312939" y="5394939"/>
+            <a:off x="5472767" y="2952009"/>
             <a:ext cx="1965939" cy="17540"/>
           </a:xfrm>
           <a:prstGeom prst="line">
@@ -7052,7 +7053,7 @@
         </p:nvCxnSpPr>
         <p:spPr>
           <a:xfrm>
-            <a:off x="4312939" y="5006323"/>
+            <a:off x="5472767" y="2563393"/>
             <a:ext cx="1965939" cy="6159"/>
           </a:xfrm>
           <a:prstGeom prst="line">
@@ -7090,7 +7091,7 @@
         </p:nvCxnSpPr>
         <p:spPr>
           <a:xfrm>
-            <a:off x="4312939" y="4617707"/>
+            <a:off x="5472767" y="2174777"/>
             <a:ext cx="1965939" cy="9063"/>
           </a:xfrm>
           <a:prstGeom prst="line">
@@ -7126,7 +7127,7 @@
         </p:nvCxnSpPr>
         <p:spPr>
           <a:xfrm>
-            <a:off x="4312939" y="4617707"/>
+            <a:off x="5472767" y="2174777"/>
             <a:ext cx="0" cy="1554463"/>
           </a:xfrm>
           <a:prstGeom prst="line">
@@ -7157,13 +7158,15 @@
               </a:ext>
             </a:extLst>
           </p:cNvPr>
-          <p:cNvCxnSpPr/>
+          <p:cNvCxnSpPr>
+            <a:cxnSpLocks/>
+          </p:cNvCxnSpPr>
           <p:nvPr/>
         </p:nvCxnSpPr>
         <p:spPr>
           <a:xfrm>
-            <a:off x="4968252" y="4617707"/>
-            <a:ext cx="0" cy="1554463"/>
+            <a:off x="6128080" y="2174777"/>
+            <a:ext cx="0" cy="1165848"/>
           </a:xfrm>
           <a:prstGeom prst="line">
             <a:avLst/>
@@ -7200,7 +7203,7 @@
         </p:nvCxnSpPr>
         <p:spPr>
           <a:xfrm>
-            <a:off x="6278878" y="4617706"/>
+            <a:off x="7438706" y="2174776"/>
             <a:ext cx="0" cy="1554463"/>
           </a:xfrm>
           <a:prstGeom prst="line">
@@ -7231,13 +7234,15 @@
               </a:ext>
             </a:extLst>
           </p:cNvPr>
-          <p:cNvCxnSpPr/>
+          <p:cNvCxnSpPr>
+            <a:cxnSpLocks/>
+          </p:cNvCxnSpPr>
           <p:nvPr/>
         </p:nvCxnSpPr>
         <p:spPr>
           <a:xfrm>
-            <a:off x="5623565" y="4617707"/>
-            <a:ext cx="0" cy="1554463"/>
+            <a:off x="6783393" y="2174777"/>
+            <a:ext cx="0" cy="1138920"/>
           </a:xfrm>
           <a:prstGeom prst="line">
             <a:avLst/>
@@ -7272,7 +7277,7 @@
         </p:nvSpPr>
         <p:spPr>
           <a:xfrm>
-            <a:off x="4502948" y="4627348"/>
+            <a:off x="5662776" y="2184418"/>
             <a:ext cx="312906" cy="369332"/>
           </a:xfrm>
           <a:prstGeom prst="rect">
@@ -7307,7 +7312,7 @@
         </p:nvSpPr>
         <p:spPr>
           <a:xfrm>
-            <a:off x="5146585" y="4637247"/>
+            <a:off x="6306413" y="2194317"/>
             <a:ext cx="312906" cy="369332"/>
           </a:xfrm>
           <a:prstGeom prst="rect">
@@ -7342,7 +7347,7 @@
         </p:nvSpPr>
         <p:spPr>
           <a:xfrm>
-            <a:off x="5748272" y="4661640"/>
+            <a:off x="6908100" y="2218710"/>
             <a:ext cx="312906" cy="369332"/>
           </a:xfrm>
           <a:prstGeom prst="rect">
@@ -7377,7 +7382,7 @@
         </p:nvSpPr>
         <p:spPr>
           <a:xfrm>
-            <a:off x="4502947" y="4981675"/>
+            <a:off x="5662775" y="2538745"/>
             <a:ext cx="312906" cy="369332"/>
           </a:xfrm>
           <a:prstGeom prst="rect">
@@ -7412,7 +7417,7 @@
         </p:nvSpPr>
         <p:spPr>
           <a:xfrm>
-            <a:off x="5154207" y="5008323"/>
+            <a:off x="6314035" y="2565393"/>
             <a:ext cx="312906" cy="369332"/>
           </a:xfrm>
           <a:prstGeom prst="rect">
@@ -7447,7 +7452,7 @@
         </p:nvSpPr>
         <p:spPr>
           <a:xfrm>
-            <a:off x="5748272" y="5019382"/>
+            <a:off x="6908100" y="2576452"/>
             <a:ext cx="312906" cy="369332"/>
           </a:xfrm>
           <a:prstGeom prst="rect">
@@ -7482,7 +7487,7 @@
         </p:nvSpPr>
         <p:spPr>
           <a:xfrm>
-            <a:off x="4484143" y="5403946"/>
+            <a:off x="5643971" y="2961016"/>
             <a:ext cx="312906" cy="369332"/>
           </a:xfrm>
           <a:prstGeom prst="rect">
@@ -7517,7 +7522,7 @@
         </p:nvSpPr>
         <p:spPr>
           <a:xfrm>
-            <a:off x="5132327" y="5387295"/>
+            <a:off x="6292155" y="2944365"/>
             <a:ext cx="312906" cy="369332"/>
           </a:xfrm>
           <a:prstGeom prst="rect">
@@ -7552,7 +7557,7 @@
         </p:nvSpPr>
         <p:spPr>
           <a:xfrm>
-            <a:off x="5756670" y="5398926"/>
+            <a:off x="6916498" y="2955996"/>
             <a:ext cx="312906" cy="369332"/>
           </a:xfrm>
           <a:prstGeom prst="rect">
@@ -7587,7 +7592,7 @@
         </p:nvSpPr>
         <p:spPr>
           <a:xfrm>
-            <a:off x="3765961" y="1919791"/>
+            <a:off x="389775" y="1783589"/>
             <a:ext cx="1749269" cy="365756"/>
           </a:xfrm>
           <a:prstGeom prst="rect">
@@ -7636,7 +7641,7 @@
         </p:nvSpPr>
         <p:spPr>
           <a:xfrm>
-            <a:off x="3765961" y="2550493"/>
+            <a:off x="389775" y="2414291"/>
             <a:ext cx="1749269" cy="365756"/>
           </a:xfrm>
           <a:prstGeom prst="rect">
@@ -7685,7 +7690,7 @@
         </p:nvSpPr>
         <p:spPr>
           <a:xfrm>
-            <a:off x="3765961" y="3167939"/>
+            <a:off x="389775" y="3031737"/>
             <a:ext cx="1749269" cy="365756"/>
           </a:xfrm>
           <a:prstGeom prst="rect">
@@ -7734,7 +7739,7 @@
         </p:nvSpPr>
         <p:spPr>
           <a:xfrm>
-            <a:off x="3765961" y="3785385"/>
+            <a:off x="389775" y="3649183"/>
             <a:ext cx="1749269" cy="365756"/>
           </a:xfrm>
           <a:prstGeom prst="rect">
@@ -7783,7 +7788,7 @@
         </p:nvSpPr>
         <p:spPr>
           <a:xfrm>
-            <a:off x="5747402" y="1942418"/>
+            <a:off x="2371216" y="1806216"/>
             <a:ext cx="731512" cy="365756"/>
           </a:xfrm>
           <a:prstGeom prst="roundRect">
@@ -7832,7 +7837,7 @@
         </p:nvSpPr>
         <p:spPr>
           <a:xfrm>
-            <a:off x="5730244" y="2559864"/>
+            <a:off x="2354058" y="2423662"/>
             <a:ext cx="731512" cy="365756"/>
           </a:xfrm>
           <a:prstGeom prst="roundRect">
@@ -7881,7 +7886,7 @@
         </p:nvSpPr>
         <p:spPr>
           <a:xfrm>
-            <a:off x="5730244" y="3177310"/>
+            <a:off x="2354058" y="3041108"/>
             <a:ext cx="731512" cy="365756"/>
           </a:xfrm>
           <a:prstGeom prst="roundRect">
@@ -7930,7 +7935,7 @@
         </p:nvSpPr>
         <p:spPr>
           <a:xfrm>
-            <a:off x="5730244" y="3794756"/>
+            <a:off x="2354058" y="3658554"/>
             <a:ext cx="731512" cy="365756"/>
           </a:xfrm>
           <a:prstGeom prst="roundRect">
@@ -7979,8 +7984,8 @@
         </p:nvSpPr>
         <p:spPr>
           <a:xfrm>
-            <a:off x="5015421" y="5829019"/>
-            <a:ext cx="526106" cy="276999"/>
+            <a:off x="6631421" y="3369504"/>
+            <a:ext cx="553357" cy="276999"/>
           </a:xfrm>
           <a:prstGeom prst="rect">
             <a:avLst/>
@@ -7995,7 +8000,7 @@
           <a:p>
             <a:r>
               <a:rPr lang="en-US" sz="1200" dirty="0"/>
-              <a:t>Save</a:t>
+              <a:t>Done</a:t>
             </a:r>
           </a:p>
         </p:txBody>
@@ -8014,7 +8019,7 @@
         </p:nvSpPr>
         <p:spPr>
           <a:xfrm>
-            <a:off x="4295184" y="5833616"/>
+            <a:off x="5821309" y="3357629"/>
             <a:ext cx="574196" cy="276999"/>
           </a:xfrm>
           <a:prstGeom prst="rect">
@@ -8049,8 +8054,8 @@
         </p:nvSpPr>
         <p:spPr>
           <a:xfrm>
-            <a:off x="3801448" y="989770"/>
-            <a:ext cx="1365486" cy="365290"/>
+            <a:off x="389775" y="1052064"/>
+            <a:ext cx="2322982" cy="365290"/>
           </a:xfrm>
           <a:prstGeom prst="rect">
             <a:avLst/>
@@ -8079,7 +8084,7 @@
             <a:pPr algn="ctr"/>
             <a:r>
               <a:rPr lang="en-US" sz="1200" dirty="0"/>
-              <a:t>Current Hole  #</a:t>
+              <a:t>Current Hole  #   Hdcp  #</a:t>
             </a:r>
           </a:p>
         </p:txBody>
@@ -8098,7 +8103,7 @@
         </p:nvSpPr>
         <p:spPr>
           <a:xfrm>
-            <a:off x="5083114" y="452699"/>
+            <a:off x="1706928" y="316497"/>
             <a:ext cx="1446230" cy="369332"/>
           </a:xfrm>
           <a:prstGeom prst="rect">
@@ -8121,41 +8126,6 @@
       </p:sp>
       <p:sp>
         <p:nvSpPr>
-          <p:cNvPr id="49" name="TextBox 48">
-            <a:extLst>
-              <a:ext uri="{FF2B5EF4-FFF2-40B4-BE49-F238E27FC236}">
-                <a16:creationId xmlns:a16="http://schemas.microsoft.com/office/drawing/2014/main" id="{A1935A63-E271-6928-78FE-F5A5A45E1FAA}"/>
-              </a:ext>
-            </a:extLst>
-          </p:cNvPr>
-          <p:cNvSpPr txBox="1"/>
-          <p:nvPr/>
-        </p:nvSpPr>
-        <p:spPr>
-          <a:xfrm>
-            <a:off x="5623564" y="5833616"/>
-            <a:ext cx="540533" cy="276999"/>
-          </a:xfrm>
-          <a:prstGeom prst="rect">
-            <a:avLst/>
-          </a:prstGeom>
-          <a:noFill/>
-        </p:spPr>
-        <p:txBody>
-          <a:bodyPr wrap="none" rtlCol="0">
-            <a:spAutoFit/>
-          </a:bodyPr>
-          <a:lstStyle/>
-          <a:p>
-            <a:r>
-              <a:rPr lang="en-US" sz="1200" dirty="0"/>
-              <a:t>Back</a:t>
-            </a:r>
-          </a:p>
-        </p:txBody>
-      </p:sp>
-      <p:sp>
-        <p:nvSpPr>
           <p:cNvPr id="59" name="Rectangle 58">
             <a:extLst>
               <a:ext uri="{FF2B5EF4-FFF2-40B4-BE49-F238E27FC236}">
@@ -8275,7 +8245,7 @@
         </p:nvGrpSpPr>
         <p:grpSpPr>
           <a:xfrm>
-            <a:off x="6641879" y="2594893"/>
+            <a:off x="3265693" y="2458691"/>
             <a:ext cx="1102778" cy="281563"/>
             <a:chOff x="1249733" y="1143025"/>
             <a:chExt cx="1102778" cy="281563"/>
@@ -8394,7 +8364,7 @@
         </p:nvGrpSpPr>
         <p:grpSpPr>
           <a:xfrm>
-            <a:off x="6641879" y="1989670"/>
+            <a:off x="3265693" y="1853468"/>
             <a:ext cx="1102778" cy="281563"/>
             <a:chOff x="1249733" y="1143025"/>
             <a:chExt cx="1102778" cy="281563"/>
@@ -8513,7 +8483,7 @@
         </p:nvGrpSpPr>
         <p:grpSpPr>
           <a:xfrm>
-            <a:off x="6580427" y="3238118"/>
+            <a:off x="3204241" y="3101916"/>
             <a:ext cx="1164230" cy="274317"/>
             <a:chOff x="1188281" y="1150271"/>
             <a:chExt cx="1164230" cy="274317"/>
@@ -8632,7 +8602,7 @@
         </p:nvGrpSpPr>
         <p:grpSpPr>
           <a:xfrm>
-            <a:off x="6641879" y="3841351"/>
+            <a:off x="3265693" y="3705149"/>
             <a:ext cx="1102778" cy="281563"/>
             <a:chOff x="1249733" y="1143025"/>
             <a:chExt cx="1102778" cy="281563"/>
@@ -8751,8 +8721,8 @@
         </p:nvSpPr>
         <p:spPr>
           <a:xfrm>
-            <a:off x="5651687" y="999465"/>
-            <a:ext cx="731512" cy="373911"/>
+            <a:off x="4479345" y="1860714"/>
+            <a:ext cx="528695" cy="279762"/>
           </a:xfrm>
           <a:prstGeom prst="roundRect">
             <a:avLst/>
@@ -8780,7 +8750,154 @@
           <a:p>
             <a:pPr algn="ctr"/>
             <a:r>
-              <a:rPr lang="en-US" sz="1200" dirty="0"/>
+              <a:rPr lang="en-US" sz="900" dirty="0"/>
+              <a:t>Junk</a:t>
+            </a:r>
+          </a:p>
+        </p:txBody>
+      </p:sp>
+      <p:sp>
+        <p:nvSpPr>
+          <p:cNvPr id="3" name="Rectangle: Rounded Corners 2">
+            <a:extLst>
+              <a:ext uri="{FF2B5EF4-FFF2-40B4-BE49-F238E27FC236}">
+                <a16:creationId xmlns:a16="http://schemas.microsoft.com/office/drawing/2014/main" id="{B7B12816-91BE-FE7B-D21F-87709BE2CC72}"/>
+              </a:ext>
+            </a:extLst>
+          </p:cNvPr>
+          <p:cNvSpPr/>
+          <p:nvPr/>
+        </p:nvSpPr>
+        <p:spPr>
+          <a:xfrm>
+            <a:off x="4495088" y="2470297"/>
+            <a:ext cx="528695" cy="279762"/>
+          </a:xfrm>
+          <a:prstGeom prst="roundRect">
+            <a:avLst/>
+          </a:prstGeom>
+        </p:spPr>
+        <p:style>
+          <a:lnRef idx="2">
+            <a:schemeClr val="accent1">
+              <a:shade val="15000"/>
+            </a:schemeClr>
+          </a:lnRef>
+          <a:fillRef idx="1">
+            <a:schemeClr val="accent1"/>
+          </a:fillRef>
+          <a:effectRef idx="0">
+            <a:schemeClr val="accent1"/>
+          </a:effectRef>
+          <a:fontRef idx="minor">
+            <a:schemeClr val="lt1"/>
+          </a:fontRef>
+        </p:style>
+        <p:txBody>
+          <a:bodyPr rtlCol="0" anchor="ctr"/>
+          <a:lstStyle/>
+          <a:p>
+            <a:pPr algn="ctr"/>
+            <a:r>
+              <a:rPr lang="en-US" sz="900" dirty="0"/>
+              <a:t>Junk</a:t>
+            </a:r>
+          </a:p>
+        </p:txBody>
+      </p:sp>
+      <p:sp>
+        <p:nvSpPr>
+          <p:cNvPr id="30" name="Rectangle: Rounded Corners 29">
+            <a:extLst>
+              <a:ext uri="{FF2B5EF4-FFF2-40B4-BE49-F238E27FC236}">
+                <a16:creationId xmlns:a16="http://schemas.microsoft.com/office/drawing/2014/main" id="{25EEB24F-15A0-631F-B9A7-3FB77F12DD96}"/>
+              </a:ext>
+            </a:extLst>
+          </p:cNvPr>
+          <p:cNvSpPr/>
+          <p:nvPr/>
+        </p:nvSpPr>
+        <p:spPr>
+          <a:xfrm>
+            <a:off x="4501384" y="3114144"/>
+            <a:ext cx="528695" cy="279762"/>
+          </a:xfrm>
+          <a:prstGeom prst="roundRect">
+            <a:avLst/>
+          </a:prstGeom>
+        </p:spPr>
+        <p:style>
+          <a:lnRef idx="2">
+            <a:schemeClr val="accent1">
+              <a:shade val="15000"/>
+            </a:schemeClr>
+          </a:lnRef>
+          <a:fillRef idx="1">
+            <a:schemeClr val="accent1"/>
+          </a:fillRef>
+          <a:effectRef idx="0">
+            <a:schemeClr val="accent1"/>
+          </a:effectRef>
+          <a:fontRef idx="minor">
+            <a:schemeClr val="lt1"/>
+          </a:fontRef>
+        </p:style>
+        <p:txBody>
+          <a:bodyPr rtlCol="0" anchor="ctr"/>
+          <a:lstStyle/>
+          <a:p>
+            <a:pPr algn="ctr"/>
+            <a:r>
+              <a:rPr lang="en-US" sz="900" dirty="0"/>
+              <a:t>Junk</a:t>
+            </a:r>
+          </a:p>
+        </p:txBody>
+      </p:sp>
+      <p:sp>
+        <p:nvSpPr>
+          <p:cNvPr id="47" name="Rectangle: Rounded Corners 46">
+            <a:extLst>
+              <a:ext uri="{FF2B5EF4-FFF2-40B4-BE49-F238E27FC236}">
+                <a16:creationId xmlns:a16="http://schemas.microsoft.com/office/drawing/2014/main" id="{6CB1815C-CE57-4DD8-4DE0-779C73E46001}"/>
+              </a:ext>
+            </a:extLst>
+          </p:cNvPr>
+          <p:cNvSpPr/>
+          <p:nvPr/>
+        </p:nvSpPr>
+        <p:spPr>
+          <a:xfrm>
+            <a:off x="4450509" y="3723011"/>
+            <a:ext cx="528695" cy="279762"/>
+          </a:xfrm>
+          <a:prstGeom prst="roundRect">
+            <a:avLst/>
+          </a:prstGeom>
+        </p:spPr>
+        <p:style>
+          <a:lnRef idx="2">
+            <a:schemeClr val="accent1">
+              <a:shade val="15000"/>
+            </a:schemeClr>
+          </a:lnRef>
+          <a:fillRef idx="1">
+            <a:schemeClr val="accent1"/>
+          </a:fillRef>
+          <a:effectRef idx="0">
+            <a:schemeClr val="accent1"/>
+          </a:effectRef>
+          <a:fontRef idx="minor">
+            <a:schemeClr val="lt1"/>
+          </a:fontRef>
+        </p:style>
+        <p:txBody>
+          <a:bodyPr rtlCol="0" anchor="ctr"/>
+          <a:lstStyle/>
+          <a:p>
+            <a:pPr algn="ctr"/>
+            <a:r>
+              <a:rPr lang="en-US" sz="900" dirty="0"/>
               <a:t>Junk</a:t>
             </a:r>
           </a:p>
@@ -16658,6 +16775,966 @@
     <p:extLst>
       <p:ext uri="{BB962C8B-B14F-4D97-AF65-F5344CB8AC3E}">
         <p14:creationId xmlns:p14="http://schemas.microsoft.com/office/powerpoint/2010/main" val="2837724412"/>
+      </p:ext>
+    </p:extLst>
+  </p:cSld>
+  <p:clrMapOvr>
+    <a:masterClrMapping/>
+  </p:clrMapOvr>
+</p:sld>
+</file>
+
+<file path=ppt/slides/slide17.xml><?xml version="1.0" encoding="utf-8"?>
+<p:sld xmlns:a="http://schemas.openxmlformats.org/drawingml/2006/main" xmlns:r="http://schemas.openxmlformats.org/officeDocument/2006/relationships" xmlns:p="http://schemas.openxmlformats.org/presentationml/2006/main">
+  <p:cSld>
+    <p:spTree>
+      <p:nvGrpSpPr>
+        <p:cNvPr id="1" name=""/>
+        <p:cNvGrpSpPr/>
+        <p:nvPr/>
+      </p:nvGrpSpPr>
+      <p:grpSpPr>
+        <a:xfrm>
+          <a:off x="0" y="0"/>
+          <a:ext cx="0" cy="0"/>
+          <a:chOff x="0" y="0"/>
+          <a:chExt cx="0" cy="0"/>
+        </a:xfrm>
+      </p:grpSpPr>
+      <p:sp>
+        <p:nvSpPr>
+          <p:cNvPr id="2" name="Rectangle 1">
+            <a:extLst>
+              <a:ext uri="{FF2B5EF4-FFF2-40B4-BE49-F238E27FC236}">
+                <a16:creationId xmlns:a16="http://schemas.microsoft.com/office/drawing/2014/main" id="{DC7CDF62-0C7C-1A74-A6C6-7F7026DDE491}"/>
+              </a:ext>
+            </a:extLst>
+          </p:cNvPr>
+          <p:cNvSpPr/>
+          <p:nvPr/>
+        </p:nvSpPr>
+        <p:spPr>
+          <a:xfrm>
+            <a:off x="5181610" y="274355"/>
+            <a:ext cx="1097268" cy="365756"/>
+          </a:xfrm>
+          <a:prstGeom prst="rect">
+            <a:avLst/>
+          </a:prstGeom>
+        </p:spPr>
+        <p:style>
+          <a:lnRef idx="2">
+            <a:schemeClr val="accent1">
+              <a:shade val="15000"/>
+            </a:schemeClr>
+          </a:lnRef>
+          <a:fillRef idx="1">
+            <a:schemeClr val="accent1"/>
+          </a:fillRef>
+          <a:effectRef idx="0">
+            <a:schemeClr val="accent1"/>
+          </a:effectRef>
+          <a:fontRef idx="minor">
+            <a:schemeClr val="lt1"/>
+          </a:fontRef>
+        </p:style>
+        <p:txBody>
+          <a:bodyPr rtlCol="0" anchor="ctr"/>
+          <a:lstStyle/>
+          <a:p>
+            <a:pPr algn="ctr"/>
+            <a:r>
+              <a:rPr lang="en-US" sz="1200" dirty="0"/>
+              <a:t>Screen Mode</a:t>
+            </a:r>
+          </a:p>
+        </p:txBody>
+      </p:sp>
+      <p:sp>
+        <p:nvSpPr>
+          <p:cNvPr id="3" name="Rectangle 2">
+            <a:extLst>
+              <a:ext uri="{FF2B5EF4-FFF2-40B4-BE49-F238E27FC236}">
+                <a16:creationId xmlns:a16="http://schemas.microsoft.com/office/drawing/2014/main" id="{87FA8FA5-FA3A-8E26-6DBB-43F719A5A833}"/>
+              </a:ext>
+            </a:extLst>
+          </p:cNvPr>
+          <p:cNvSpPr/>
+          <p:nvPr/>
+        </p:nvSpPr>
+        <p:spPr>
+          <a:xfrm>
+            <a:off x="5181610" y="891568"/>
+            <a:ext cx="1097268" cy="365756"/>
+          </a:xfrm>
+          <a:prstGeom prst="rect">
+            <a:avLst/>
+          </a:prstGeom>
+        </p:spPr>
+        <p:style>
+          <a:lnRef idx="2">
+            <a:schemeClr val="accent1">
+              <a:shade val="15000"/>
+            </a:schemeClr>
+          </a:lnRef>
+          <a:fillRef idx="1">
+            <a:schemeClr val="accent1"/>
+          </a:fillRef>
+          <a:effectRef idx="0">
+            <a:schemeClr val="accent1"/>
+          </a:effectRef>
+          <a:fontRef idx="minor">
+            <a:schemeClr val="lt1"/>
+          </a:fontRef>
+        </p:style>
+        <p:txBody>
+          <a:bodyPr rtlCol="0" anchor="ctr"/>
+          <a:lstStyle/>
+          <a:p>
+            <a:pPr algn="ctr"/>
+            <a:r>
+              <a:rPr lang="en-US" sz="1200" dirty="0"/>
+              <a:t>Player Hole Score</a:t>
+            </a:r>
+          </a:p>
+        </p:txBody>
+      </p:sp>
+      <p:sp>
+        <p:nvSpPr>
+          <p:cNvPr id="4" name="Rectangle 3">
+            <a:extLst>
+              <a:ext uri="{FF2B5EF4-FFF2-40B4-BE49-F238E27FC236}">
+                <a16:creationId xmlns:a16="http://schemas.microsoft.com/office/drawing/2014/main" id="{FB82FC15-2720-7188-6359-A27BEA543788}"/>
+              </a:ext>
+            </a:extLst>
+          </p:cNvPr>
+          <p:cNvSpPr/>
+          <p:nvPr/>
+        </p:nvSpPr>
+        <p:spPr>
+          <a:xfrm>
+            <a:off x="4376985" y="1691659"/>
+            <a:ext cx="1097268" cy="365756"/>
+          </a:xfrm>
+          <a:prstGeom prst="rect">
+            <a:avLst/>
+          </a:prstGeom>
+        </p:spPr>
+        <p:style>
+          <a:lnRef idx="2">
+            <a:schemeClr val="accent1">
+              <a:shade val="15000"/>
+            </a:schemeClr>
+          </a:lnRef>
+          <a:fillRef idx="1">
+            <a:schemeClr val="accent1"/>
+          </a:fillRef>
+          <a:effectRef idx="0">
+            <a:schemeClr val="accent1"/>
+          </a:effectRef>
+          <a:fontRef idx="minor">
+            <a:schemeClr val="lt1"/>
+          </a:fontRef>
+        </p:style>
+        <p:txBody>
+          <a:bodyPr rtlCol="0" anchor="ctr"/>
+          <a:lstStyle/>
+          <a:p>
+            <a:pPr algn="ctr"/>
+            <a:r>
+              <a:rPr lang="en-US" sz="1200" dirty="0"/>
+              <a:t>Screen Gross</a:t>
+            </a:r>
+          </a:p>
+        </p:txBody>
+      </p:sp>
+      <p:sp>
+        <p:nvSpPr>
+          <p:cNvPr id="5" name="Rectangle 4">
+            <a:extLst>
+              <a:ext uri="{FF2B5EF4-FFF2-40B4-BE49-F238E27FC236}">
+                <a16:creationId xmlns:a16="http://schemas.microsoft.com/office/drawing/2014/main" id="{01358D97-BE4D-849F-1BCF-C4E0B85FF6E2}"/>
+              </a:ext>
+            </a:extLst>
+          </p:cNvPr>
+          <p:cNvSpPr/>
+          <p:nvPr/>
+        </p:nvSpPr>
+        <p:spPr>
+          <a:xfrm>
+            <a:off x="4358680" y="2377451"/>
+            <a:ext cx="1097268" cy="365756"/>
+          </a:xfrm>
+          <a:prstGeom prst="rect">
+            <a:avLst/>
+          </a:prstGeom>
+        </p:spPr>
+        <p:style>
+          <a:lnRef idx="2">
+            <a:schemeClr val="accent1">
+              <a:shade val="15000"/>
+            </a:schemeClr>
+          </a:lnRef>
+          <a:fillRef idx="1">
+            <a:schemeClr val="accent1"/>
+          </a:fillRef>
+          <a:effectRef idx="0">
+            <a:schemeClr val="accent1"/>
+          </a:effectRef>
+          <a:fontRef idx="minor">
+            <a:schemeClr val="lt1"/>
+          </a:fontRef>
+        </p:style>
+        <p:txBody>
+          <a:bodyPr rtlCol="0" anchor="ctr"/>
+          <a:lstStyle/>
+          <a:p>
+            <a:pPr algn="ctr"/>
+            <a:r>
+              <a:rPr lang="en-US" sz="1200" dirty="0"/>
+              <a:t>Return Hole Score</a:t>
+            </a:r>
+          </a:p>
+        </p:txBody>
+      </p:sp>
+      <p:sp>
+        <p:nvSpPr>
+          <p:cNvPr id="6" name="Rectangle 5">
+            <a:extLst>
+              <a:ext uri="{FF2B5EF4-FFF2-40B4-BE49-F238E27FC236}">
+                <a16:creationId xmlns:a16="http://schemas.microsoft.com/office/drawing/2014/main" id="{E758F01D-CA39-6AB4-7DC4-26AECC1A4A96}"/>
+              </a:ext>
+            </a:extLst>
+          </p:cNvPr>
+          <p:cNvSpPr/>
+          <p:nvPr/>
+        </p:nvSpPr>
+        <p:spPr>
+          <a:xfrm>
+            <a:off x="426782" y="4892024"/>
+            <a:ext cx="1097268" cy="365756"/>
+          </a:xfrm>
+          <a:prstGeom prst="rect">
+            <a:avLst/>
+          </a:prstGeom>
+        </p:spPr>
+        <p:style>
+          <a:lnRef idx="2">
+            <a:schemeClr val="accent1">
+              <a:shade val="15000"/>
+            </a:schemeClr>
+          </a:lnRef>
+          <a:fillRef idx="1">
+            <a:schemeClr val="accent1"/>
+          </a:fillRef>
+          <a:effectRef idx="0">
+            <a:schemeClr val="accent1"/>
+          </a:effectRef>
+          <a:fontRef idx="minor">
+            <a:schemeClr val="lt1"/>
+          </a:fontRef>
+        </p:style>
+        <p:txBody>
+          <a:bodyPr rtlCol="0" anchor="ctr"/>
+          <a:lstStyle/>
+          <a:p>
+            <a:pPr algn="ctr"/>
+            <a:r>
+              <a:rPr lang="en-US" sz="1200" dirty="0"/>
+              <a:t>Screen Mode</a:t>
+            </a:r>
+          </a:p>
+        </p:txBody>
+      </p:sp>
+      <p:sp>
+        <p:nvSpPr>
+          <p:cNvPr id="7" name="Rectangle 6">
+            <a:extLst>
+              <a:ext uri="{FF2B5EF4-FFF2-40B4-BE49-F238E27FC236}">
+                <a16:creationId xmlns:a16="http://schemas.microsoft.com/office/drawing/2014/main" id="{A66149BC-0CDD-C132-DBB7-7E3A64AAABF6}"/>
+              </a:ext>
+            </a:extLst>
+          </p:cNvPr>
+          <p:cNvSpPr/>
+          <p:nvPr/>
+        </p:nvSpPr>
+        <p:spPr>
+          <a:xfrm>
+            <a:off x="579182" y="5044424"/>
+            <a:ext cx="1097268" cy="365756"/>
+          </a:xfrm>
+          <a:prstGeom prst="rect">
+            <a:avLst/>
+          </a:prstGeom>
+        </p:spPr>
+        <p:style>
+          <a:lnRef idx="2">
+            <a:schemeClr val="accent1">
+              <a:shade val="15000"/>
+            </a:schemeClr>
+          </a:lnRef>
+          <a:fillRef idx="1">
+            <a:schemeClr val="accent1"/>
+          </a:fillRef>
+          <a:effectRef idx="0">
+            <a:schemeClr val="accent1"/>
+          </a:effectRef>
+          <a:fontRef idx="minor">
+            <a:schemeClr val="lt1"/>
+          </a:fontRef>
+        </p:style>
+        <p:txBody>
+          <a:bodyPr rtlCol="0" anchor="ctr"/>
+          <a:lstStyle/>
+          <a:p>
+            <a:pPr algn="ctr"/>
+            <a:r>
+              <a:rPr lang="en-US" sz="1200" dirty="0"/>
+              <a:t>Screen Mode</a:t>
+            </a:r>
+          </a:p>
+        </p:txBody>
+      </p:sp>
+      <p:sp>
+        <p:nvSpPr>
+          <p:cNvPr id="8" name="Rectangle 7">
+            <a:extLst>
+              <a:ext uri="{FF2B5EF4-FFF2-40B4-BE49-F238E27FC236}">
+                <a16:creationId xmlns:a16="http://schemas.microsoft.com/office/drawing/2014/main" id="{1E9BAF86-2204-CCDB-7467-7A68A85BE1B0}"/>
+              </a:ext>
+            </a:extLst>
+          </p:cNvPr>
+          <p:cNvSpPr/>
+          <p:nvPr/>
+        </p:nvSpPr>
+        <p:spPr>
+          <a:xfrm>
+            <a:off x="2520925" y="2390151"/>
+            <a:ext cx="1042292" cy="365756"/>
+          </a:xfrm>
+          <a:prstGeom prst="rect">
+            <a:avLst/>
+          </a:prstGeom>
+        </p:spPr>
+        <p:style>
+          <a:lnRef idx="2">
+            <a:schemeClr val="accent1">
+              <a:shade val="15000"/>
+            </a:schemeClr>
+          </a:lnRef>
+          <a:fillRef idx="1">
+            <a:schemeClr val="accent1"/>
+          </a:fillRef>
+          <a:effectRef idx="0">
+            <a:schemeClr val="accent1"/>
+          </a:effectRef>
+          <a:fontRef idx="minor">
+            <a:schemeClr val="lt1"/>
+          </a:fontRef>
+        </p:style>
+        <p:txBody>
+          <a:bodyPr rtlCol="0" anchor="ctr"/>
+          <a:lstStyle/>
+          <a:p>
+            <a:pPr algn="ctr"/>
+            <a:r>
+              <a:rPr lang="en-US" sz="1200" dirty="0"/>
+              <a:t>Screen </a:t>
+            </a:r>
+          </a:p>
+          <a:p>
+            <a:pPr algn="ctr"/>
+            <a:r>
+              <a:rPr lang="en-US" sz="1200" dirty="0"/>
+              <a:t>Pt Quote</a:t>
+            </a:r>
+          </a:p>
+        </p:txBody>
+      </p:sp>
+      <p:sp>
+        <p:nvSpPr>
+          <p:cNvPr id="9" name="Rectangle 8">
+            <a:extLst>
+              <a:ext uri="{FF2B5EF4-FFF2-40B4-BE49-F238E27FC236}">
+                <a16:creationId xmlns:a16="http://schemas.microsoft.com/office/drawing/2014/main" id="{3FA98009-8920-5D86-8F17-62DABA228428}"/>
+              </a:ext>
+            </a:extLst>
+          </p:cNvPr>
+          <p:cNvSpPr/>
+          <p:nvPr/>
+        </p:nvSpPr>
+        <p:spPr>
+          <a:xfrm>
+            <a:off x="5821683" y="2377451"/>
+            <a:ext cx="1097268" cy="365756"/>
+          </a:xfrm>
+          <a:prstGeom prst="rect">
+            <a:avLst/>
+          </a:prstGeom>
+        </p:spPr>
+        <p:style>
+          <a:lnRef idx="2">
+            <a:schemeClr val="accent1">
+              <a:shade val="15000"/>
+            </a:schemeClr>
+          </a:lnRef>
+          <a:fillRef idx="1">
+            <a:schemeClr val="accent1"/>
+          </a:fillRef>
+          <a:effectRef idx="0">
+            <a:schemeClr val="accent1"/>
+          </a:effectRef>
+          <a:fontRef idx="minor">
+            <a:schemeClr val="lt1"/>
+          </a:fontRef>
+        </p:style>
+        <p:txBody>
+          <a:bodyPr rtlCol="0" anchor="ctr"/>
+          <a:lstStyle/>
+          <a:p>
+            <a:pPr algn="ctr"/>
+            <a:r>
+              <a:rPr lang="en-US" sz="1200" dirty="0"/>
+              <a:t>Gross - Strokes</a:t>
+            </a:r>
+          </a:p>
+        </p:txBody>
+      </p:sp>
+      <p:sp>
+        <p:nvSpPr>
+          <p:cNvPr id="10" name="Rectangle 9">
+            <a:extLst>
+              <a:ext uri="{FF2B5EF4-FFF2-40B4-BE49-F238E27FC236}">
+                <a16:creationId xmlns:a16="http://schemas.microsoft.com/office/drawing/2014/main" id="{B078E48E-A7B2-99AC-8811-232450CB004B}"/>
+              </a:ext>
+            </a:extLst>
+          </p:cNvPr>
+          <p:cNvSpPr/>
+          <p:nvPr/>
+        </p:nvSpPr>
+        <p:spPr>
+          <a:xfrm>
+            <a:off x="5821683" y="1691659"/>
+            <a:ext cx="1097268" cy="365756"/>
+          </a:xfrm>
+          <a:prstGeom prst="rect">
+            <a:avLst/>
+          </a:prstGeom>
+        </p:spPr>
+        <p:style>
+          <a:lnRef idx="2">
+            <a:schemeClr val="accent1">
+              <a:shade val="15000"/>
+            </a:schemeClr>
+          </a:lnRef>
+          <a:fillRef idx="1">
+            <a:schemeClr val="accent1"/>
+          </a:fillRef>
+          <a:effectRef idx="0">
+            <a:schemeClr val="accent1"/>
+          </a:effectRef>
+          <a:fontRef idx="minor">
+            <a:schemeClr val="lt1"/>
+          </a:fontRef>
+        </p:style>
+        <p:txBody>
+          <a:bodyPr rtlCol="0" anchor="ctr"/>
+          <a:lstStyle/>
+          <a:p>
+            <a:pPr algn="ctr"/>
+            <a:r>
+              <a:rPr lang="en-US" sz="1200" dirty="0"/>
+              <a:t>Screen Net</a:t>
+            </a:r>
+          </a:p>
+        </p:txBody>
+      </p:sp>
+      <p:sp>
+        <p:nvSpPr>
+          <p:cNvPr id="11" name="Rectangle 10">
+            <a:extLst>
+              <a:ext uri="{FF2B5EF4-FFF2-40B4-BE49-F238E27FC236}">
+                <a16:creationId xmlns:a16="http://schemas.microsoft.com/office/drawing/2014/main" id="{C29B75E4-75E5-1B61-EF29-FE4E4E0AFF95}"/>
+              </a:ext>
+            </a:extLst>
+          </p:cNvPr>
+          <p:cNvSpPr/>
+          <p:nvPr/>
+        </p:nvSpPr>
+        <p:spPr>
+          <a:xfrm>
+            <a:off x="7559024" y="3063243"/>
+            <a:ext cx="1097268" cy="365756"/>
+          </a:xfrm>
+          <a:prstGeom prst="rect">
+            <a:avLst/>
+          </a:prstGeom>
+        </p:spPr>
+        <p:style>
+          <a:lnRef idx="2">
+            <a:schemeClr val="accent1">
+              <a:shade val="15000"/>
+            </a:schemeClr>
+          </a:lnRef>
+          <a:fillRef idx="1">
+            <a:schemeClr val="accent1"/>
+          </a:fillRef>
+          <a:effectRef idx="0">
+            <a:schemeClr val="accent1"/>
+          </a:effectRef>
+          <a:fontRef idx="minor">
+            <a:schemeClr val="lt1"/>
+          </a:fontRef>
+        </p:style>
+        <p:txBody>
+          <a:bodyPr rtlCol="0" anchor="ctr"/>
+          <a:lstStyle/>
+          <a:p>
+            <a:pPr algn="ctr"/>
+            <a:r>
+              <a:rPr lang="en-US" sz="1200" dirty="0"/>
+              <a:t>Lookup Pts</a:t>
+            </a:r>
+          </a:p>
+          <a:p>
+            <a:pPr algn="ctr"/>
+            <a:r>
+              <a:rPr lang="en-US" sz="1200" dirty="0"/>
+              <a:t>In Table</a:t>
+            </a:r>
+          </a:p>
+        </p:txBody>
+      </p:sp>
+      <p:sp>
+        <p:nvSpPr>
+          <p:cNvPr id="12" name="Rectangle 11">
+            <a:extLst>
+              <a:ext uri="{FF2B5EF4-FFF2-40B4-BE49-F238E27FC236}">
+                <a16:creationId xmlns:a16="http://schemas.microsoft.com/office/drawing/2014/main" id="{E5A69C41-D7E9-0CAC-F976-6840B52C8F9A}"/>
+              </a:ext>
+            </a:extLst>
+          </p:cNvPr>
+          <p:cNvSpPr/>
+          <p:nvPr/>
+        </p:nvSpPr>
+        <p:spPr>
+          <a:xfrm>
+            <a:off x="7559024" y="2390151"/>
+            <a:ext cx="1097268" cy="365756"/>
+          </a:xfrm>
+          <a:prstGeom prst="rect">
+            <a:avLst/>
+          </a:prstGeom>
+        </p:spPr>
+        <p:style>
+          <a:lnRef idx="2">
+            <a:schemeClr val="accent1">
+              <a:shade val="15000"/>
+            </a:schemeClr>
+          </a:lnRef>
+          <a:fillRef idx="1">
+            <a:schemeClr val="accent1"/>
+          </a:fillRef>
+          <a:effectRef idx="0">
+            <a:schemeClr val="accent1"/>
+          </a:effectRef>
+          <a:fontRef idx="minor">
+            <a:schemeClr val="lt1"/>
+          </a:fontRef>
+        </p:style>
+        <p:txBody>
+          <a:bodyPr rtlCol="0" anchor="ctr"/>
+          <a:lstStyle/>
+          <a:p>
+            <a:pPr algn="ctr"/>
+            <a:r>
+              <a:rPr lang="en-US" sz="1200" dirty="0"/>
+              <a:t>Screen Stableford</a:t>
+            </a:r>
+          </a:p>
+        </p:txBody>
+      </p:sp>
+      <p:sp>
+        <p:nvSpPr>
+          <p:cNvPr id="13" name="Rectangle 12">
+            <a:extLst>
+              <a:ext uri="{FF2B5EF4-FFF2-40B4-BE49-F238E27FC236}">
+                <a16:creationId xmlns:a16="http://schemas.microsoft.com/office/drawing/2014/main" id="{77E22EA6-D74E-CDD4-4B97-DBF4A0B9159F}"/>
+              </a:ext>
+            </a:extLst>
+          </p:cNvPr>
+          <p:cNvSpPr/>
+          <p:nvPr/>
+        </p:nvSpPr>
+        <p:spPr>
+          <a:xfrm>
+            <a:off x="5821683" y="3063243"/>
+            <a:ext cx="1097268" cy="365756"/>
+          </a:xfrm>
+          <a:prstGeom prst="rect">
+            <a:avLst/>
+          </a:prstGeom>
+        </p:spPr>
+        <p:style>
+          <a:lnRef idx="2">
+            <a:schemeClr val="accent1">
+              <a:shade val="15000"/>
+            </a:schemeClr>
+          </a:lnRef>
+          <a:fillRef idx="1">
+            <a:schemeClr val="accent1"/>
+          </a:fillRef>
+          <a:effectRef idx="0">
+            <a:schemeClr val="accent1"/>
+          </a:effectRef>
+          <a:fontRef idx="minor">
+            <a:schemeClr val="lt1"/>
+          </a:fontRef>
+        </p:style>
+        <p:txBody>
+          <a:bodyPr rtlCol="0" anchor="ctr"/>
+          <a:lstStyle/>
+          <a:p>
+            <a:pPr algn="ctr"/>
+            <a:r>
+              <a:rPr lang="en-US" sz="1200" dirty="0"/>
+              <a:t>Return Hole Score</a:t>
+            </a:r>
+          </a:p>
+        </p:txBody>
+      </p:sp>
+      <p:cxnSp>
+        <p:nvCxnSpPr>
+          <p:cNvPr id="15" name="Connector: Elbow 14">
+            <a:extLst>
+              <a:ext uri="{FF2B5EF4-FFF2-40B4-BE49-F238E27FC236}">
+                <a16:creationId xmlns:a16="http://schemas.microsoft.com/office/drawing/2014/main" id="{5523EB4F-A3A8-A11D-A296-947D205C8D04}"/>
+              </a:ext>
+            </a:extLst>
+          </p:cNvPr>
+          <p:cNvCxnSpPr>
+            <a:cxnSpLocks/>
+            <a:stCxn id="9" idx="3"/>
+            <a:endCxn id="12" idx="1"/>
+          </p:cNvCxnSpPr>
+          <p:nvPr/>
+        </p:nvCxnSpPr>
+        <p:spPr>
+          <a:xfrm>
+            <a:off x="6918951" y="2560329"/>
+            <a:ext cx="640073" cy="12700"/>
+          </a:xfrm>
+          <a:prstGeom prst="bentConnector3">
+            <a:avLst/>
+          </a:prstGeom>
+          <a:ln>
+            <a:tailEnd type="triangle"/>
+          </a:ln>
+        </p:spPr>
+        <p:style>
+          <a:lnRef idx="2">
+            <a:schemeClr val="accent1"/>
+          </a:lnRef>
+          <a:fillRef idx="0">
+            <a:schemeClr val="accent1"/>
+          </a:fillRef>
+          <a:effectRef idx="1">
+            <a:schemeClr val="accent1"/>
+          </a:effectRef>
+          <a:fontRef idx="minor">
+            <a:schemeClr val="tx1"/>
+          </a:fontRef>
+        </p:style>
+      </p:cxnSp>
+      <p:cxnSp>
+        <p:nvCxnSpPr>
+          <p:cNvPr id="20" name="Straight Arrow Connector 19">
+            <a:extLst>
+              <a:ext uri="{FF2B5EF4-FFF2-40B4-BE49-F238E27FC236}">
+                <a16:creationId xmlns:a16="http://schemas.microsoft.com/office/drawing/2014/main" id="{FA88214A-FF35-0D26-1A7E-14A7639A592A}"/>
+              </a:ext>
+            </a:extLst>
+          </p:cNvPr>
+          <p:cNvCxnSpPr>
+            <a:cxnSpLocks/>
+            <a:stCxn id="12" idx="2"/>
+            <a:endCxn id="11" idx="0"/>
+          </p:cNvCxnSpPr>
+          <p:nvPr/>
+        </p:nvCxnSpPr>
+        <p:spPr>
+          <a:xfrm>
+            <a:off x="8107658" y="2755907"/>
+            <a:ext cx="0" cy="307336"/>
+          </a:xfrm>
+          <a:prstGeom prst="straightConnector1">
+            <a:avLst/>
+          </a:prstGeom>
+          <a:ln>
+            <a:tailEnd type="triangle"/>
+          </a:ln>
+        </p:spPr>
+        <p:style>
+          <a:lnRef idx="2">
+            <a:schemeClr val="accent1"/>
+          </a:lnRef>
+          <a:fillRef idx="0">
+            <a:schemeClr val="accent1"/>
+          </a:fillRef>
+          <a:effectRef idx="1">
+            <a:schemeClr val="accent1"/>
+          </a:effectRef>
+          <a:fontRef idx="minor">
+            <a:schemeClr val="tx1"/>
+          </a:fontRef>
+        </p:style>
+      </p:cxnSp>
+      <p:sp>
+        <p:nvSpPr>
+          <p:cNvPr id="25" name="Rectangle 24">
+            <a:extLst>
+              <a:ext uri="{FF2B5EF4-FFF2-40B4-BE49-F238E27FC236}">
+                <a16:creationId xmlns:a16="http://schemas.microsoft.com/office/drawing/2014/main" id="{CFE62900-8F41-51F2-2656-332B0BA8C993}"/>
+              </a:ext>
+            </a:extLst>
+          </p:cNvPr>
+          <p:cNvSpPr/>
+          <p:nvPr/>
+        </p:nvSpPr>
+        <p:spPr>
+          <a:xfrm>
+            <a:off x="7565144" y="3706875"/>
+            <a:ext cx="1097268" cy="365756"/>
+          </a:xfrm>
+          <a:prstGeom prst="rect">
+            <a:avLst/>
+          </a:prstGeom>
+        </p:spPr>
+        <p:style>
+          <a:lnRef idx="2">
+            <a:schemeClr val="accent1">
+              <a:shade val="15000"/>
+            </a:schemeClr>
+          </a:lnRef>
+          <a:fillRef idx="1">
+            <a:schemeClr val="accent1"/>
+          </a:fillRef>
+          <a:effectRef idx="0">
+            <a:schemeClr val="accent1"/>
+          </a:effectRef>
+          <a:fontRef idx="minor">
+            <a:schemeClr val="lt1"/>
+          </a:fontRef>
+        </p:style>
+        <p:txBody>
+          <a:bodyPr rtlCol="0" anchor="ctr"/>
+          <a:lstStyle/>
+          <a:p>
+            <a:pPr algn="ctr"/>
+            <a:r>
+              <a:rPr lang="en-US" sz="1200" dirty="0"/>
+              <a:t>Return Pts Score</a:t>
+            </a:r>
+          </a:p>
+        </p:txBody>
+      </p:sp>
+      <p:cxnSp>
+        <p:nvCxnSpPr>
+          <p:cNvPr id="27" name="Connector: Elbow 26">
+            <a:extLst>
+              <a:ext uri="{FF2B5EF4-FFF2-40B4-BE49-F238E27FC236}">
+                <a16:creationId xmlns:a16="http://schemas.microsoft.com/office/drawing/2014/main" id="{F4251D44-E066-C18E-11B3-974ED46A0AF1}"/>
+              </a:ext>
+            </a:extLst>
+          </p:cNvPr>
+          <p:cNvCxnSpPr>
+            <a:cxnSpLocks/>
+            <a:stCxn id="4" idx="1"/>
+            <a:endCxn id="8" idx="0"/>
+          </p:cNvCxnSpPr>
+          <p:nvPr/>
+        </p:nvCxnSpPr>
+        <p:spPr>
+          <a:xfrm rot="10800000" flipV="1">
+            <a:off x="3042071" y="1874537"/>
+            <a:ext cx="1334914" cy="515614"/>
+          </a:xfrm>
+          <a:prstGeom prst="bentConnector2">
+            <a:avLst/>
+          </a:prstGeom>
+          <a:ln>
+            <a:tailEnd type="triangle"/>
+          </a:ln>
+        </p:spPr>
+        <p:style>
+          <a:lnRef idx="2">
+            <a:schemeClr val="accent1"/>
+          </a:lnRef>
+          <a:fillRef idx="0">
+            <a:schemeClr val="accent1"/>
+          </a:fillRef>
+          <a:effectRef idx="1">
+            <a:schemeClr val="accent1"/>
+          </a:effectRef>
+          <a:fontRef idx="minor">
+            <a:schemeClr val="tx1"/>
+          </a:fontRef>
+        </p:style>
+      </p:cxnSp>
+      <p:sp>
+        <p:nvSpPr>
+          <p:cNvPr id="31" name="Rectangle 30">
+            <a:extLst>
+              <a:ext uri="{FF2B5EF4-FFF2-40B4-BE49-F238E27FC236}">
+                <a16:creationId xmlns:a16="http://schemas.microsoft.com/office/drawing/2014/main" id="{AF29FD9E-54CB-FD67-5390-8FB68209837C}"/>
+              </a:ext>
+            </a:extLst>
+          </p:cNvPr>
+          <p:cNvSpPr/>
+          <p:nvPr/>
+        </p:nvSpPr>
+        <p:spPr>
+          <a:xfrm>
+            <a:off x="2527045" y="3154683"/>
+            <a:ext cx="1097268" cy="365756"/>
+          </a:xfrm>
+          <a:prstGeom prst="rect">
+            <a:avLst/>
+          </a:prstGeom>
+        </p:spPr>
+        <p:style>
+          <a:lnRef idx="2">
+            <a:schemeClr val="accent1">
+              <a:shade val="15000"/>
+            </a:schemeClr>
+          </a:lnRef>
+          <a:fillRef idx="1">
+            <a:schemeClr val="accent1"/>
+          </a:fillRef>
+          <a:effectRef idx="0">
+            <a:schemeClr val="accent1"/>
+          </a:effectRef>
+          <a:fontRef idx="minor">
+            <a:schemeClr val="lt1"/>
+          </a:fontRef>
+        </p:style>
+        <p:txBody>
+          <a:bodyPr rtlCol="0" anchor="ctr"/>
+          <a:lstStyle/>
+          <a:p>
+            <a:pPr algn="ctr"/>
+            <a:r>
+              <a:rPr lang="en-US" sz="1200" dirty="0"/>
+              <a:t>Lookup Pts</a:t>
+            </a:r>
+          </a:p>
+          <a:p>
+            <a:pPr algn="ctr"/>
+            <a:r>
+              <a:rPr lang="en-US" sz="1200" dirty="0"/>
+              <a:t>In Table</a:t>
+            </a:r>
+          </a:p>
+        </p:txBody>
+      </p:sp>
+      <p:sp>
+        <p:nvSpPr>
+          <p:cNvPr id="32" name="Rectangle 31">
+            <a:extLst>
+              <a:ext uri="{FF2B5EF4-FFF2-40B4-BE49-F238E27FC236}">
+                <a16:creationId xmlns:a16="http://schemas.microsoft.com/office/drawing/2014/main" id="{90ECC458-196B-4BA6-7FCF-26803958138F}"/>
+              </a:ext>
+            </a:extLst>
+          </p:cNvPr>
+          <p:cNvSpPr/>
+          <p:nvPr/>
+        </p:nvSpPr>
+        <p:spPr>
+          <a:xfrm>
+            <a:off x="2527045" y="3798315"/>
+            <a:ext cx="1097268" cy="365756"/>
+          </a:xfrm>
+          <a:prstGeom prst="rect">
+            <a:avLst/>
+          </a:prstGeom>
+        </p:spPr>
+        <p:style>
+          <a:lnRef idx="2">
+            <a:schemeClr val="accent1">
+              <a:shade val="15000"/>
+            </a:schemeClr>
+          </a:lnRef>
+          <a:fillRef idx="1">
+            <a:schemeClr val="accent1"/>
+          </a:fillRef>
+          <a:effectRef idx="0">
+            <a:schemeClr val="accent1"/>
+          </a:effectRef>
+          <a:fontRef idx="minor">
+            <a:schemeClr val="lt1"/>
+          </a:fontRef>
+        </p:style>
+        <p:txBody>
+          <a:bodyPr rtlCol="0" anchor="ctr"/>
+          <a:lstStyle/>
+          <a:p>
+            <a:pPr algn="ctr"/>
+            <a:r>
+              <a:rPr lang="en-US" sz="1200" dirty="0"/>
+              <a:t>Return Pts Score</a:t>
+            </a:r>
+          </a:p>
+        </p:txBody>
+      </p:sp>
+      <p:cxnSp>
+        <p:nvCxnSpPr>
+          <p:cNvPr id="34" name="Connector: Elbow 33">
+            <a:extLst>
+              <a:ext uri="{FF2B5EF4-FFF2-40B4-BE49-F238E27FC236}">
+                <a16:creationId xmlns:a16="http://schemas.microsoft.com/office/drawing/2014/main" id="{033AF366-3A0B-7B41-10BF-D6A108A52BC1}"/>
+              </a:ext>
+            </a:extLst>
+          </p:cNvPr>
+          <p:cNvCxnSpPr>
+            <a:cxnSpLocks/>
+            <a:stCxn id="8" idx="2"/>
+            <a:endCxn id="31" idx="0"/>
+          </p:cNvCxnSpPr>
+          <p:nvPr/>
+        </p:nvCxnSpPr>
+        <p:spPr>
+          <a:xfrm rot="16200000" flipH="1">
+            <a:off x="2859487" y="2938491"/>
+            <a:ext cx="398776" cy="33608"/>
+          </a:xfrm>
+          <a:prstGeom prst="bentConnector3">
+            <a:avLst>
+              <a:gd name="adj1" fmla="val 50000"/>
+            </a:avLst>
+          </a:prstGeom>
+          <a:ln>
+            <a:tailEnd type="triangle"/>
+          </a:ln>
+        </p:spPr>
+        <p:style>
+          <a:lnRef idx="2">
+            <a:schemeClr val="accent1"/>
+          </a:lnRef>
+          <a:fillRef idx="0">
+            <a:schemeClr val="accent1"/>
+          </a:fillRef>
+          <a:effectRef idx="1">
+            <a:schemeClr val="accent1"/>
+          </a:effectRef>
+          <a:fontRef idx="minor">
+            <a:schemeClr val="tx1"/>
+          </a:fontRef>
+        </p:style>
+      </p:cxnSp>
+    </p:spTree>
+    <p:extLst>
+      <p:ext uri="{BB962C8B-B14F-4D97-AF65-F5344CB8AC3E}">
+        <p14:creationId xmlns:p14="http://schemas.microsoft.com/office/powerpoint/2010/main" val="2067112149"/>
       </p:ext>
     </p:extLst>
   </p:cSld>

</xml_diff>

<commit_message>
May 14, 2024 bug fixes Team total still not working
</commit_message>
<xml_diff>
--- a/Documentation/TeamScoreLayout.pptx
+++ b/Documentation/TeamScoreLayout.pptx
@@ -841,7 +841,7 @@
           <a:p>
             <a:fld id="{955A69D3-FF78-44E1-BB41-3D13FA416A59}" type="datetimeFigureOut">
               <a:rPr lang="en-US" smtClean="0"/>
-              <a:t>Sunday,Apr/28/24</a:t>
+              <a:t>05/14/24</a:t>
             </a:fld>
             <a:endParaRPr lang="en-US"/>
           </a:p>
@@ -1039,7 +1039,7 @@
           <a:p>
             <a:fld id="{955A69D3-FF78-44E1-BB41-3D13FA416A59}" type="datetimeFigureOut">
               <a:rPr lang="en-US" smtClean="0"/>
-              <a:t>Sunday,Apr/28/24</a:t>
+              <a:t>05/14/24</a:t>
             </a:fld>
             <a:endParaRPr lang="en-US"/>
           </a:p>
@@ -1247,7 +1247,7 @@
           <a:p>
             <a:fld id="{955A69D3-FF78-44E1-BB41-3D13FA416A59}" type="datetimeFigureOut">
               <a:rPr lang="en-US" smtClean="0"/>
-              <a:t>Sunday,Apr/28/24</a:t>
+              <a:t>05/14/24</a:t>
             </a:fld>
             <a:endParaRPr lang="en-US"/>
           </a:p>
@@ -1445,7 +1445,7 @@
           <a:p>
             <a:fld id="{955A69D3-FF78-44E1-BB41-3D13FA416A59}" type="datetimeFigureOut">
               <a:rPr lang="en-US" smtClean="0"/>
-              <a:t>Sunday,Apr/28/24</a:t>
+              <a:t>05/14/24</a:t>
             </a:fld>
             <a:endParaRPr lang="en-US"/>
           </a:p>
@@ -1720,7 +1720,7 @@
           <a:p>
             <a:fld id="{955A69D3-FF78-44E1-BB41-3D13FA416A59}" type="datetimeFigureOut">
               <a:rPr lang="en-US" smtClean="0"/>
-              <a:t>Sunday,Apr/28/24</a:t>
+              <a:t>05/14/24</a:t>
             </a:fld>
             <a:endParaRPr lang="en-US"/>
           </a:p>
@@ -1985,7 +1985,7 @@
           <a:p>
             <a:fld id="{955A69D3-FF78-44E1-BB41-3D13FA416A59}" type="datetimeFigureOut">
               <a:rPr lang="en-US" smtClean="0"/>
-              <a:t>Sunday,Apr/28/24</a:t>
+              <a:t>05/14/24</a:t>
             </a:fld>
             <a:endParaRPr lang="en-US"/>
           </a:p>
@@ -2397,7 +2397,7 @@
           <a:p>
             <a:fld id="{955A69D3-FF78-44E1-BB41-3D13FA416A59}" type="datetimeFigureOut">
               <a:rPr lang="en-US" smtClean="0"/>
-              <a:t>Sunday,Apr/28/24</a:t>
+              <a:t>05/14/24</a:t>
             </a:fld>
             <a:endParaRPr lang="en-US"/>
           </a:p>
@@ -2538,7 +2538,7 @@
           <a:p>
             <a:fld id="{955A69D3-FF78-44E1-BB41-3D13FA416A59}" type="datetimeFigureOut">
               <a:rPr lang="en-US" smtClean="0"/>
-              <a:t>Sunday,Apr/28/24</a:t>
+              <a:t>05/14/24</a:t>
             </a:fld>
             <a:endParaRPr lang="en-US"/>
           </a:p>
@@ -2651,7 +2651,7 @@
           <a:p>
             <a:fld id="{955A69D3-FF78-44E1-BB41-3D13FA416A59}" type="datetimeFigureOut">
               <a:rPr lang="en-US" smtClean="0"/>
-              <a:t>Sunday,Apr/28/24</a:t>
+              <a:t>05/14/24</a:t>
             </a:fld>
             <a:endParaRPr lang="en-US"/>
           </a:p>
@@ -2962,7 +2962,7 @@
           <a:p>
             <a:fld id="{955A69D3-FF78-44E1-BB41-3D13FA416A59}" type="datetimeFigureOut">
               <a:rPr lang="en-US" smtClean="0"/>
-              <a:t>Sunday,Apr/28/24</a:t>
+              <a:t>05/14/24</a:t>
             </a:fld>
             <a:endParaRPr lang="en-US"/>
           </a:p>
@@ -3250,7 +3250,7 @@
           <a:p>
             <a:fld id="{955A69D3-FF78-44E1-BB41-3D13FA416A59}" type="datetimeFigureOut">
               <a:rPr lang="en-US" smtClean="0"/>
-              <a:t>Sunday,Apr/28/24</a:t>
+              <a:t>05/14/24</a:t>
             </a:fld>
             <a:endParaRPr lang="en-US"/>
           </a:p>
@@ -3491,7 +3491,7 @@
           <a:p>
             <a:fld id="{955A69D3-FF78-44E1-BB41-3D13FA416A59}" type="datetimeFigureOut">
               <a:rPr lang="en-US" smtClean="0"/>
-              <a:t>Sunday,Apr/28/24</a:t>
+              <a:t>05/14/24</a:t>
             </a:fld>
             <a:endParaRPr lang="en-US"/>
           </a:p>
@@ -16698,7 +16698,7 @@
         </p:nvSpPr>
         <p:spPr>
           <a:xfrm>
-            <a:off x="1798367" y="960147"/>
+            <a:off x="1835493" y="3643808"/>
             <a:ext cx="640073" cy="365756"/>
           </a:xfrm>
           <a:prstGeom prst="roundRect">
@@ -16747,8 +16747,8 @@
         </p:nvSpPr>
         <p:spPr>
           <a:xfrm>
-            <a:off x="6583658" y="804728"/>
-            <a:ext cx="640073" cy="365756"/>
+            <a:off x="4404378" y="982136"/>
+            <a:ext cx="1005829" cy="457195"/>
           </a:xfrm>
           <a:prstGeom prst="roundRect">
             <a:avLst/>
@@ -16776,8 +16776,8 @@
           <a:p>
             <a:pPr algn="ctr"/>
             <a:r>
-              <a:rPr lang="en-US" sz="1200" dirty="0"/>
-              <a:t>Long Net</a:t>
+              <a:rPr lang="en-US" sz="900" dirty="0"/>
+              <a:t>Return score entered</a:t>
             </a:r>
           </a:p>
         </p:txBody>
@@ -16796,8 +16796,8 @@
         </p:nvSpPr>
         <p:spPr>
           <a:xfrm>
-            <a:off x="7741902" y="804728"/>
-            <a:ext cx="640073" cy="365756"/>
+            <a:off x="4175781" y="3598088"/>
+            <a:ext cx="880883" cy="457195"/>
           </a:xfrm>
           <a:prstGeom prst="roundRect">
             <a:avLst/>
@@ -16825,9 +16825,14 @@
           <a:p>
             <a:pPr algn="ctr"/>
             <a:r>
-              <a:rPr lang="en-US" sz="1200" dirty="0"/>
-              <a:t>Gross</a:t>
-            </a:r>
+              <a:rPr lang="en-US" sz="900" dirty="0"/>
+              <a:t>Return score - </a:t>
+            </a:r>
+            <a:r>
+              <a:rPr lang="en-US" sz="900" dirty="0" err="1"/>
+              <a:t>hdcp</a:t>
+            </a:r>
+            <a:endParaRPr lang="en-US" sz="900" dirty="0"/>
           </a:p>
         </p:txBody>
       </p:sp>
@@ -16845,8 +16850,8 @@
         </p:nvSpPr>
         <p:spPr>
           <a:xfrm>
-            <a:off x="8869633" y="804728"/>
-            <a:ext cx="640073" cy="365756"/>
+            <a:off x="4450098" y="2023841"/>
+            <a:ext cx="914390" cy="548634"/>
           </a:xfrm>
           <a:prstGeom prst="roundRect">
             <a:avLst/>
@@ -16874,8 +16879,8 @@
           <a:p>
             <a:pPr algn="ctr"/>
             <a:r>
-              <a:rPr lang="en-US" sz="1200" dirty="0"/>
-              <a:t>Long Gross</a:t>
+              <a:rPr lang="en-US" sz="900" dirty="0"/>
+              <a:t> Gross score lookup in point table</a:t>
             </a:r>
           </a:p>
         </p:txBody>
@@ -16894,7 +16899,7 @@
         </p:nvSpPr>
         <p:spPr>
           <a:xfrm>
-            <a:off x="1798367" y="1965976"/>
+            <a:off x="1804716" y="1033326"/>
             <a:ext cx="640073" cy="365756"/>
           </a:xfrm>
           <a:prstGeom prst="roundRect">
@@ -16924,31 +16929,129 @@
             <a:pPr algn="ctr"/>
             <a:r>
               <a:rPr lang="en-US" sz="1200" dirty="0"/>
-              <a:t>Same</a:t>
+              <a:t>Gross</a:t>
+            </a:r>
+          </a:p>
+        </p:txBody>
+      </p:sp>
+      <p:sp>
+        <p:nvSpPr>
+          <p:cNvPr id="11" name="Rectangle: Rounded Corners 10">
+            <a:extLst>
+              <a:ext uri="{FF2B5EF4-FFF2-40B4-BE49-F238E27FC236}">
+                <a16:creationId xmlns:a16="http://schemas.microsoft.com/office/drawing/2014/main" id="{91D33A26-BF72-F5FE-EA9B-248B68020ACD}"/>
+              </a:ext>
+            </a:extLst>
+          </p:cNvPr>
+          <p:cNvSpPr/>
+          <p:nvPr/>
+        </p:nvSpPr>
+        <p:spPr>
+          <a:xfrm>
+            <a:off x="1917336" y="2107847"/>
+            <a:ext cx="737565" cy="365756"/>
+          </a:xfrm>
+          <a:prstGeom prst="roundRect">
+            <a:avLst/>
+          </a:prstGeom>
+        </p:spPr>
+        <p:style>
+          <a:lnRef idx="2">
+            <a:schemeClr val="accent1">
+              <a:shade val="15000"/>
+            </a:schemeClr>
+          </a:lnRef>
+          <a:fillRef idx="1">
+            <a:schemeClr val="accent1"/>
+          </a:fillRef>
+          <a:effectRef idx="0">
+            <a:schemeClr val="accent1"/>
+          </a:effectRef>
+          <a:fontRef idx="minor">
+            <a:schemeClr val="lt1"/>
+          </a:fontRef>
+        </p:style>
+        <p:txBody>
+          <a:bodyPr rtlCol="0" anchor="ctr"/>
+          <a:lstStyle/>
+          <a:p>
+            <a:pPr algn="ctr"/>
+            <a:r>
+              <a:rPr lang="en-US" sz="1200" dirty="0"/>
+              <a:t>Pt Quote</a:t>
+            </a:r>
+          </a:p>
+        </p:txBody>
+      </p:sp>
+      <p:sp>
+        <p:nvSpPr>
+          <p:cNvPr id="12" name="Rectangle: Rounded Corners 11">
+            <a:extLst>
+              <a:ext uri="{FF2B5EF4-FFF2-40B4-BE49-F238E27FC236}">
+                <a16:creationId xmlns:a16="http://schemas.microsoft.com/office/drawing/2014/main" id="{97024C57-3800-D7FA-5137-CFA1850D665B}"/>
+              </a:ext>
+            </a:extLst>
+          </p:cNvPr>
+          <p:cNvSpPr/>
+          <p:nvPr/>
+        </p:nvSpPr>
+        <p:spPr>
+          <a:xfrm>
+            <a:off x="1786231" y="5266964"/>
+            <a:ext cx="999776" cy="365756"/>
+          </a:xfrm>
+          <a:prstGeom prst="roundRect">
+            <a:avLst/>
+          </a:prstGeom>
+        </p:spPr>
+        <p:style>
+          <a:lnRef idx="2">
+            <a:schemeClr val="accent1">
+              <a:shade val="15000"/>
+            </a:schemeClr>
+          </a:lnRef>
+          <a:fillRef idx="1">
+            <a:schemeClr val="accent1"/>
+          </a:fillRef>
+          <a:effectRef idx="0">
+            <a:schemeClr val="accent1"/>
+          </a:effectRef>
+          <a:fontRef idx="minor">
+            <a:schemeClr val="lt1"/>
+          </a:fontRef>
+        </p:style>
+        <p:txBody>
+          <a:bodyPr rtlCol="0" anchor="ctr"/>
+          <a:lstStyle/>
+          <a:p>
+            <a:pPr algn="ctr"/>
+            <a:r>
+              <a:rPr lang="en-US" sz="1200" dirty="0"/>
+              <a:t>Stableford</a:t>
             </a:r>
           </a:p>
         </p:txBody>
       </p:sp>
       <p:cxnSp>
         <p:nvCxnSpPr>
-          <p:cNvPr id="8" name="Straight Arrow Connector 7">
-            <a:extLst>
-              <a:ext uri="{FF2B5EF4-FFF2-40B4-BE49-F238E27FC236}">
-                <a16:creationId xmlns:a16="http://schemas.microsoft.com/office/drawing/2014/main" id="{2166F5C2-68A8-6E30-A68A-597F010B1F37}"/>
+          <p:cNvPr id="9" name="Straight Arrow Connector 8">
+            <a:extLst>
+              <a:ext uri="{FF2B5EF4-FFF2-40B4-BE49-F238E27FC236}">
+                <a16:creationId xmlns:a16="http://schemas.microsoft.com/office/drawing/2014/main" id="{6A8DC361-8536-4E1F-ACF1-8852657E01E0}"/>
               </a:ext>
             </a:extLst>
           </p:cNvPr>
           <p:cNvCxnSpPr>
             <a:cxnSpLocks/>
-            <a:stCxn id="2" idx="2"/>
-            <a:endCxn id="6" idx="0"/>
+            <a:stCxn id="6" idx="3"/>
+            <a:endCxn id="3" idx="1"/>
           </p:cNvCxnSpPr>
           <p:nvPr/>
         </p:nvCxnSpPr>
         <p:spPr>
-          <a:xfrm>
-            <a:off x="2118404" y="1325903"/>
-            <a:ext cx="0" cy="640073"/>
+          <a:xfrm flipV="1">
+            <a:off x="2444789" y="1210734"/>
+            <a:ext cx="1959589" cy="5470"/>
           </a:xfrm>
           <a:prstGeom prst="straightConnector1">
             <a:avLst/>
@@ -16972,12 +17075,189 @@
           </a:fontRef>
         </p:style>
       </p:cxnSp>
-      <p:sp>
-        <p:nvSpPr>
-          <p:cNvPr id="11" name="Rectangle: Rounded Corners 10">
-            <a:extLst>
-              <a:ext uri="{FF2B5EF4-FFF2-40B4-BE49-F238E27FC236}">
-                <a16:creationId xmlns:a16="http://schemas.microsoft.com/office/drawing/2014/main" id="{91D33A26-BF72-F5FE-EA9B-248B68020ACD}"/>
+      <p:cxnSp>
+        <p:nvCxnSpPr>
+          <p:cNvPr id="19" name="Connector: Elbow 18">
+            <a:extLst>
+              <a:ext uri="{FF2B5EF4-FFF2-40B4-BE49-F238E27FC236}">
+                <a16:creationId xmlns:a16="http://schemas.microsoft.com/office/drawing/2014/main" id="{03620C00-4D7F-B05C-333B-4AA2904A01B3}"/>
+              </a:ext>
+            </a:extLst>
+          </p:cNvPr>
+          <p:cNvCxnSpPr>
+            <a:cxnSpLocks/>
+            <a:stCxn id="3" idx="0"/>
+            <a:endCxn id="6" idx="0"/>
+          </p:cNvCxnSpPr>
+          <p:nvPr/>
+        </p:nvCxnSpPr>
+        <p:spPr>
+          <a:xfrm rot="16200000" flipH="1" flipV="1">
+            <a:off x="3490428" y="-383539"/>
+            <a:ext cx="51190" cy="2782540"/>
+          </a:xfrm>
+          <a:prstGeom prst="bentConnector3">
+            <a:avLst>
+              <a:gd name="adj1" fmla="val -446572"/>
+            </a:avLst>
+          </a:prstGeom>
+          <a:ln>
+            <a:tailEnd type="triangle"/>
+          </a:ln>
+        </p:spPr>
+        <p:style>
+          <a:lnRef idx="2">
+            <a:schemeClr val="accent1"/>
+          </a:lnRef>
+          <a:fillRef idx="0">
+            <a:schemeClr val="accent1"/>
+          </a:fillRef>
+          <a:effectRef idx="1">
+            <a:schemeClr val="accent1"/>
+          </a:effectRef>
+          <a:fontRef idx="minor">
+            <a:schemeClr val="tx1"/>
+          </a:fontRef>
+        </p:style>
+      </p:cxnSp>
+      <p:cxnSp>
+        <p:nvCxnSpPr>
+          <p:cNvPr id="25" name="Straight Arrow Connector 24">
+            <a:extLst>
+              <a:ext uri="{FF2B5EF4-FFF2-40B4-BE49-F238E27FC236}">
+                <a16:creationId xmlns:a16="http://schemas.microsoft.com/office/drawing/2014/main" id="{7A6CEBD1-7BF0-5A8D-1B84-CEA42EF50CDA}"/>
+              </a:ext>
+            </a:extLst>
+          </p:cNvPr>
+          <p:cNvCxnSpPr>
+            <a:cxnSpLocks/>
+            <a:stCxn id="11" idx="3"/>
+            <a:endCxn id="5" idx="1"/>
+          </p:cNvCxnSpPr>
+          <p:nvPr/>
+        </p:nvCxnSpPr>
+        <p:spPr>
+          <a:xfrm>
+            <a:off x="2654901" y="2290725"/>
+            <a:ext cx="1795197" cy="7433"/>
+          </a:xfrm>
+          <a:prstGeom prst="straightConnector1">
+            <a:avLst/>
+          </a:prstGeom>
+          <a:ln>
+            <a:tailEnd type="triangle"/>
+          </a:ln>
+        </p:spPr>
+        <p:style>
+          <a:lnRef idx="2">
+            <a:schemeClr val="accent1"/>
+          </a:lnRef>
+          <a:fillRef idx="0">
+            <a:schemeClr val="accent1"/>
+          </a:fillRef>
+          <a:effectRef idx="1">
+            <a:schemeClr val="accent1"/>
+          </a:effectRef>
+          <a:fontRef idx="minor">
+            <a:schemeClr val="tx1"/>
+          </a:fontRef>
+        </p:style>
+      </p:cxnSp>
+      <p:cxnSp>
+        <p:nvCxnSpPr>
+          <p:cNvPr id="29" name="Connector: Elbow 28">
+            <a:extLst>
+              <a:ext uri="{FF2B5EF4-FFF2-40B4-BE49-F238E27FC236}">
+                <a16:creationId xmlns:a16="http://schemas.microsoft.com/office/drawing/2014/main" id="{994B13A6-082B-25AF-44DD-A1AA6214687A}"/>
+              </a:ext>
+            </a:extLst>
+          </p:cNvPr>
+          <p:cNvCxnSpPr>
+            <a:cxnSpLocks/>
+            <a:stCxn id="5" idx="2"/>
+            <a:endCxn id="11" idx="2"/>
+          </p:cNvCxnSpPr>
+          <p:nvPr/>
+        </p:nvCxnSpPr>
+        <p:spPr>
+          <a:xfrm rot="5400000" flipH="1">
+            <a:off x="3547270" y="1212452"/>
+            <a:ext cx="98872" cy="2621174"/>
+          </a:xfrm>
+          <a:prstGeom prst="bentConnector3">
+            <a:avLst>
+              <a:gd name="adj1" fmla="val -231208"/>
+            </a:avLst>
+          </a:prstGeom>
+          <a:ln>
+            <a:tailEnd type="triangle"/>
+          </a:ln>
+        </p:spPr>
+        <p:style>
+          <a:lnRef idx="2">
+            <a:schemeClr val="accent1"/>
+          </a:lnRef>
+          <a:fillRef idx="0">
+            <a:schemeClr val="accent1"/>
+          </a:fillRef>
+          <a:effectRef idx="1">
+            <a:schemeClr val="accent1"/>
+          </a:effectRef>
+          <a:fontRef idx="minor">
+            <a:schemeClr val="tx1"/>
+          </a:fontRef>
+        </p:style>
+      </p:cxnSp>
+      <p:cxnSp>
+        <p:nvCxnSpPr>
+          <p:cNvPr id="37" name="Straight Arrow Connector 36">
+            <a:extLst>
+              <a:ext uri="{FF2B5EF4-FFF2-40B4-BE49-F238E27FC236}">
+                <a16:creationId xmlns:a16="http://schemas.microsoft.com/office/drawing/2014/main" id="{44A5F239-7617-6EF4-46BA-3F1C7E850E9F}"/>
+              </a:ext>
+            </a:extLst>
+          </p:cNvPr>
+          <p:cNvCxnSpPr>
+            <a:cxnSpLocks/>
+            <a:stCxn id="3" idx="2"/>
+            <a:endCxn id="5" idx="0"/>
+          </p:cNvCxnSpPr>
+          <p:nvPr/>
+        </p:nvCxnSpPr>
+        <p:spPr>
+          <a:xfrm>
+            <a:off x="4907293" y="1439331"/>
+            <a:ext cx="0" cy="584510"/>
+          </a:xfrm>
+          <a:prstGeom prst="straightConnector1">
+            <a:avLst/>
+          </a:prstGeom>
+          <a:ln>
+            <a:headEnd type="triangle" w="med" len="med"/>
+            <a:tailEnd type="triangle" w="med" len="med"/>
+          </a:ln>
+        </p:spPr>
+        <p:style>
+          <a:lnRef idx="2">
+            <a:schemeClr val="accent1"/>
+          </a:lnRef>
+          <a:fillRef idx="0">
+            <a:schemeClr val="accent1"/>
+          </a:fillRef>
+          <a:effectRef idx="1">
+            <a:schemeClr val="accent1"/>
+          </a:effectRef>
+          <a:fontRef idx="minor">
+            <a:schemeClr val="tx1"/>
+          </a:fontRef>
+        </p:style>
+      </p:cxnSp>
+      <p:sp>
+        <p:nvSpPr>
+          <p:cNvPr id="43" name="Rectangle: Rounded Corners 42">
+            <a:extLst>
+              <a:ext uri="{FF2B5EF4-FFF2-40B4-BE49-F238E27FC236}">
+                <a16:creationId xmlns:a16="http://schemas.microsoft.com/office/drawing/2014/main" id="{63ABF052-8AC8-89B8-4AA6-0DFE6E69EDB2}"/>
               </a:ext>
             </a:extLst>
           </p:cNvPr>
@@ -16986,8 +17266,8 @@
         </p:nvSpPr>
         <p:spPr>
           <a:xfrm>
-            <a:off x="603607" y="1965990"/>
-            <a:ext cx="640073" cy="365756"/>
+            <a:off x="4146851" y="5188427"/>
+            <a:ext cx="914390" cy="548634"/>
           </a:xfrm>
           <a:prstGeom prst="roundRect">
             <a:avLst/>
@@ -17015,18 +17295,18 @@
           <a:p>
             <a:pPr algn="ctr"/>
             <a:r>
-              <a:rPr lang="en-US" sz="1200" dirty="0"/>
-              <a:t>Clear</a:t>
-            </a:r>
-          </a:p>
-        </p:txBody>
-      </p:sp>
-      <p:sp>
-        <p:nvSpPr>
-          <p:cNvPr id="12" name="Rectangle: Rounded Corners 11">
-            <a:extLst>
-              <a:ext uri="{FF2B5EF4-FFF2-40B4-BE49-F238E27FC236}">
-                <a16:creationId xmlns:a16="http://schemas.microsoft.com/office/drawing/2014/main" id="{97024C57-3800-D7FA-5137-CFA1850D665B}"/>
+              <a:rPr lang="en-US" sz="900" dirty="0"/>
+              <a:t> Net score lookup in point table</a:t>
+            </a:r>
+          </a:p>
+        </p:txBody>
+      </p:sp>
+      <p:sp>
+        <p:nvSpPr>
+          <p:cNvPr id="44" name="Rectangle 43">
+            <a:extLst>
+              <a:ext uri="{FF2B5EF4-FFF2-40B4-BE49-F238E27FC236}">
+                <a16:creationId xmlns:a16="http://schemas.microsoft.com/office/drawing/2014/main" id="{8F626FEE-526B-524B-8F73-11601AECA52F}"/>
               </a:ext>
             </a:extLst>
           </p:cNvPr>
@@ -17035,10 +17315,10 @@
         </p:nvSpPr>
         <p:spPr>
           <a:xfrm>
-            <a:off x="2993127" y="1965976"/>
-            <a:ext cx="640073" cy="365756"/>
-          </a:xfrm>
-          <a:prstGeom prst="roundRect">
+            <a:off x="6406403" y="3337561"/>
+            <a:ext cx="700952" cy="389343"/>
+          </a:xfrm>
+          <a:prstGeom prst="rect">
             <a:avLst/>
           </a:prstGeom>
         </p:spPr>
@@ -17064,35 +17344,37 @@
           <a:p>
             <a:pPr algn="ctr"/>
             <a:r>
-              <a:rPr lang="en-US" sz="1200" dirty="0"/>
-              <a:t>Set</a:t>
+              <a:rPr lang="en-US" sz="900" dirty="0"/>
+              <a:t>Pt Table</a:t>
             </a:r>
           </a:p>
         </p:txBody>
       </p:sp>
       <p:cxnSp>
         <p:nvCxnSpPr>
-          <p:cNvPr id="14" name="Straight Arrow Connector 13">
-            <a:extLst>
-              <a:ext uri="{FF2B5EF4-FFF2-40B4-BE49-F238E27FC236}">
-                <a16:creationId xmlns:a16="http://schemas.microsoft.com/office/drawing/2014/main" id="{40CFBC97-1DCB-7A60-4649-FB39D5E8C80B}"/>
+          <p:cNvPr id="46" name="Connector: Elbow 45">
+            <a:extLst>
+              <a:ext uri="{FF2B5EF4-FFF2-40B4-BE49-F238E27FC236}">
+                <a16:creationId xmlns:a16="http://schemas.microsoft.com/office/drawing/2014/main" id="{1C7EFC76-94B9-28F7-C11E-B2072B9576D2}"/>
               </a:ext>
             </a:extLst>
           </p:cNvPr>
           <p:cNvCxnSpPr>
             <a:cxnSpLocks/>
-            <a:stCxn id="6" idx="1"/>
-            <a:endCxn id="11" idx="3"/>
+            <a:stCxn id="4" idx="0"/>
+            <a:endCxn id="2" idx="0"/>
           </p:cNvCxnSpPr>
           <p:nvPr/>
         </p:nvCxnSpPr>
         <p:spPr>
-          <a:xfrm flipH="1">
-            <a:off x="1243680" y="2148854"/>
-            <a:ext cx="554687" cy="14"/>
-          </a:xfrm>
-          <a:prstGeom prst="straightConnector1">
-            <a:avLst/>
+          <a:xfrm rot="16200000" flipH="1" flipV="1">
+            <a:off x="3363017" y="2390601"/>
+            <a:ext cx="45720" cy="2460693"/>
+          </a:xfrm>
+          <a:prstGeom prst="bentConnector3">
+            <a:avLst>
+              <a:gd name="adj1" fmla="val -500000"/>
+            </a:avLst>
           </a:prstGeom>
           <a:ln>
             <a:tailEnd type="triangle"/>
@@ -17115,30 +17397,250 @@
       </p:cxnSp>
       <p:cxnSp>
         <p:nvCxnSpPr>
-          <p:cNvPr id="18" name="Straight Arrow Connector 17">
-            <a:extLst>
-              <a:ext uri="{FF2B5EF4-FFF2-40B4-BE49-F238E27FC236}">
-                <a16:creationId xmlns:a16="http://schemas.microsoft.com/office/drawing/2014/main" id="{D0C4506D-646F-3EC5-1BD0-EE9B021B2FC6}"/>
+          <p:cNvPr id="50" name="Straight Arrow Connector 49">
+            <a:extLst>
+              <a:ext uri="{FF2B5EF4-FFF2-40B4-BE49-F238E27FC236}">
+                <a16:creationId xmlns:a16="http://schemas.microsoft.com/office/drawing/2014/main" id="{115B6C64-81A2-DDF9-85D3-73D97E9280BA}"/>
               </a:ext>
             </a:extLst>
           </p:cNvPr>
           <p:cNvCxnSpPr>
             <a:cxnSpLocks/>
-            <a:stCxn id="6" idx="3"/>
-            <a:endCxn id="12" idx="1"/>
+            <a:stCxn id="2" idx="3"/>
+            <a:endCxn id="4" idx="1"/>
           </p:cNvCxnSpPr>
           <p:nvPr/>
         </p:nvCxnSpPr>
         <p:spPr>
           <a:xfrm>
-            <a:off x="2438440" y="2148854"/>
-            <a:ext cx="554687" cy="0"/>
+            <a:off x="2475566" y="3826686"/>
+            <a:ext cx="1700215" cy="0"/>
           </a:xfrm>
           <a:prstGeom prst="straightConnector1">
             <a:avLst/>
           </a:prstGeom>
           <a:ln>
             <a:tailEnd type="triangle"/>
+          </a:ln>
+        </p:spPr>
+        <p:style>
+          <a:lnRef idx="2">
+            <a:schemeClr val="accent1"/>
+          </a:lnRef>
+          <a:fillRef idx="0">
+            <a:schemeClr val="accent1"/>
+          </a:fillRef>
+          <a:effectRef idx="1">
+            <a:schemeClr val="accent1"/>
+          </a:effectRef>
+          <a:fontRef idx="minor">
+            <a:schemeClr val="tx1"/>
+          </a:fontRef>
+        </p:style>
+      </p:cxnSp>
+      <p:cxnSp>
+        <p:nvCxnSpPr>
+          <p:cNvPr id="55" name="Straight Arrow Connector 54">
+            <a:extLst>
+              <a:ext uri="{FF2B5EF4-FFF2-40B4-BE49-F238E27FC236}">
+                <a16:creationId xmlns:a16="http://schemas.microsoft.com/office/drawing/2014/main" id="{6A429535-EA06-E183-12B8-6F4AA74E1926}"/>
+              </a:ext>
+            </a:extLst>
+          </p:cNvPr>
+          <p:cNvCxnSpPr>
+            <a:cxnSpLocks/>
+            <a:stCxn id="12" idx="3"/>
+            <a:endCxn id="43" idx="1"/>
+          </p:cNvCxnSpPr>
+          <p:nvPr/>
+        </p:nvCxnSpPr>
+        <p:spPr>
+          <a:xfrm>
+            <a:off x="2786007" y="5449842"/>
+            <a:ext cx="1360844" cy="12902"/>
+          </a:xfrm>
+          <a:prstGeom prst="straightConnector1">
+            <a:avLst/>
+          </a:prstGeom>
+          <a:ln>
+            <a:tailEnd type="triangle"/>
+          </a:ln>
+        </p:spPr>
+        <p:style>
+          <a:lnRef idx="2">
+            <a:schemeClr val="accent1"/>
+          </a:lnRef>
+          <a:fillRef idx="0">
+            <a:schemeClr val="accent1"/>
+          </a:fillRef>
+          <a:effectRef idx="1">
+            <a:schemeClr val="accent1"/>
+          </a:effectRef>
+          <a:fontRef idx="minor">
+            <a:schemeClr val="tx1"/>
+          </a:fontRef>
+        </p:style>
+      </p:cxnSp>
+      <p:cxnSp>
+        <p:nvCxnSpPr>
+          <p:cNvPr id="59" name="Connector: Elbow 58">
+            <a:extLst>
+              <a:ext uri="{FF2B5EF4-FFF2-40B4-BE49-F238E27FC236}">
+                <a16:creationId xmlns:a16="http://schemas.microsoft.com/office/drawing/2014/main" id="{C9965F67-C4BB-08CA-0AB1-3D53851E2F16}"/>
+              </a:ext>
+            </a:extLst>
+          </p:cNvPr>
+          <p:cNvCxnSpPr>
+            <a:cxnSpLocks/>
+            <a:stCxn id="43" idx="2"/>
+            <a:endCxn id="12" idx="2"/>
+          </p:cNvCxnSpPr>
+          <p:nvPr/>
+        </p:nvCxnSpPr>
+        <p:spPr>
+          <a:xfrm rot="5400000" flipH="1">
+            <a:off x="3392912" y="4525928"/>
+            <a:ext cx="104341" cy="2317927"/>
+          </a:xfrm>
+          <a:prstGeom prst="bentConnector3">
+            <a:avLst>
+              <a:gd name="adj1" fmla="val -219089"/>
+            </a:avLst>
+          </a:prstGeom>
+          <a:ln>
+            <a:tailEnd type="triangle"/>
+          </a:ln>
+        </p:spPr>
+        <p:style>
+          <a:lnRef idx="2">
+            <a:schemeClr val="accent1"/>
+          </a:lnRef>
+          <a:fillRef idx="0">
+            <a:schemeClr val="accent1"/>
+          </a:fillRef>
+          <a:effectRef idx="1">
+            <a:schemeClr val="accent1"/>
+          </a:effectRef>
+          <a:fontRef idx="minor">
+            <a:schemeClr val="tx1"/>
+          </a:fontRef>
+        </p:style>
+      </p:cxnSp>
+      <p:cxnSp>
+        <p:nvCxnSpPr>
+          <p:cNvPr id="64" name="Straight Arrow Connector 63">
+            <a:extLst>
+              <a:ext uri="{FF2B5EF4-FFF2-40B4-BE49-F238E27FC236}">
+                <a16:creationId xmlns:a16="http://schemas.microsoft.com/office/drawing/2014/main" id="{2BA8F321-AC2B-D4BF-1643-22DAF763FC04}"/>
+              </a:ext>
+            </a:extLst>
+          </p:cNvPr>
+          <p:cNvCxnSpPr>
+            <a:cxnSpLocks/>
+            <a:stCxn id="4" idx="2"/>
+            <a:endCxn id="43" idx="0"/>
+          </p:cNvCxnSpPr>
+          <p:nvPr/>
+        </p:nvCxnSpPr>
+        <p:spPr>
+          <a:xfrm flipH="1">
+            <a:off x="4604046" y="4055283"/>
+            <a:ext cx="12177" cy="1133144"/>
+          </a:xfrm>
+          <a:prstGeom prst="straightConnector1">
+            <a:avLst/>
+          </a:prstGeom>
+          <a:ln>
+            <a:headEnd type="triangle" w="med" len="med"/>
+            <a:tailEnd type="triangle" w="med" len="med"/>
+          </a:ln>
+        </p:spPr>
+        <p:style>
+          <a:lnRef idx="2">
+            <a:schemeClr val="accent1"/>
+          </a:lnRef>
+          <a:fillRef idx="0">
+            <a:schemeClr val="accent1"/>
+          </a:fillRef>
+          <a:effectRef idx="1">
+            <a:schemeClr val="accent1"/>
+          </a:effectRef>
+          <a:fontRef idx="minor">
+            <a:schemeClr val="tx1"/>
+          </a:fontRef>
+        </p:style>
+      </p:cxnSp>
+      <p:cxnSp>
+        <p:nvCxnSpPr>
+          <p:cNvPr id="73" name="Connector: Elbow 72">
+            <a:extLst>
+              <a:ext uri="{FF2B5EF4-FFF2-40B4-BE49-F238E27FC236}">
+                <a16:creationId xmlns:a16="http://schemas.microsoft.com/office/drawing/2014/main" id="{647B20AC-FFA9-1730-A570-E3500CF01A14}"/>
+              </a:ext>
+            </a:extLst>
+          </p:cNvPr>
+          <p:cNvCxnSpPr>
+            <a:cxnSpLocks/>
+            <a:stCxn id="43" idx="3"/>
+            <a:endCxn id="44" idx="2"/>
+          </p:cNvCxnSpPr>
+          <p:nvPr/>
+        </p:nvCxnSpPr>
+        <p:spPr>
+          <a:xfrm flipV="1">
+            <a:off x="5061241" y="3726904"/>
+            <a:ext cx="1695638" cy="1735840"/>
+          </a:xfrm>
+          <a:prstGeom prst="bentConnector2">
+            <a:avLst/>
+          </a:prstGeom>
+          <a:ln>
+            <a:headEnd type="triangle" w="med" len="med"/>
+            <a:tailEnd type="triangle" w="med" len="med"/>
+          </a:ln>
+        </p:spPr>
+        <p:style>
+          <a:lnRef idx="2">
+            <a:schemeClr val="accent1"/>
+          </a:lnRef>
+          <a:fillRef idx="0">
+            <a:schemeClr val="accent1"/>
+          </a:fillRef>
+          <a:effectRef idx="1">
+            <a:schemeClr val="accent1"/>
+          </a:effectRef>
+          <a:fontRef idx="minor">
+            <a:schemeClr val="tx1"/>
+          </a:fontRef>
+        </p:style>
+      </p:cxnSp>
+      <p:cxnSp>
+        <p:nvCxnSpPr>
+          <p:cNvPr id="76" name="Connector: Elbow 75">
+            <a:extLst>
+              <a:ext uri="{FF2B5EF4-FFF2-40B4-BE49-F238E27FC236}">
+                <a16:creationId xmlns:a16="http://schemas.microsoft.com/office/drawing/2014/main" id="{8DC7892F-EDFD-E52C-BDCC-AF8E973F4956}"/>
+              </a:ext>
+            </a:extLst>
+          </p:cNvPr>
+          <p:cNvCxnSpPr>
+            <a:cxnSpLocks/>
+            <a:stCxn id="5" idx="3"/>
+            <a:endCxn id="44" idx="0"/>
+          </p:cNvCxnSpPr>
+          <p:nvPr/>
+        </p:nvCxnSpPr>
+        <p:spPr>
+          <a:xfrm>
+            <a:off x="5364488" y="2298158"/>
+            <a:ext cx="1392391" cy="1039403"/>
+          </a:xfrm>
+          <a:prstGeom prst="bentConnector2">
+            <a:avLst/>
+          </a:prstGeom>
+          <a:ln>
+            <a:headEnd type="triangle" w="med" len="med"/>
+            <a:tailEnd type="triangle" w="med" len="med"/>
           </a:ln>
         </p:spPr>
         <p:style>

</xml_diff>

<commit_message>
June 2, 2024 Working on Summary Screen. Need to add team and player scores
</commit_message>
<xml_diff>
--- a/Documentation/TeamScoreLayout.pptx
+++ b/Documentation/TeamScoreLayout.pptx
@@ -841,7 +841,7 @@
           <a:p>
             <a:fld id="{955A69D3-FF78-44E1-BB41-3D13FA416A59}" type="datetimeFigureOut">
               <a:rPr lang="en-US" smtClean="0"/>
-              <a:t>05/14/24</a:t>
+              <a:t>06/02/24</a:t>
             </a:fld>
             <a:endParaRPr lang="en-US"/>
           </a:p>
@@ -1039,7 +1039,7 @@
           <a:p>
             <a:fld id="{955A69D3-FF78-44E1-BB41-3D13FA416A59}" type="datetimeFigureOut">
               <a:rPr lang="en-US" smtClean="0"/>
-              <a:t>05/14/24</a:t>
+              <a:t>06/02/24</a:t>
             </a:fld>
             <a:endParaRPr lang="en-US"/>
           </a:p>
@@ -1247,7 +1247,7 @@
           <a:p>
             <a:fld id="{955A69D3-FF78-44E1-BB41-3D13FA416A59}" type="datetimeFigureOut">
               <a:rPr lang="en-US" smtClean="0"/>
-              <a:t>05/14/24</a:t>
+              <a:t>06/02/24</a:t>
             </a:fld>
             <a:endParaRPr lang="en-US"/>
           </a:p>
@@ -1445,7 +1445,7 @@
           <a:p>
             <a:fld id="{955A69D3-FF78-44E1-BB41-3D13FA416A59}" type="datetimeFigureOut">
               <a:rPr lang="en-US" smtClean="0"/>
-              <a:t>05/14/24</a:t>
+              <a:t>06/02/24</a:t>
             </a:fld>
             <a:endParaRPr lang="en-US"/>
           </a:p>
@@ -1720,7 +1720,7 @@
           <a:p>
             <a:fld id="{955A69D3-FF78-44E1-BB41-3D13FA416A59}" type="datetimeFigureOut">
               <a:rPr lang="en-US" smtClean="0"/>
-              <a:t>05/14/24</a:t>
+              <a:t>06/02/24</a:t>
             </a:fld>
             <a:endParaRPr lang="en-US"/>
           </a:p>
@@ -1985,7 +1985,7 @@
           <a:p>
             <a:fld id="{955A69D3-FF78-44E1-BB41-3D13FA416A59}" type="datetimeFigureOut">
               <a:rPr lang="en-US" smtClean="0"/>
-              <a:t>05/14/24</a:t>
+              <a:t>06/02/24</a:t>
             </a:fld>
             <a:endParaRPr lang="en-US"/>
           </a:p>
@@ -2397,7 +2397,7 @@
           <a:p>
             <a:fld id="{955A69D3-FF78-44E1-BB41-3D13FA416A59}" type="datetimeFigureOut">
               <a:rPr lang="en-US" smtClean="0"/>
-              <a:t>05/14/24</a:t>
+              <a:t>06/02/24</a:t>
             </a:fld>
             <a:endParaRPr lang="en-US"/>
           </a:p>
@@ -2538,7 +2538,7 @@
           <a:p>
             <a:fld id="{955A69D3-FF78-44E1-BB41-3D13FA416A59}" type="datetimeFigureOut">
               <a:rPr lang="en-US" smtClean="0"/>
-              <a:t>05/14/24</a:t>
+              <a:t>06/02/24</a:t>
             </a:fld>
             <a:endParaRPr lang="en-US"/>
           </a:p>
@@ -2651,7 +2651,7 @@
           <a:p>
             <a:fld id="{955A69D3-FF78-44E1-BB41-3D13FA416A59}" type="datetimeFigureOut">
               <a:rPr lang="en-US" smtClean="0"/>
-              <a:t>05/14/24</a:t>
+              <a:t>06/02/24</a:t>
             </a:fld>
             <a:endParaRPr lang="en-US"/>
           </a:p>
@@ -2962,7 +2962,7 @@
           <a:p>
             <a:fld id="{955A69D3-FF78-44E1-BB41-3D13FA416A59}" type="datetimeFigureOut">
               <a:rPr lang="en-US" smtClean="0"/>
-              <a:t>05/14/24</a:t>
+              <a:t>06/02/24</a:t>
             </a:fld>
             <a:endParaRPr lang="en-US"/>
           </a:p>
@@ -3250,7 +3250,7 @@
           <a:p>
             <a:fld id="{955A69D3-FF78-44E1-BB41-3D13FA416A59}" type="datetimeFigureOut">
               <a:rPr lang="en-US" smtClean="0"/>
-              <a:t>05/14/24</a:t>
+              <a:t>06/02/24</a:t>
             </a:fld>
             <a:endParaRPr lang="en-US"/>
           </a:p>
@@ -3491,7 +3491,7 @@
           <a:p>
             <a:fld id="{955A69D3-FF78-44E1-BB41-3D13FA416A59}" type="datetimeFigureOut">
               <a:rPr lang="en-US" smtClean="0"/>
-              <a:t>05/14/24</a:t>
+              <a:t>06/02/24</a:t>
             </a:fld>
             <a:endParaRPr lang="en-US"/>
           </a:p>
@@ -19402,8 +19402,13 @@
           <a:p>
             <a:r>
               <a:rPr lang="en-US" sz="1000" dirty="0"/>
-              <a:t>Pars X	Player – XX	 ???</a:t>
-            </a:r>
+              <a:t>Pars X</a:t>
+            </a:r>
+            <a:r>
+              <a:rPr lang="en-US" sz="1000"/>
+              <a:t>	</a:t>
+            </a:r>
+            <a:endParaRPr lang="en-US" sz="1000" dirty="0"/>
           </a:p>
           <a:p>
             <a:r>

</xml_diff>

<commit_message>
July 7 - NY changes
</commit_message>
<xml_diff>
--- a/Documentation/TeamScoreLayout.pptx
+++ b/Documentation/TeamScoreLayout.pptx
@@ -22,6 +22,7 @@
     <p:sldId id="264" r:id="rId16"/>
     <p:sldId id="260" r:id="rId17"/>
     <p:sldId id="259" r:id="rId18"/>
+    <p:sldId id="276" r:id="rId19"/>
   </p:sldIdLst>
   <p:sldSz cx="12192000" cy="6858000"/>
   <p:notesSz cx="6858000" cy="9144000"/>
@@ -842,7 +843,7 @@
           <a:p>
             <a:fld id="{955A69D3-FF78-44E1-BB41-3D13FA416A59}" type="datetimeFigureOut">
               <a:rPr lang="en-US" smtClean="0"/>
-              <a:t>06/20/24</a:t>
+              <a:t>7/6/2024</a:t>
             </a:fld>
             <a:endParaRPr lang="en-US"/>
           </a:p>
@@ -1040,7 +1041,7 @@
           <a:p>
             <a:fld id="{955A69D3-FF78-44E1-BB41-3D13FA416A59}" type="datetimeFigureOut">
               <a:rPr lang="en-US" smtClean="0"/>
-              <a:t>06/20/24</a:t>
+              <a:t>7/6/2024</a:t>
             </a:fld>
             <a:endParaRPr lang="en-US"/>
           </a:p>
@@ -1248,7 +1249,7 @@
           <a:p>
             <a:fld id="{955A69D3-FF78-44E1-BB41-3D13FA416A59}" type="datetimeFigureOut">
               <a:rPr lang="en-US" smtClean="0"/>
-              <a:t>06/20/24</a:t>
+              <a:t>7/6/2024</a:t>
             </a:fld>
             <a:endParaRPr lang="en-US"/>
           </a:p>
@@ -1446,7 +1447,7 @@
           <a:p>
             <a:fld id="{955A69D3-FF78-44E1-BB41-3D13FA416A59}" type="datetimeFigureOut">
               <a:rPr lang="en-US" smtClean="0"/>
-              <a:t>06/20/24</a:t>
+              <a:t>7/6/2024</a:t>
             </a:fld>
             <a:endParaRPr lang="en-US"/>
           </a:p>
@@ -1721,7 +1722,7 @@
           <a:p>
             <a:fld id="{955A69D3-FF78-44E1-BB41-3D13FA416A59}" type="datetimeFigureOut">
               <a:rPr lang="en-US" smtClean="0"/>
-              <a:t>06/20/24</a:t>
+              <a:t>7/6/2024</a:t>
             </a:fld>
             <a:endParaRPr lang="en-US"/>
           </a:p>
@@ -1986,7 +1987,7 @@
           <a:p>
             <a:fld id="{955A69D3-FF78-44E1-BB41-3D13FA416A59}" type="datetimeFigureOut">
               <a:rPr lang="en-US" smtClean="0"/>
-              <a:t>06/20/24</a:t>
+              <a:t>7/6/2024</a:t>
             </a:fld>
             <a:endParaRPr lang="en-US"/>
           </a:p>
@@ -2398,7 +2399,7 @@
           <a:p>
             <a:fld id="{955A69D3-FF78-44E1-BB41-3D13FA416A59}" type="datetimeFigureOut">
               <a:rPr lang="en-US" smtClean="0"/>
-              <a:t>06/20/24</a:t>
+              <a:t>7/6/2024</a:t>
             </a:fld>
             <a:endParaRPr lang="en-US"/>
           </a:p>
@@ -2539,7 +2540,7 @@
           <a:p>
             <a:fld id="{955A69D3-FF78-44E1-BB41-3D13FA416A59}" type="datetimeFigureOut">
               <a:rPr lang="en-US" smtClean="0"/>
-              <a:t>06/20/24</a:t>
+              <a:t>7/6/2024</a:t>
             </a:fld>
             <a:endParaRPr lang="en-US"/>
           </a:p>
@@ -2652,7 +2653,7 @@
           <a:p>
             <a:fld id="{955A69D3-FF78-44E1-BB41-3D13FA416A59}" type="datetimeFigureOut">
               <a:rPr lang="en-US" smtClean="0"/>
-              <a:t>06/20/24</a:t>
+              <a:t>7/6/2024</a:t>
             </a:fld>
             <a:endParaRPr lang="en-US"/>
           </a:p>
@@ -2963,7 +2964,7 @@
           <a:p>
             <a:fld id="{955A69D3-FF78-44E1-BB41-3D13FA416A59}" type="datetimeFigureOut">
               <a:rPr lang="en-US" smtClean="0"/>
-              <a:t>06/20/24</a:t>
+              <a:t>7/6/2024</a:t>
             </a:fld>
             <a:endParaRPr lang="en-US"/>
           </a:p>
@@ -3251,7 +3252,7 @@
           <a:p>
             <a:fld id="{955A69D3-FF78-44E1-BB41-3D13FA416A59}" type="datetimeFigureOut">
               <a:rPr lang="en-US" smtClean="0"/>
-              <a:t>06/20/24</a:t>
+              <a:t>7/6/2024</a:t>
             </a:fld>
             <a:endParaRPr lang="en-US"/>
           </a:p>
@@ -3492,7 +3493,7 @@
           <a:p>
             <a:fld id="{955A69D3-FF78-44E1-BB41-3D13FA416A59}" type="datetimeFigureOut">
               <a:rPr lang="en-US" smtClean="0"/>
-              <a:t>06/20/24</a:t>
+              <a:t>7/6/2024</a:t>
             </a:fld>
             <a:endParaRPr lang="en-US"/>
           </a:p>
@@ -17402,7 +17403,7 @@
         </p:nvSpPr>
         <p:spPr>
           <a:xfrm>
-            <a:off x="5062421" y="3582908"/>
+            <a:off x="5062421" y="3674337"/>
             <a:ext cx="1590392" cy="606583"/>
           </a:xfrm>
           <a:prstGeom prst="rect">
@@ -18310,7 +18311,352 @@
                 <a:effectLst/>
                 <a:latin typeface="JetBrains Mono"/>
               </a:rPr>
-              <a:t>mJunk</a:t>
+              <a:t>mScoreCardRecFk</a:t>
+            </a:r>
+            <a:r>
+              <a:rPr lang="en-US" sz="1000" dirty="0">
+                <a:solidFill>
+                  <a:srgbClr val="080808"/>
+                </a:solidFill>
+                <a:effectLst/>
+                <a:latin typeface="JetBrains Mono"/>
+              </a:rPr>
+              <a:t>: Int = SCORE_CARD_REC_ID,    </a:t>
+            </a:r>
+          </a:p>
+          <a:p>
+            <a:r>
+              <a:rPr lang="en-US" sz="1000" dirty="0">
+                <a:solidFill>
+                  <a:srgbClr val="080808"/>
+                </a:solidFill>
+                <a:effectLst/>
+                <a:latin typeface="JetBrains Mono"/>
+              </a:rPr>
+              <a:t>    @PrimaryKey(autoGenerate = false)    // default is false</a:t>
+            </a:r>
+          </a:p>
+          <a:p>
+            <a:r>
+              <a:rPr lang="en-US" sz="1000" dirty="0">
+                <a:solidFill>
+                  <a:srgbClr val="080808"/>
+                </a:solidFill>
+                <a:effectLst/>
+                <a:latin typeface="JetBrains Mono"/>
+              </a:rPr>
+              <a:t>    </a:t>
+            </a:r>
+            <a:r>
+              <a:rPr lang="en-US" sz="1000" dirty="0" err="1">
+                <a:solidFill>
+                  <a:srgbClr val="080808"/>
+                </a:solidFill>
+                <a:effectLst/>
+                <a:latin typeface="JetBrains Mono"/>
+              </a:rPr>
+              <a:t>val</a:t>
+            </a:r>
+            <a:r>
+              <a:rPr lang="en-US" sz="1000" dirty="0">
+                <a:solidFill>
+                  <a:srgbClr val="080808"/>
+                </a:solidFill>
+                <a:effectLst/>
+                <a:latin typeface="JetBrains Mono"/>
+              </a:rPr>
+              <a:t> mId: Int = 0</a:t>
+            </a:r>
+          </a:p>
+          <a:p>
+            <a:r>
+              <a:rPr lang="en-US" sz="1000" dirty="0">
+                <a:solidFill>
+                  <a:srgbClr val="080808"/>
+                </a:solidFill>
+                <a:effectLst/>
+                <a:latin typeface="JetBrains Mono"/>
+              </a:rPr>
+              <a:t>)</a:t>
+            </a:r>
+          </a:p>
+        </p:txBody>
+      </p:sp>
+      <p:sp>
+        <p:nvSpPr>
+          <p:cNvPr id="6" name="Rectangle: Rounded Corners 5">
+            <a:extLst>
+              <a:ext uri="{FF2B5EF4-FFF2-40B4-BE49-F238E27FC236}">
+                <a16:creationId xmlns:a16="http://schemas.microsoft.com/office/drawing/2014/main" id="{49A81414-FFBC-479C-04B4-D8028A2BC2FE}"/>
+              </a:ext>
+            </a:extLst>
+          </p:cNvPr>
+          <p:cNvSpPr/>
+          <p:nvPr/>
+        </p:nvSpPr>
+        <p:spPr>
+          <a:xfrm>
+            <a:off x="8839170" y="228636"/>
+            <a:ext cx="2634557" cy="1611781"/>
+          </a:xfrm>
+          <a:prstGeom prst="roundRect">
+            <a:avLst/>
+          </a:prstGeom>
+        </p:spPr>
+        <p:style>
+          <a:lnRef idx="2">
+            <a:schemeClr val="accent1"/>
+          </a:lnRef>
+          <a:fillRef idx="1">
+            <a:schemeClr val="lt1"/>
+          </a:fillRef>
+          <a:effectRef idx="0">
+            <a:schemeClr val="accent1"/>
+          </a:effectRef>
+          <a:fontRef idx="minor">
+            <a:schemeClr val="dk1"/>
+          </a:fontRef>
+        </p:style>
+        <p:txBody>
+          <a:bodyPr rtlCol="0" anchor="ctr"/>
+          <a:lstStyle/>
+          <a:p>
+            <a:r>
+              <a:rPr lang="en-US" sz="1200" dirty="0">
+                <a:solidFill>
+                  <a:srgbClr val="9E880D"/>
+                </a:solidFill>
+                <a:effectLst/>
+                <a:latin typeface="JetBrains Mono"/>
+              </a:rPr>
+              <a:t>@Entity </a:t>
+            </a:r>
+            <a:r>
+              <a:rPr lang="en-US" sz="1200" dirty="0">
+                <a:solidFill>
+                  <a:srgbClr val="080808"/>
+                </a:solidFill>
+                <a:effectLst/>
+                <a:latin typeface="JetBrains Mono"/>
+              </a:rPr>
+              <a:t>(</a:t>
+            </a:r>
+            <a:r>
+              <a:rPr lang="en-US" sz="1200" dirty="0" err="1">
+                <a:solidFill>
+                  <a:srgbClr val="080808"/>
+                </a:solidFill>
+                <a:effectLst/>
+                <a:latin typeface="JetBrains Mono"/>
+              </a:rPr>
+              <a:t>tableName</a:t>
+            </a:r>
+            <a:r>
+              <a:rPr lang="en-US" sz="1200" dirty="0">
+                <a:solidFill>
+                  <a:srgbClr val="080808"/>
+                </a:solidFill>
+                <a:effectLst/>
+                <a:latin typeface="JetBrains Mono"/>
+              </a:rPr>
+              <a:t> = </a:t>
+            </a:r>
+            <a:r>
+              <a:rPr lang="en-US" sz="1200" dirty="0">
+                <a:solidFill>
+                  <a:srgbClr val="067D17"/>
+                </a:solidFill>
+                <a:effectLst/>
+                <a:latin typeface="JetBrains Mono"/>
+              </a:rPr>
+              <a:t>"</a:t>
+            </a:r>
+            <a:r>
+              <a:rPr lang="en-US" sz="1200" dirty="0" err="1">
+                <a:solidFill>
+                  <a:srgbClr val="067D17"/>
+                </a:solidFill>
+                <a:effectLst/>
+                <a:latin typeface="JetBrains Mono"/>
+              </a:rPr>
+              <a:t>course_tbl</a:t>
+            </a:r>
+            <a:r>
+              <a:rPr lang="en-US" sz="1200" dirty="0">
+                <a:solidFill>
+                  <a:srgbClr val="067D17"/>
+                </a:solidFill>
+                <a:effectLst/>
+                <a:latin typeface="JetBrains Mono"/>
+              </a:rPr>
+              <a:t>"</a:t>
+            </a:r>
+            <a:r>
+              <a:rPr lang="en-US" sz="1200" dirty="0">
+                <a:solidFill>
+                  <a:srgbClr val="080808"/>
+                </a:solidFill>
+                <a:effectLst/>
+                <a:latin typeface="JetBrains Mono"/>
+              </a:rPr>
+              <a:t>)</a:t>
+            </a:r>
+          </a:p>
+          <a:p>
+            <a:r>
+              <a:rPr lang="en-US" sz="1000" dirty="0">
+                <a:solidFill>
+                  <a:srgbClr val="080808"/>
+                </a:solidFill>
+                <a:effectLst/>
+                <a:latin typeface="JetBrains Mono"/>
+              </a:rPr>
+              <a:t>data CourseListRecord class(</a:t>
+            </a:r>
+          </a:p>
+          <a:p>
+            <a:r>
+              <a:rPr lang="en-US" sz="1000" dirty="0">
+                <a:solidFill>
+                  <a:srgbClr val="080808"/>
+                </a:solidFill>
+                <a:latin typeface="JetBrains Mono"/>
+              </a:rPr>
+              <a:t>   </a:t>
+            </a:r>
+            <a:r>
+              <a:rPr lang="en-US" sz="1000" dirty="0" err="1">
+                <a:solidFill>
+                  <a:srgbClr val="080808"/>
+                </a:solidFill>
+                <a:effectLst/>
+                <a:latin typeface="JetBrains Mono"/>
+              </a:rPr>
+              <a:t>val</a:t>
+            </a:r>
+            <a:r>
+              <a:rPr lang="en-US" sz="1000" dirty="0">
+                <a:solidFill>
+                  <a:srgbClr val="080808"/>
+                </a:solidFill>
+                <a:effectLst/>
+                <a:latin typeface="JetBrains Mono"/>
+              </a:rPr>
+              <a:t>   </a:t>
+            </a:r>
+            <a:r>
+              <a:rPr lang="en-US" sz="1000" dirty="0" err="1">
+                <a:solidFill>
+                  <a:srgbClr val="080808"/>
+                </a:solidFill>
+                <a:effectLst/>
+                <a:latin typeface="JetBrains Mono"/>
+              </a:rPr>
+              <a:t>mCoursename</a:t>
+            </a:r>
+            <a:r>
+              <a:rPr lang="en-US" sz="1000" dirty="0">
+                <a:solidFill>
+                  <a:srgbClr val="080808"/>
+                </a:solidFill>
+                <a:effectLst/>
+                <a:latin typeface="JetBrains Mono"/>
+              </a:rPr>
+              <a:t>: String,</a:t>
+            </a:r>
+          </a:p>
+          <a:p>
+            <a:r>
+              <a:rPr lang="en-US" sz="1000" dirty="0">
+                <a:solidFill>
+                  <a:srgbClr val="080808"/>
+                </a:solidFill>
+                <a:effectLst/>
+                <a:latin typeface="JetBrains Mono"/>
+              </a:rPr>
+              <a:t>    </a:t>
+            </a:r>
+            <a:r>
+              <a:rPr lang="en-US" sz="1000" dirty="0" err="1">
+                <a:solidFill>
+                  <a:srgbClr val="080808"/>
+                </a:solidFill>
+                <a:effectLst/>
+                <a:latin typeface="JetBrains Mono"/>
+              </a:rPr>
+              <a:t>val</a:t>
+            </a:r>
+            <a:r>
+              <a:rPr lang="en-US" sz="1000" dirty="0">
+                <a:solidFill>
+                  <a:srgbClr val="080808"/>
+                </a:solidFill>
+                <a:effectLst/>
+                <a:latin typeface="JetBrains Mono"/>
+              </a:rPr>
+              <a:t> </a:t>
+            </a:r>
+            <a:r>
+              <a:rPr lang="en-US" sz="1000" dirty="0" err="1">
+                <a:solidFill>
+                  <a:srgbClr val="080808"/>
+                </a:solidFill>
+                <a:effectLst/>
+                <a:latin typeface="JetBrains Mono"/>
+              </a:rPr>
+              <a:t>mUsstate</a:t>
+            </a:r>
+            <a:r>
+              <a:rPr lang="en-US" sz="1000" dirty="0">
+                <a:solidFill>
+                  <a:srgbClr val="080808"/>
+                </a:solidFill>
+                <a:effectLst/>
+                <a:latin typeface="JetBrains Mono"/>
+              </a:rPr>
+              <a:t>: String? = "NC",</a:t>
+            </a:r>
+          </a:p>
+          <a:p>
+            <a:r>
+              <a:rPr lang="en-US" sz="1000" dirty="0">
+                <a:solidFill>
+                  <a:srgbClr val="080808"/>
+                </a:solidFill>
+                <a:effectLst/>
+                <a:latin typeface="JetBrains Mono"/>
+              </a:rPr>
+              <a:t>    </a:t>
+            </a:r>
+            <a:r>
+              <a:rPr lang="en-US" sz="1000" dirty="0" err="1">
+                <a:solidFill>
+                  <a:srgbClr val="080808"/>
+                </a:solidFill>
+                <a:effectLst/>
+                <a:latin typeface="JetBrains Mono"/>
+              </a:rPr>
+              <a:t>val</a:t>
+            </a:r>
+            <a:r>
+              <a:rPr lang="en-US" sz="1000" dirty="0">
+                <a:solidFill>
+                  <a:srgbClr val="080808"/>
+                </a:solidFill>
+                <a:effectLst/>
+                <a:latin typeface="JetBrains Mono"/>
+              </a:rPr>
+              <a:t> </a:t>
+            </a:r>
+            <a:r>
+              <a:rPr lang="en-US" sz="1000" dirty="0" err="1">
+                <a:solidFill>
+                  <a:srgbClr val="080808"/>
+                </a:solidFill>
+                <a:effectLst/>
+                <a:latin typeface="JetBrains Mono"/>
+              </a:rPr>
+              <a:t>mPar</a:t>
             </a:r>
             <a:r>
               <a:rPr lang="en-US" sz="1000" dirty="0">
@@ -18340,7 +18686,59 @@
                 <a:effectLst/>
                 <a:latin typeface="JetBrains Mono"/>
               </a:rPr>
-              <a:t> = </a:t>
+              <a:t>,</a:t>
+            </a:r>
+          </a:p>
+          <a:p>
+            <a:r>
+              <a:rPr lang="en-US" sz="1000" dirty="0">
+                <a:solidFill>
+                  <a:srgbClr val="080808"/>
+                </a:solidFill>
+                <a:effectLst/>
+                <a:latin typeface="JetBrains Mono"/>
+              </a:rPr>
+              <a:t>    </a:t>
+            </a:r>
+            <a:r>
+              <a:rPr lang="en-US" sz="1000" dirty="0" err="1">
+                <a:solidFill>
+                  <a:srgbClr val="080808"/>
+                </a:solidFill>
+                <a:effectLst/>
+                <a:latin typeface="JetBrains Mono"/>
+              </a:rPr>
+              <a:t>val</a:t>
+            </a:r>
+            <a:r>
+              <a:rPr lang="en-US" sz="1000" dirty="0">
+                <a:solidFill>
+                  <a:srgbClr val="080808"/>
+                </a:solidFill>
+                <a:effectLst/>
+                <a:latin typeface="JetBrains Mono"/>
+              </a:rPr>
+              <a:t> </a:t>
+            </a:r>
+            <a:r>
+              <a:rPr lang="en-US" sz="1000" dirty="0" err="1">
+                <a:solidFill>
+                  <a:srgbClr val="080808"/>
+                </a:solidFill>
+                <a:effectLst/>
+                <a:latin typeface="JetBrains Mono"/>
+              </a:rPr>
+              <a:t>mHandicap</a:t>
+            </a:r>
+            <a:r>
+              <a:rPr lang="en-US" sz="1000" dirty="0">
+                <a:solidFill>
+                  <a:srgbClr val="080808"/>
+                </a:solidFill>
+                <a:effectLst/>
+                <a:latin typeface="JetBrains Mono"/>
+              </a:rPr>
+              <a:t>: </a:t>
             </a:r>
             <a:r>
               <a:rPr lang="en-US" sz="1000" dirty="0" err="1">
@@ -18360,7 +18758,7 @@
                 <a:effectLst/>
                 <a:latin typeface="JetBrains Mono"/>
               </a:rPr>
-              <a:t>(HOLE_ARRAY_SIZE),</a:t>
+              <a:t>,</a:t>
             </a:r>
           </a:p>
           <a:p>
@@ -18402,7 +18800,7 @@
                 <a:effectLst/>
                 <a:latin typeface="JetBrains Mono"/>
               </a:rPr>
-              <a:t>mScoreCardRecFk</a:t>
+              <a:t>mNotes:Array</a:t>
             </a:r>
             <a:r>
               <a:rPr lang="en-US" sz="1000" dirty="0">
@@ -18412,7 +18810,7 @@
                 <a:effectLst/>
                 <a:latin typeface="JetBrains Mono"/>
               </a:rPr>
-              <a:t>: Int = SCORE_CARD_REC_ID,    </a:t>
+              <a:t>&lt;String&gt;,</a:t>
             </a:r>
           </a:p>
           <a:p>
@@ -18424,7 +18822,7 @@
                 <a:effectLst/>
                 <a:latin typeface="JetBrains Mono"/>
               </a:rPr>
-              <a:t>    @PrimaryKey(autoGenerate = false)    // default is false</a:t>
+              <a:t>    @PrimaryKey(autoGenerate = true)</a:t>
             </a:r>
           </a:p>
           <a:p>
@@ -18456,495 +18854,6 @@
                 <a:effectLst/>
                 <a:latin typeface="JetBrains Mono"/>
               </a:rPr>
-              <a:t> mId: Int = 0</a:t>
-            </a:r>
-          </a:p>
-          <a:p>
-            <a:r>
-              <a:rPr lang="en-US" sz="1000" dirty="0">
-                <a:solidFill>
-                  <a:srgbClr val="080808"/>
-                </a:solidFill>
-                <a:effectLst/>
-                <a:latin typeface="JetBrains Mono"/>
-              </a:rPr>
-              <a:t>)</a:t>
-            </a:r>
-          </a:p>
-        </p:txBody>
-      </p:sp>
-      <p:sp>
-        <p:nvSpPr>
-          <p:cNvPr id="6" name="Rectangle: Rounded Corners 5">
-            <a:extLst>
-              <a:ext uri="{FF2B5EF4-FFF2-40B4-BE49-F238E27FC236}">
-                <a16:creationId xmlns:a16="http://schemas.microsoft.com/office/drawing/2014/main" id="{49A81414-FFBC-479C-04B4-D8028A2BC2FE}"/>
-              </a:ext>
-            </a:extLst>
-          </p:cNvPr>
-          <p:cNvSpPr/>
-          <p:nvPr/>
-        </p:nvSpPr>
-        <p:spPr>
-          <a:xfrm>
-            <a:off x="8839170" y="228636"/>
-            <a:ext cx="2634557" cy="1611781"/>
-          </a:xfrm>
-          <a:prstGeom prst="roundRect">
-            <a:avLst/>
-          </a:prstGeom>
-        </p:spPr>
-        <p:style>
-          <a:lnRef idx="2">
-            <a:schemeClr val="accent1"/>
-          </a:lnRef>
-          <a:fillRef idx="1">
-            <a:schemeClr val="lt1"/>
-          </a:fillRef>
-          <a:effectRef idx="0">
-            <a:schemeClr val="accent1"/>
-          </a:effectRef>
-          <a:fontRef idx="minor">
-            <a:schemeClr val="dk1"/>
-          </a:fontRef>
-        </p:style>
-        <p:txBody>
-          <a:bodyPr rtlCol="0" anchor="ctr"/>
-          <a:lstStyle/>
-          <a:p>
-            <a:r>
-              <a:rPr lang="en-US" sz="1200" dirty="0">
-                <a:solidFill>
-                  <a:srgbClr val="9E880D"/>
-                </a:solidFill>
-                <a:effectLst/>
-                <a:latin typeface="JetBrains Mono"/>
-              </a:rPr>
-              <a:t>@Entity </a:t>
-            </a:r>
-            <a:r>
-              <a:rPr lang="en-US" sz="1200" dirty="0">
-                <a:solidFill>
-                  <a:srgbClr val="080808"/>
-                </a:solidFill>
-                <a:effectLst/>
-                <a:latin typeface="JetBrains Mono"/>
-              </a:rPr>
-              <a:t>(</a:t>
-            </a:r>
-            <a:r>
-              <a:rPr lang="en-US" sz="1200" dirty="0" err="1">
-                <a:solidFill>
-                  <a:srgbClr val="080808"/>
-                </a:solidFill>
-                <a:effectLst/>
-                <a:latin typeface="JetBrains Mono"/>
-              </a:rPr>
-              <a:t>tableName</a:t>
-            </a:r>
-            <a:r>
-              <a:rPr lang="en-US" sz="1200" dirty="0">
-                <a:solidFill>
-                  <a:srgbClr val="080808"/>
-                </a:solidFill>
-                <a:effectLst/>
-                <a:latin typeface="JetBrains Mono"/>
-              </a:rPr>
-              <a:t> = </a:t>
-            </a:r>
-            <a:r>
-              <a:rPr lang="en-US" sz="1200" dirty="0">
-                <a:solidFill>
-                  <a:srgbClr val="067D17"/>
-                </a:solidFill>
-                <a:effectLst/>
-                <a:latin typeface="JetBrains Mono"/>
-              </a:rPr>
-              <a:t>"</a:t>
-            </a:r>
-            <a:r>
-              <a:rPr lang="en-US" sz="1200" dirty="0" err="1">
-                <a:solidFill>
-                  <a:srgbClr val="067D17"/>
-                </a:solidFill>
-                <a:effectLst/>
-                <a:latin typeface="JetBrains Mono"/>
-              </a:rPr>
-              <a:t>course_tbl</a:t>
-            </a:r>
-            <a:r>
-              <a:rPr lang="en-US" sz="1200" dirty="0">
-                <a:solidFill>
-                  <a:srgbClr val="067D17"/>
-                </a:solidFill>
-                <a:effectLst/>
-                <a:latin typeface="JetBrains Mono"/>
-              </a:rPr>
-              <a:t>"</a:t>
-            </a:r>
-            <a:r>
-              <a:rPr lang="en-US" sz="1200" dirty="0">
-                <a:solidFill>
-                  <a:srgbClr val="080808"/>
-                </a:solidFill>
-                <a:effectLst/>
-                <a:latin typeface="JetBrains Mono"/>
-              </a:rPr>
-              <a:t>)</a:t>
-            </a:r>
-          </a:p>
-          <a:p>
-            <a:r>
-              <a:rPr lang="en-US" sz="1000" dirty="0">
-                <a:solidFill>
-                  <a:srgbClr val="080808"/>
-                </a:solidFill>
-                <a:effectLst/>
-                <a:latin typeface="JetBrains Mono"/>
-              </a:rPr>
-              <a:t>data CourseListRecord class(</a:t>
-            </a:r>
-          </a:p>
-          <a:p>
-            <a:r>
-              <a:rPr lang="en-US" sz="1000" dirty="0">
-                <a:solidFill>
-                  <a:srgbClr val="080808"/>
-                </a:solidFill>
-                <a:latin typeface="JetBrains Mono"/>
-              </a:rPr>
-              <a:t>   </a:t>
-            </a:r>
-            <a:r>
-              <a:rPr lang="en-US" sz="1000" dirty="0" err="1">
-                <a:solidFill>
-                  <a:srgbClr val="080808"/>
-                </a:solidFill>
-                <a:effectLst/>
-                <a:latin typeface="JetBrains Mono"/>
-              </a:rPr>
-              <a:t>val</a:t>
-            </a:r>
-            <a:r>
-              <a:rPr lang="en-US" sz="1000" dirty="0">
-                <a:solidFill>
-                  <a:srgbClr val="080808"/>
-                </a:solidFill>
-                <a:effectLst/>
-                <a:latin typeface="JetBrains Mono"/>
-              </a:rPr>
-              <a:t>   </a:t>
-            </a:r>
-            <a:r>
-              <a:rPr lang="en-US" sz="1000" dirty="0" err="1">
-                <a:solidFill>
-                  <a:srgbClr val="080808"/>
-                </a:solidFill>
-                <a:effectLst/>
-                <a:latin typeface="JetBrains Mono"/>
-              </a:rPr>
-              <a:t>mCoursename</a:t>
-            </a:r>
-            <a:r>
-              <a:rPr lang="en-US" sz="1000" dirty="0">
-                <a:solidFill>
-                  <a:srgbClr val="080808"/>
-                </a:solidFill>
-                <a:effectLst/>
-                <a:latin typeface="JetBrains Mono"/>
-              </a:rPr>
-              <a:t>: String,</a:t>
-            </a:r>
-          </a:p>
-          <a:p>
-            <a:r>
-              <a:rPr lang="en-US" sz="1000" dirty="0">
-                <a:solidFill>
-                  <a:srgbClr val="080808"/>
-                </a:solidFill>
-                <a:effectLst/>
-                <a:latin typeface="JetBrains Mono"/>
-              </a:rPr>
-              <a:t>    </a:t>
-            </a:r>
-            <a:r>
-              <a:rPr lang="en-US" sz="1000" dirty="0" err="1">
-                <a:solidFill>
-                  <a:srgbClr val="080808"/>
-                </a:solidFill>
-                <a:effectLst/>
-                <a:latin typeface="JetBrains Mono"/>
-              </a:rPr>
-              <a:t>val</a:t>
-            </a:r>
-            <a:r>
-              <a:rPr lang="en-US" sz="1000" dirty="0">
-                <a:solidFill>
-                  <a:srgbClr val="080808"/>
-                </a:solidFill>
-                <a:effectLst/>
-                <a:latin typeface="JetBrains Mono"/>
-              </a:rPr>
-              <a:t> </a:t>
-            </a:r>
-            <a:r>
-              <a:rPr lang="en-US" sz="1000" dirty="0" err="1">
-                <a:solidFill>
-                  <a:srgbClr val="080808"/>
-                </a:solidFill>
-                <a:effectLst/>
-                <a:latin typeface="JetBrains Mono"/>
-              </a:rPr>
-              <a:t>mUsstate</a:t>
-            </a:r>
-            <a:r>
-              <a:rPr lang="en-US" sz="1000" dirty="0">
-                <a:solidFill>
-                  <a:srgbClr val="080808"/>
-                </a:solidFill>
-                <a:effectLst/>
-                <a:latin typeface="JetBrains Mono"/>
-              </a:rPr>
-              <a:t>: String? = "NC",</a:t>
-            </a:r>
-          </a:p>
-          <a:p>
-            <a:r>
-              <a:rPr lang="en-US" sz="1000" dirty="0">
-                <a:solidFill>
-                  <a:srgbClr val="080808"/>
-                </a:solidFill>
-                <a:effectLst/>
-                <a:latin typeface="JetBrains Mono"/>
-              </a:rPr>
-              <a:t>    </a:t>
-            </a:r>
-            <a:r>
-              <a:rPr lang="en-US" sz="1000" dirty="0" err="1">
-                <a:solidFill>
-                  <a:srgbClr val="080808"/>
-                </a:solidFill>
-                <a:effectLst/>
-                <a:latin typeface="JetBrains Mono"/>
-              </a:rPr>
-              <a:t>val</a:t>
-            </a:r>
-            <a:r>
-              <a:rPr lang="en-US" sz="1000" dirty="0">
-                <a:solidFill>
-                  <a:srgbClr val="080808"/>
-                </a:solidFill>
-                <a:effectLst/>
-                <a:latin typeface="JetBrains Mono"/>
-              </a:rPr>
-              <a:t> </a:t>
-            </a:r>
-            <a:r>
-              <a:rPr lang="en-US" sz="1000" dirty="0" err="1">
-                <a:solidFill>
-                  <a:srgbClr val="080808"/>
-                </a:solidFill>
-                <a:effectLst/>
-                <a:latin typeface="JetBrains Mono"/>
-              </a:rPr>
-              <a:t>mPar</a:t>
-            </a:r>
-            <a:r>
-              <a:rPr lang="en-US" sz="1000" dirty="0">
-                <a:solidFill>
-                  <a:srgbClr val="080808"/>
-                </a:solidFill>
-                <a:effectLst/>
-                <a:latin typeface="JetBrains Mono"/>
-              </a:rPr>
-              <a:t>: </a:t>
-            </a:r>
-            <a:r>
-              <a:rPr lang="en-US" sz="1000" dirty="0" err="1">
-                <a:solidFill>
-                  <a:srgbClr val="080808"/>
-                </a:solidFill>
-                <a:effectLst/>
-                <a:latin typeface="JetBrains Mono"/>
-              </a:rPr>
-              <a:t>IntArray</a:t>
-            </a:r>
-            <a:r>
-              <a:rPr lang="en-US" sz="1000" dirty="0">
-                <a:solidFill>
-                  <a:srgbClr val="080808"/>
-                </a:solidFill>
-                <a:effectLst/>
-                <a:latin typeface="JetBrains Mono"/>
-              </a:rPr>
-              <a:t>,</a:t>
-            </a:r>
-          </a:p>
-          <a:p>
-            <a:r>
-              <a:rPr lang="en-US" sz="1000" dirty="0">
-                <a:solidFill>
-                  <a:srgbClr val="080808"/>
-                </a:solidFill>
-                <a:effectLst/>
-                <a:latin typeface="JetBrains Mono"/>
-              </a:rPr>
-              <a:t>    </a:t>
-            </a:r>
-            <a:r>
-              <a:rPr lang="en-US" sz="1000" dirty="0" err="1">
-                <a:solidFill>
-                  <a:srgbClr val="080808"/>
-                </a:solidFill>
-                <a:effectLst/>
-                <a:latin typeface="JetBrains Mono"/>
-              </a:rPr>
-              <a:t>val</a:t>
-            </a:r>
-            <a:r>
-              <a:rPr lang="en-US" sz="1000" dirty="0">
-                <a:solidFill>
-                  <a:srgbClr val="080808"/>
-                </a:solidFill>
-                <a:effectLst/>
-                <a:latin typeface="JetBrains Mono"/>
-              </a:rPr>
-              <a:t> </a:t>
-            </a:r>
-            <a:r>
-              <a:rPr lang="en-US" sz="1000" dirty="0" err="1">
-                <a:solidFill>
-                  <a:srgbClr val="080808"/>
-                </a:solidFill>
-                <a:effectLst/>
-                <a:latin typeface="JetBrains Mono"/>
-              </a:rPr>
-              <a:t>mHandicap</a:t>
-            </a:r>
-            <a:r>
-              <a:rPr lang="en-US" sz="1000" dirty="0">
-                <a:solidFill>
-                  <a:srgbClr val="080808"/>
-                </a:solidFill>
-                <a:effectLst/>
-                <a:latin typeface="JetBrains Mono"/>
-              </a:rPr>
-              <a:t>: </a:t>
-            </a:r>
-            <a:r>
-              <a:rPr lang="en-US" sz="1000" dirty="0" err="1">
-                <a:solidFill>
-                  <a:srgbClr val="080808"/>
-                </a:solidFill>
-                <a:effectLst/>
-                <a:latin typeface="JetBrains Mono"/>
-              </a:rPr>
-              <a:t>IntArray</a:t>
-            </a:r>
-            <a:r>
-              <a:rPr lang="en-US" sz="1000" dirty="0">
-                <a:solidFill>
-                  <a:srgbClr val="080808"/>
-                </a:solidFill>
-                <a:effectLst/>
-                <a:latin typeface="JetBrains Mono"/>
-              </a:rPr>
-              <a:t>,</a:t>
-            </a:r>
-          </a:p>
-          <a:p>
-            <a:r>
-              <a:rPr lang="en-US" sz="1000" dirty="0">
-                <a:solidFill>
-                  <a:srgbClr val="080808"/>
-                </a:solidFill>
-                <a:effectLst/>
-                <a:latin typeface="JetBrains Mono"/>
-              </a:rPr>
-              <a:t>    </a:t>
-            </a:r>
-            <a:r>
-              <a:rPr lang="en-US" sz="1000" dirty="0" err="1">
-                <a:solidFill>
-                  <a:srgbClr val="080808"/>
-                </a:solidFill>
-                <a:effectLst/>
-                <a:latin typeface="JetBrains Mono"/>
-              </a:rPr>
-              <a:t>val</a:t>
-            </a:r>
-            <a:r>
-              <a:rPr lang="en-US" sz="1000" dirty="0">
-                <a:solidFill>
-                  <a:srgbClr val="080808"/>
-                </a:solidFill>
-                <a:effectLst/>
-                <a:latin typeface="JetBrains Mono"/>
-              </a:rPr>
-              <a:t> </a:t>
-            </a:r>
-            <a:r>
-              <a:rPr lang="en-US" sz="1000" dirty="0" err="1">
-                <a:solidFill>
-                  <a:srgbClr val="080808"/>
-                </a:solidFill>
-                <a:effectLst/>
-                <a:latin typeface="JetBrains Mono"/>
-              </a:rPr>
-              <a:t>mNotes:Array</a:t>
-            </a:r>
-            <a:r>
-              <a:rPr lang="en-US" sz="1000" dirty="0">
-                <a:solidFill>
-                  <a:srgbClr val="080808"/>
-                </a:solidFill>
-                <a:effectLst/>
-                <a:latin typeface="JetBrains Mono"/>
-              </a:rPr>
-              <a:t>&lt;String&gt;,</a:t>
-            </a:r>
-          </a:p>
-          <a:p>
-            <a:r>
-              <a:rPr lang="en-US" sz="1000" dirty="0">
-                <a:solidFill>
-                  <a:srgbClr val="080808"/>
-                </a:solidFill>
-                <a:effectLst/>
-                <a:latin typeface="JetBrains Mono"/>
-              </a:rPr>
-              <a:t>    @PrimaryKey(autoGenerate = true)</a:t>
-            </a:r>
-          </a:p>
-          <a:p>
-            <a:r>
-              <a:rPr lang="en-US" sz="1000" dirty="0">
-                <a:solidFill>
-                  <a:srgbClr val="080808"/>
-                </a:solidFill>
-                <a:effectLst/>
-                <a:latin typeface="JetBrains Mono"/>
-              </a:rPr>
-              <a:t>    </a:t>
-            </a:r>
-            <a:r>
-              <a:rPr lang="en-US" sz="1000" dirty="0" err="1">
-                <a:solidFill>
-                  <a:srgbClr val="080808"/>
-                </a:solidFill>
-                <a:effectLst/>
-                <a:latin typeface="JetBrains Mono"/>
-              </a:rPr>
-              <a:t>val</a:t>
-            </a:r>
-            <a:r>
-              <a:rPr lang="en-US" sz="1000" dirty="0">
-                <a:solidFill>
-                  <a:srgbClr val="080808"/>
-                </a:solidFill>
-                <a:effectLst/>
-                <a:latin typeface="JetBrains Mono"/>
-              </a:rPr>
               <a:t> mId: Int = 0 )</a:t>
             </a:r>
           </a:p>
@@ -18973,7 +18882,7 @@
         </p:nvSpPr>
         <p:spPr>
           <a:xfrm>
-            <a:off x="3810025" y="3429000"/>
+            <a:off x="3810025" y="3520429"/>
             <a:ext cx="914400" cy="914400"/>
           </a:xfrm>
           <a:prstGeom prst="rect">
@@ -19031,7 +18940,7 @@
         </p:nvCxnSpPr>
         <p:spPr>
           <a:xfrm>
-            <a:off x="4724425" y="3886200"/>
+            <a:off x="4724425" y="3977629"/>
             <a:ext cx="337996" cy="0"/>
           </a:xfrm>
           <a:prstGeom prst="straightConnector1">
@@ -19070,7 +18979,7 @@
         </p:nvSpPr>
         <p:spPr>
           <a:xfrm>
-            <a:off x="2219633" y="3619121"/>
+            <a:off x="2219633" y="3710550"/>
             <a:ext cx="964194" cy="534155"/>
           </a:xfrm>
           <a:prstGeom prst="rect">
@@ -19121,7 +19030,7 @@
         </p:nvCxnSpPr>
         <p:spPr>
           <a:xfrm>
-            <a:off x="3183827" y="3886199"/>
+            <a:off x="3183827" y="3977628"/>
             <a:ext cx="626198" cy="1"/>
           </a:xfrm>
           <a:prstGeom prst="straightConnector1">
@@ -19160,7 +19069,7 @@
         </p:nvSpPr>
         <p:spPr>
           <a:xfrm>
-            <a:off x="549270" y="3623649"/>
+            <a:off x="549270" y="3715078"/>
             <a:ext cx="1093959" cy="529627"/>
           </a:xfrm>
           <a:prstGeom prst="rect">
@@ -19212,7 +19121,7 @@
         </p:nvCxnSpPr>
         <p:spPr>
           <a:xfrm flipV="1">
-            <a:off x="1643229" y="3886199"/>
+            <a:off x="1643229" y="3977628"/>
             <a:ext cx="576404" cy="2264"/>
           </a:xfrm>
           <a:prstGeom prst="straightConnector1">
@@ -19827,10 +19736,369 @@
           </a:p>
         </p:txBody>
       </p:sp>
+      <p:sp>
+        <p:nvSpPr>
+          <p:cNvPr id="9" name="Rectangle 8">
+            <a:extLst>
+              <a:ext uri="{FF2B5EF4-FFF2-40B4-BE49-F238E27FC236}">
+                <a16:creationId xmlns:a16="http://schemas.microsoft.com/office/drawing/2014/main" id="{2C88ABB1-AD8C-258D-8595-F58E3BFB2D93}"/>
+              </a:ext>
+            </a:extLst>
+          </p:cNvPr>
+          <p:cNvSpPr/>
+          <p:nvPr/>
+        </p:nvSpPr>
+        <p:spPr>
+          <a:xfrm>
+            <a:off x="608796" y="5162031"/>
+            <a:ext cx="1280146" cy="822951"/>
+          </a:xfrm>
+          <a:prstGeom prst="rect">
+            <a:avLst/>
+          </a:prstGeom>
+        </p:spPr>
+        <p:style>
+          <a:lnRef idx="2">
+            <a:schemeClr val="accent1">
+              <a:shade val="15000"/>
+            </a:schemeClr>
+          </a:lnRef>
+          <a:fillRef idx="1">
+            <a:schemeClr val="accent1"/>
+          </a:fillRef>
+          <a:effectRef idx="0">
+            <a:schemeClr val="accent1"/>
+          </a:effectRef>
+          <a:fontRef idx="minor">
+            <a:schemeClr val="lt1"/>
+          </a:fontRef>
+        </p:style>
+        <p:txBody>
+          <a:bodyPr rtlCol="0" anchor="t"/>
+          <a:lstStyle/>
+          <a:p>
+            <a:pPr algn="ctr"/>
+            <a:r>
+              <a:rPr lang="en-US" sz="1200" dirty="0"/>
+              <a:t>Junk DB</a:t>
+            </a:r>
+          </a:p>
+          <a:p>
+            <a:pPr algn="ctr"/>
+            <a:endParaRPr lang="en-US" sz="1200" dirty="0"/>
+          </a:p>
+          <a:p>
+            <a:r>
+              <a:rPr lang="en-US" sz="1200" dirty="0" err="1"/>
+              <a:t>mID</a:t>
+            </a:r>
+            <a:endParaRPr lang="en-US" sz="1200" dirty="0"/>
+          </a:p>
+          <a:p>
+            <a:r>
+              <a:rPr lang="en-US" sz="1200" dirty="0" err="1"/>
+              <a:t>mString</a:t>
+            </a:r>
+            <a:endParaRPr lang="en-US" sz="1200" dirty="0"/>
+          </a:p>
+        </p:txBody>
+      </p:sp>
+      <p:sp>
+        <p:nvSpPr>
+          <p:cNvPr id="11" name="Rectangle 10">
+            <a:extLst>
+              <a:ext uri="{FF2B5EF4-FFF2-40B4-BE49-F238E27FC236}">
+                <a16:creationId xmlns:a16="http://schemas.microsoft.com/office/drawing/2014/main" id="{80557916-7C23-AC90-90DF-8421951FD38A}"/>
+              </a:ext>
+            </a:extLst>
+          </p:cNvPr>
+          <p:cNvSpPr/>
+          <p:nvPr/>
+        </p:nvSpPr>
+        <p:spPr>
+          <a:xfrm>
+            <a:off x="3557821" y="4983463"/>
+            <a:ext cx="1737341" cy="1371585"/>
+          </a:xfrm>
+          <a:prstGeom prst="rect">
+            <a:avLst/>
+          </a:prstGeom>
+        </p:spPr>
+        <p:style>
+          <a:lnRef idx="2">
+            <a:schemeClr val="accent1">
+              <a:shade val="15000"/>
+            </a:schemeClr>
+          </a:lnRef>
+          <a:fillRef idx="1">
+            <a:schemeClr val="accent1"/>
+          </a:fillRef>
+          <a:effectRef idx="0">
+            <a:schemeClr val="accent1"/>
+          </a:effectRef>
+          <a:fontRef idx="minor">
+            <a:schemeClr val="lt1"/>
+          </a:fontRef>
+        </p:style>
+        <p:txBody>
+          <a:bodyPr rtlCol="0" anchor="t"/>
+          <a:lstStyle/>
+          <a:p>
+            <a:pPr algn="ctr"/>
+            <a:r>
+              <a:rPr lang="en-US" sz="1400" dirty="0"/>
+              <a:t>Player Junk Record</a:t>
+            </a:r>
+          </a:p>
+          <a:p>
+            <a:pPr algn="ctr"/>
+            <a:endParaRPr lang="en-US" sz="1400" dirty="0"/>
+          </a:p>
+          <a:p>
+            <a:r>
+              <a:rPr lang="en-US" sz="1200" dirty="0"/>
+              <a:t>Player Index</a:t>
+            </a:r>
+          </a:p>
+          <a:p>
+            <a:r>
+              <a:rPr lang="en-US" sz="1200" dirty="0"/>
+              <a:t>Hole Number</a:t>
+            </a:r>
+          </a:p>
+          <a:p>
+            <a:r>
+              <a:rPr lang="en-US" sz="1200" dirty="0"/>
+              <a:t>Junk </a:t>
+            </a:r>
+            <a:r>
+              <a:rPr lang="en-US" sz="1200" dirty="0" err="1"/>
+              <a:t>mId</a:t>
+            </a:r>
+            <a:endParaRPr lang="en-US" sz="1200" dirty="0"/>
+          </a:p>
+        </p:txBody>
+      </p:sp>
     </p:spTree>
     <p:extLst>
       <p:ext uri="{BB962C8B-B14F-4D97-AF65-F5344CB8AC3E}">
         <p14:creationId xmlns:p14="http://schemas.microsoft.com/office/powerpoint/2010/main" val="2837724412"/>
+      </p:ext>
+    </p:extLst>
+  </p:cSld>
+  <p:clrMapOvr>
+    <a:masterClrMapping/>
+  </p:clrMapOvr>
+</p:sld>
+</file>
+
+<file path=ppt/slides/slide18.xml><?xml version="1.0" encoding="utf-8"?>
+<p:sld xmlns:a="http://schemas.openxmlformats.org/drawingml/2006/main" xmlns:r="http://schemas.openxmlformats.org/officeDocument/2006/relationships" xmlns:p="http://schemas.openxmlformats.org/presentationml/2006/main">
+  <p:cSld>
+    <p:spTree>
+      <p:nvGrpSpPr>
+        <p:cNvPr id="1" name=""/>
+        <p:cNvGrpSpPr/>
+        <p:nvPr/>
+      </p:nvGrpSpPr>
+      <p:grpSpPr>
+        <a:xfrm>
+          <a:off x="0" y="0"/>
+          <a:ext cx="0" cy="0"/>
+          <a:chOff x="0" y="0"/>
+          <a:chExt cx="0" cy="0"/>
+        </a:xfrm>
+      </p:grpSpPr>
+      <p:sp>
+        <p:nvSpPr>
+          <p:cNvPr id="2" name="TextBox 1">
+            <a:extLst>
+              <a:ext uri="{FF2B5EF4-FFF2-40B4-BE49-F238E27FC236}">
+                <a16:creationId xmlns:a16="http://schemas.microsoft.com/office/drawing/2014/main" id="{ECB94E7F-8C7C-07F0-CBBB-FE467A6A0536}"/>
+              </a:ext>
+            </a:extLst>
+          </p:cNvPr>
+          <p:cNvSpPr txBox="1"/>
+          <p:nvPr/>
+        </p:nvSpPr>
+        <p:spPr>
+          <a:xfrm>
+            <a:off x="4815854" y="411513"/>
+            <a:ext cx="1452642" cy="369332"/>
+          </a:xfrm>
+          <a:prstGeom prst="rect">
+            <a:avLst/>
+          </a:prstGeom>
+          <a:noFill/>
+        </p:spPr>
+        <p:txBody>
+          <a:bodyPr wrap="none" rtlCol="0">
+            <a:spAutoFit/>
+          </a:bodyPr>
+          <a:lstStyle/>
+          <a:p>
+            <a:r>
+              <a:rPr lang="en-US" sz="1400" dirty="0"/>
+              <a:t>Junk</a:t>
+            </a:r>
+            <a:r>
+              <a:rPr lang="en-US" dirty="0"/>
+              <a:t> </a:t>
+            </a:r>
+            <a:r>
+              <a:rPr lang="en-US" sz="1400" dirty="0"/>
+              <a:t>Database</a:t>
+            </a:r>
+          </a:p>
+        </p:txBody>
+      </p:sp>
+      <p:sp>
+        <p:nvSpPr>
+          <p:cNvPr id="3" name="Rectangle 2">
+            <a:extLst>
+              <a:ext uri="{FF2B5EF4-FFF2-40B4-BE49-F238E27FC236}">
+                <a16:creationId xmlns:a16="http://schemas.microsoft.com/office/drawing/2014/main" id="{D35BDB09-4020-EDF2-ED58-BBB810D80475}"/>
+              </a:ext>
+            </a:extLst>
+          </p:cNvPr>
+          <p:cNvSpPr/>
+          <p:nvPr/>
+        </p:nvSpPr>
+        <p:spPr>
+          <a:xfrm>
+            <a:off x="1249733" y="1051586"/>
+            <a:ext cx="1280146" cy="822951"/>
+          </a:xfrm>
+          <a:prstGeom prst="rect">
+            <a:avLst/>
+          </a:prstGeom>
+        </p:spPr>
+        <p:style>
+          <a:lnRef idx="2">
+            <a:schemeClr val="accent1">
+              <a:shade val="15000"/>
+            </a:schemeClr>
+          </a:lnRef>
+          <a:fillRef idx="1">
+            <a:schemeClr val="accent1"/>
+          </a:fillRef>
+          <a:effectRef idx="0">
+            <a:schemeClr val="accent1"/>
+          </a:effectRef>
+          <a:fontRef idx="minor">
+            <a:schemeClr val="lt1"/>
+          </a:fontRef>
+        </p:style>
+        <p:txBody>
+          <a:bodyPr rtlCol="0" anchor="t"/>
+          <a:lstStyle/>
+          <a:p>
+            <a:pPr algn="ctr"/>
+            <a:r>
+              <a:rPr lang="en-US" sz="1200" dirty="0"/>
+              <a:t>Junk DB</a:t>
+            </a:r>
+          </a:p>
+          <a:p>
+            <a:pPr algn="ctr"/>
+            <a:endParaRPr lang="en-US" sz="1200" dirty="0"/>
+          </a:p>
+          <a:p>
+            <a:r>
+              <a:rPr lang="en-US" sz="1200" dirty="0" err="1"/>
+              <a:t>mID</a:t>
+            </a:r>
+            <a:endParaRPr lang="en-US" sz="1200" dirty="0"/>
+          </a:p>
+          <a:p>
+            <a:r>
+              <a:rPr lang="en-US" sz="1200" dirty="0" err="1"/>
+              <a:t>mString</a:t>
+            </a:r>
+            <a:endParaRPr lang="en-US" sz="1200" dirty="0"/>
+          </a:p>
+        </p:txBody>
+      </p:sp>
+      <p:sp>
+        <p:nvSpPr>
+          <p:cNvPr id="4" name="Rectangle 3">
+            <a:extLst>
+              <a:ext uri="{FF2B5EF4-FFF2-40B4-BE49-F238E27FC236}">
+                <a16:creationId xmlns:a16="http://schemas.microsoft.com/office/drawing/2014/main" id="{A75279F2-034C-1F97-2355-80342F8BF498}"/>
+              </a:ext>
+            </a:extLst>
+          </p:cNvPr>
+          <p:cNvSpPr/>
+          <p:nvPr/>
+        </p:nvSpPr>
+        <p:spPr>
+          <a:xfrm>
+            <a:off x="1066855" y="2697487"/>
+            <a:ext cx="1737341" cy="1371585"/>
+          </a:xfrm>
+          <a:prstGeom prst="rect">
+            <a:avLst/>
+          </a:prstGeom>
+        </p:spPr>
+        <p:style>
+          <a:lnRef idx="2">
+            <a:schemeClr val="accent1">
+              <a:shade val="15000"/>
+            </a:schemeClr>
+          </a:lnRef>
+          <a:fillRef idx="1">
+            <a:schemeClr val="accent1"/>
+          </a:fillRef>
+          <a:effectRef idx="0">
+            <a:schemeClr val="accent1"/>
+          </a:effectRef>
+          <a:fontRef idx="minor">
+            <a:schemeClr val="lt1"/>
+          </a:fontRef>
+        </p:style>
+        <p:txBody>
+          <a:bodyPr rtlCol="0" anchor="t"/>
+          <a:lstStyle/>
+          <a:p>
+            <a:pPr algn="ctr"/>
+            <a:r>
+              <a:rPr lang="en-US" sz="1400" dirty="0"/>
+              <a:t>Player Junk Record</a:t>
+            </a:r>
+          </a:p>
+          <a:p>
+            <a:pPr algn="ctr"/>
+            <a:endParaRPr lang="en-US" sz="1400" dirty="0"/>
+          </a:p>
+          <a:p>
+            <a:r>
+              <a:rPr lang="en-US" sz="1200" dirty="0"/>
+              <a:t>Player Index</a:t>
+            </a:r>
+          </a:p>
+          <a:p>
+            <a:r>
+              <a:rPr lang="en-US" sz="1200" dirty="0"/>
+              <a:t>Hole Number</a:t>
+            </a:r>
+          </a:p>
+          <a:p>
+            <a:r>
+              <a:rPr lang="en-US" sz="1200" dirty="0"/>
+              <a:t>Junk </a:t>
+            </a:r>
+            <a:r>
+              <a:rPr lang="en-US" sz="1200" dirty="0" err="1"/>
+              <a:t>mId</a:t>
+            </a:r>
+            <a:endParaRPr lang="en-US" sz="1200" dirty="0"/>
+          </a:p>
+        </p:txBody>
+      </p:sp>
+    </p:spTree>
+    <p:extLst>
+      <p:ext uri="{BB962C8B-B14F-4D97-AF65-F5344CB8AC3E}">
+        <p14:creationId xmlns:p14="http://schemas.microsoft.com/office/powerpoint/2010/main" val="3592111915"/>
       </p:ext>
     </p:extLst>
   </p:cSld>

</xml_diff>

<commit_message>
July 12, 2024 Working on Junk table database and interface
</commit_message>
<xml_diff>
--- a/Documentation/TeamScoreLayout.pptx
+++ b/Documentation/TeamScoreLayout.pptx
@@ -843,7 +843,7 @@
           <a:p>
             <a:fld id="{955A69D3-FF78-44E1-BB41-3D13FA416A59}" type="datetimeFigureOut">
               <a:rPr lang="en-US" smtClean="0"/>
-              <a:t>7/6/2024</a:t>
+              <a:t>07/12/24</a:t>
             </a:fld>
             <a:endParaRPr lang="en-US"/>
           </a:p>
@@ -1041,7 +1041,7 @@
           <a:p>
             <a:fld id="{955A69D3-FF78-44E1-BB41-3D13FA416A59}" type="datetimeFigureOut">
               <a:rPr lang="en-US" smtClean="0"/>
-              <a:t>7/6/2024</a:t>
+              <a:t>07/12/24</a:t>
             </a:fld>
             <a:endParaRPr lang="en-US"/>
           </a:p>
@@ -1249,7 +1249,7 @@
           <a:p>
             <a:fld id="{955A69D3-FF78-44E1-BB41-3D13FA416A59}" type="datetimeFigureOut">
               <a:rPr lang="en-US" smtClean="0"/>
-              <a:t>7/6/2024</a:t>
+              <a:t>07/12/24</a:t>
             </a:fld>
             <a:endParaRPr lang="en-US"/>
           </a:p>
@@ -1447,7 +1447,7 @@
           <a:p>
             <a:fld id="{955A69D3-FF78-44E1-BB41-3D13FA416A59}" type="datetimeFigureOut">
               <a:rPr lang="en-US" smtClean="0"/>
-              <a:t>7/6/2024</a:t>
+              <a:t>07/12/24</a:t>
             </a:fld>
             <a:endParaRPr lang="en-US"/>
           </a:p>
@@ -1722,7 +1722,7 @@
           <a:p>
             <a:fld id="{955A69D3-FF78-44E1-BB41-3D13FA416A59}" type="datetimeFigureOut">
               <a:rPr lang="en-US" smtClean="0"/>
-              <a:t>7/6/2024</a:t>
+              <a:t>07/12/24</a:t>
             </a:fld>
             <a:endParaRPr lang="en-US"/>
           </a:p>
@@ -1987,7 +1987,7 @@
           <a:p>
             <a:fld id="{955A69D3-FF78-44E1-BB41-3D13FA416A59}" type="datetimeFigureOut">
               <a:rPr lang="en-US" smtClean="0"/>
-              <a:t>7/6/2024</a:t>
+              <a:t>07/12/24</a:t>
             </a:fld>
             <a:endParaRPr lang="en-US"/>
           </a:p>
@@ -2399,7 +2399,7 @@
           <a:p>
             <a:fld id="{955A69D3-FF78-44E1-BB41-3D13FA416A59}" type="datetimeFigureOut">
               <a:rPr lang="en-US" smtClean="0"/>
-              <a:t>7/6/2024</a:t>
+              <a:t>07/12/24</a:t>
             </a:fld>
             <a:endParaRPr lang="en-US"/>
           </a:p>
@@ -2540,7 +2540,7 @@
           <a:p>
             <a:fld id="{955A69D3-FF78-44E1-BB41-3D13FA416A59}" type="datetimeFigureOut">
               <a:rPr lang="en-US" smtClean="0"/>
-              <a:t>7/6/2024</a:t>
+              <a:t>07/12/24</a:t>
             </a:fld>
             <a:endParaRPr lang="en-US"/>
           </a:p>
@@ -2653,7 +2653,7 @@
           <a:p>
             <a:fld id="{955A69D3-FF78-44E1-BB41-3D13FA416A59}" type="datetimeFigureOut">
               <a:rPr lang="en-US" smtClean="0"/>
-              <a:t>7/6/2024</a:t>
+              <a:t>07/12/24</a:t>
             </a:fld>
             <a:endParaRPr lang="en-US"/>
           </a:p>
@@ -2964,7 +2964,7 @@
           <a:p>
             <a:fld id="{955A69D3-FF78-44E1-BB41-3D13FA416A59}" type="datetimeFigureOut">
               <a:rPr lang="en-US" smtClean="0"/>
-              <a:t>7/6/2024</a:t>
+              <a:t>07/12/24</a:t>
             </a:fld>
             <a:endParaRPr lang="en-US"/>
           </a:p>
@@ -3252,7 +3252,7 @@
           <a:p>
             <a:fld id="{955A69D3-FF78-44E1-BB41-3D13FA416A59}" type="datetimeFigureOut">
               <a:rPr lang="en-US" smtClean="0"/>
-              <a:t>7/6/2024</a:t>
+              <a:t>07/12/24</a:t>
             </a:fld>
             <a:endParaRPr lang="en-US"/>
           </a:p>
@@ -3493,7 +3493,7 @@
           <a:p>
             <a:fld id="{955A69D3-FF78-44E1-BB41-3D13FA416A59}" type="datetimeFigureOut">
               <a:rPr lang="en-US" smtClean="0"/>
-              <a:t>7/6/2024</a:t>
+              <a:t>07/12/24</a:t>
             </a:fld>
             <a:endParaRPr lang="en-US"/>
           </a:p>
@@ -19967,7 +19967,7 @@
         <p:spPr>
           <a:xfrm>
             <a:off x="1249733" y="1051586"/>
-            <a:ext cx="1280146" cy="822951"/>
+            <a:ext cx="914390" cy="822951"/>
           </a:xfrm>
           <a:prstGeom prst="rect">
             <a:avLst/>
@@ -20034,7 +20034,7 @@
         <p:spPr>
           <a:xfrm>
             <a:off x="1066855" y="2697487"/>
-            <a:ext cx="1737341" cy="1371585"/>
+            <a:ext cx="1188707" cy="1371585"/>
           </a:xfrm>
           <a:prstGeom prst="rect">
             <a:avLst/>
@@ -20092,6 +20092,504 @@
               <a:t>mId</a:t>
             </a:r>
             <a:endParaRPr lang="en-US" sz="1200" dirty="0"/>
+          </a:p>
+        </p:txBody>
+      </p:sp>
+      <p:sp>
+        <p:nvSpPr>
+          <p:cNvPr id="5" name="Rectangle 4">
+            <a:extLst>
+              <a:ext uri="{FF2B5EF4-FFF2-40B4-BE49-F238E27FC236}">
+                <a16:creationId xmlns:a16="http://schemas.microsoft.com/office/drawing/2014/main" id="{7F0CEC2D-1F18-B0AE-8464-700E4A5D57BA}"/>
+              </a:ext>
+            </a:extLst>
+          </p:cNvPr>
+          <p:cNvSpPr/>
+          <p:nvPr/>
+        </p:nvSpPr>
+        <p:spPr>
+          <a:xfrm>
+            <a:off x="5455926" y="1417342"/>
+            <a:ext cx="1188707" cy="457195"/>
+          </a:xfrm>
+          <a:prstGeom prst="rect">
+            <a:avLst/>
+          </a:prstGeom>
+        </p:spPr>
+        <p:style>
+          <a:lnRef idx="2">
+            <a:schemeClr val="accent1">
+              <a:shade val="15000"/>
+            </a:schemeClr>
+          </a:lnRef>
+          <a:fillRef idx="1">
+            <a:schemeClr val="accent1"/>
+          </a:fillRef>
+          <a:effectRef idx="0">
+            <a:schemeClr val="accent1"/>
+          </a:effectRef>
+          <a:fontRef idx="minor">
+            <a:schemeClr val="lt1"/>
+          </a:fontRef>
+        </p:style>
+        <p:txBody>
+          <a:bodyPr rtlCol="0" anchor="ctr"/>
+          <a:lstStyle/>
+          <a:p>
+            <a:pPr algn="ctr"/>
+            <a:r>
+              <a:rPr lang="en-US" sz="1200" dirty="0"/>
+              <a:t>Junk Menu Select</a:t>
+            </a:r>
+          </a:p>
+        </p:txBody>
+      </p:sp>
+      <p:sp>
+        <p:nvSpPr>
+          <p:cNvPr id="6" name="Rectangle 5">
+            <a:extLst>
+              <a:ext uri="{FF2B5EF4-FFF2-40B4-BE49-F238E27FC236}">
+                <a16:creationId xmlns:a16="http://schemas.microsoft.com/office/drawing/2014/main" id="{1D92EAEA-C655-53E6-BB96-5EE47A077810}"/>
+              </a:ext>
+            </a:extLst>
+          </p:cNvPr>
+          <p:cNvSpPr/>
+          <p:nvPr/>
+        </p:nvSpPr>
+        <p:spPr>
+          <a:xfrm>
+            <a:off x="5501646" y="2148854"/>
+            <a:ext cx="1188707" cy="457195"/>
+          </a:xfrm>
+          <a:prstGeom prst="rect">
+            <a:avLst/>
+          </a:prstGeom>
+        </p:spPr>
+        <p:style>
+          <a:lnRef idx="2">
+            <a:schemeClr val="accent1">
+              <a:shade val="15000"/>
+            </a:schemeClr>
+          </a:lnRef>
+          <a:fillRef idx="1">
+            <a:schemeClr val="accent1"/>
+          </a:fillRef>
+          <a:effectRef idx="0">
+            <a:schemeClr val="accent1"/>
+          </a:effectRef>
+          <a:fontRef idx="minor">
+            <a:schemeClr val="lt1"/>
+          </a:fontRef>
+        </p:style>
+        <p:txBody>
+          <a:bodyPr rtlCol="0" anchor="ctr"/>
+          <a:lstStyle/>
+          <a:p>
+            <a:pPr algn="ctr"/>
+            <a:r>
+              <a:rPr lang="en-US" sz="1200" dirty="0"/>
+              <a:t>Read Junk Records</a:t>
+            </a:r>
+          </a:p>
+        </p:txBody>
+      </p:sp>
+      <p:sp>
+        <p:nvSpPr>
+          <p:cNvPr id="7" name="Rectangle 6">
+            <a:extLst>
+              <a:ext uri="{FF2B5EF4-FFF2-40B4-BE49-F238E27FC236}">
+                <a16:creationId xmlns:a16="http://schemas.microsoft.com/office/drawing/2014/main" id="{824B39AF-E6BC-B9D0-0EC5-A842E3D9C825}"/>
+              </a:ext>
+            </a:extLst>
+          </p:cNvPr>
+          <p:cNvSpPr/>
+          <p:nvPr/>
+        </p:nvSpPr>
+        <p:spPr>
+          <a:xfrm>
+            <a:off x="5542175" y="2880366"/>
+            <a:ext cx="1188707" cy="457195"/>
+          </a:xfrm>
+          <a:prstGeom prst="rect">
+            <a:avLst/>
+          </a:prstGeom>
+        </p:spPr>
+        <p:style>
+          <a:lnRef idx="2">
+            <a:schemeClr val="accent1">
+              <a:shade val="15000"/>
+            </a:schemeClr>
+          </a:lnRef>
+          <a:fillRef idx="1">
+            <a:schemeClr val="accent1"/>
+          </a:fillRef>
+          <a:effectRef idx="0">
+            <a:schemeClr val="accent1"/>
+          </a:effectRef>
+          <a:fontRef idx="minor">
+            <a:schemeClr val="lt1"/>
+          </a:fontRef>
+        </p:style>
+        <p:txBody>
+          <a:bodyPr rtlCol="0" anchor="ctr"/>
+          <a:lstStyle/>
+          <a:p>
+            <a:pPr algn="ctr"/>
+            <a:r>
+              <a:rPr lang="en-US" sz="1200" dirty="0"/>
+              <a:t>Display Junk Record List</a:t>
+            </a:r>
+          </a:p>
+        </p:txBody>
+      </p:sp>
+      <p:sp>
+        <p:nvSpPr>
+          <p:cNvPr id="8" name="Rectangle 7">
+            <a:extLst>
+              <a:ext uri="{FF2B5EF4-FFF2-40B4-BE49-F238E27FC236}">
+                <a16:creationId xmlns:a16="http://schemas.microsoft.com/office/drawing/2014/main" id="{A7B3F9BC-2DF0-359A-1C7F-671944F904AC}"/>
+              </a:ext>
+            </a:extLst>
+          </p:cNvPr>
+          <p:cNvSpPr/>
+          <p:nvPr/>
+        </p:nvSpPr>
+        <p:spPr>
+          <a:xfrm>
+            <a:off x="5544320" y="3611877"/>
+            <a:ext cx="1188707" cy="457195"/>
+          </a:xfrm>
+          <a:prstGeom prst="rect">
+            <a:avLst/>
+          </a:prstGeom>
+        </p:spPr>
+        <p:style>
+          <a:lnRef idx="2">
+            <a:schemeClr val="accent1">
+              <a:shade val="15000"/>
+            </a:schemeClr>
+          </a:lnRef>
+          <a:fillRef idx="1">
+            <a:schemeClr val="accent1"/>
+          </a:fillRef>
+          <a:effectRef idx="0">
+            <a:schemeClr val="accent1"/>
+          </a:effectRef>
+          <a:fontRef idx="minor">
+            <a:schemeClr val="lt1"/>
+          </a:fontRef>
+        </p:style>
+        <p:txBody>
+          <a:bodyPr rtlCol="0" anchor="ctr"/>
+          <a:lstStyle/>
+          <a:p>
+            <a:pPr algn="ctr"/>
+            <a:r>
+              <a:rPr lang="en-US" sz="1200" dirty="0"/>
+              <a:t>Record Select</a:t>
+            </a:r>
+          </a:p>
+        </p:txBody>
+      </p:sp>
+      <p:sp>
+        <p:nvSpPr>
+          <p:cNvPr id="9" name="Rectangle 8">
+            <a:extLst>
+              <a:ext uri="{FF2B5EF4-FFF2-40B4-BE49-F238E27FC236}">
+                <a16:creationId xmlns:a16="http://schemas.microsoft.com/office/drawing/2014/main" id="{A5D5F03F-6103-2B73-EED5-55E89A34C1D8}"/>
+              </a:ext>
+            </a:extLst>
+          </p:cNvPr>
+          <p:cNvSpPr/>
+          <p:nvPr/>
+        </p:nvSpPr>
+        <p:spPr>
+          <a:xfrm>
+            <a:off x="7101829" y="3611877"/>
+            <a:ext cx="1188707" cy="457195"/>
+          </a:xfrm>
+          <a:prstGeom prst="rect">
+            <a:avLst/>
+          </a:prstGeom>
+        </p:spPr>
+        <p:style>
+          <a:lnRef idx="2">
+            <a:schemeClr val="accent1">
+              <a:shade val="15000"/>
+            </a:schemeClr>
+          </a:lnRef>
+          <a:fillRef idx="1">
+            <a:schemeClr val="accent1"/>
+          </a:fillRef>
+          <a:effectRef idx="0">
+            <a:schemeClr val="accent1"/>
+          </a:effectRef>
+          <a:fontRef idx="minor">
+            <a:schemeClr val="lt1"/>
+          </a:fontRef>
+        </p:style>
+        <p:txBody>
+          <a:bodyPr rtlCol="0" anchor="ctr"/>
+          <a:lstStyle/>
+          <a:p>
+            <a:pPr algn="ctr"/>
+            <a:r>
+              <a:rPr lang="en-US" sz="1200" dirty="0"/>
+              <a:t>Edit Record</a:t>
+            </a:r>
+          </a:p>
+        </p:txBody>
+      </p:sp>
+      <p:sp>
+        <p:nvSpPr>
+          <p:cNvPr id="10" name="Rectangle: Rounded Corners 9">
+            <a:extLst>
+              <a:ext uri="{FF2B5EF4-FFF2-40B4-BE49-F238E27FC236}">
+                <a16:creationId xmlns:a16="http://schemas.microsoft.com/office/drawing/2014/main" id="{4DEB7BE5-BC1B-4548-EC62-14C8A4915908}"/>
+              </a:ext>
+            </a:extLst>
+          </p:cNvPr>
+          <p:cNvSpPr/>
+          <p:nvPr/>
+        </p:nvSpPr>
+        <p:spPr>
+          <a:xfrm>
+            <a:off x="6268496" y="4828041"/>
+            <a:ext cx="731512" cy="365756"/>
+          </a:xfrm>
+          <a:prstGeom prst="roundRect">
+            <a:avLst/>
+          </a:prstGeom>
+        </p:spPr>
+        <p:style>
+          <a:lnRef idx="2">
+            <a:schemeClr val="accent1">
+              <a:shade val="15000"/>
+            </a:schemeClr>
+          </a:lnRef>
+          <a:fillRef idx="1">
+            <a:schemeClr val="accent1"/>
+          </a:fillRef>
+          <a:effectRef idx="0">
+            <a:schemeClr val="accent1"/>
+          </a:effectRef>
+          <a:fontRef idx="minor">
+            <a:schemeClr val="lt1"/>
+          </a:fontRef>
+        </p:style>
+        <p:txBody>
+          <a:bodyPr rtlCol="0" anchor="ctr"/>
+          <a:lstStyle/>
+          <a:p>
+            <a:pPr algn="ctr"/>
+            <a:r>
+              <a:rPr lang="en-US" sz="1000" dirty="0"/>
+              <a:t>Cancel</a:t>
+            </a:r>
+          </a:p>
+        </p:txBody>
+      </p:sp>
+      <p:sp>
+        <p:nvSpPr>
+          <p:cNvPr id="11" name="Rectangle: Rounded Corners 10">
+            <a:extLst>
+              <a:ext uri="{FF2B5EF4-FFF2-40B4-BE49-F238E27FC236}">
+                <a16:creationId xmlns:a16="http://schemas.microsoft.com/office/drawing/2014/main" id="{E918C4EF-7C7D-0DBB-A8CC-6E0E5501E1B9}"/>
+              </a:ext>
+            </a:extLst>
+          </p:cNvPr>
+          <p:cNvSpPr/>
+          <p:nvPr/>
+        </p:nvSpPr>
+        <p:spPr>
+          <a:xfrm>
+            <a:off x="5090170" y="4800585"/>
+            <a:ext cx="731512" cy="365756"/>
+          </a:xfrm>
+          <a:prstGeom prst="roundRect">
+            <a:avLst/>
+          </a:prstGeom>
+        </p:spPr>
+        <p:style>
+          <a:lnRef idx="2">
+            <a:schemeClr val="accent1">
+              <a:shade val="15000"/>
+            </a:schemeClr>
+          </a:lnRef>
+          <a:fillRef idx="1">
+            <a:schemeClr val="accent1"/>
+          </a:fillRef>
+          <a:effectRef idx="0">
+            <a:schemeClr val="accent1"/>
+          </a:effectRef>
+          <a:fontRef idx="minor">
+            <a:schemeClr val="lt1"/>
+          </a:fontRef>
+        </p:style>
+        <p:txBody>
+          <a:bodyPr rtlCol="0" anchor="ctr"/>
+          <a:lstStyle/>
+          <a:p>
+            <a:pPr algn="ctr"/>
+            <a:r>
+              <a:rPr lang="en-US" sz="1000" dirty="0"/>
+              <a:t>Save</a:t>
+            </a:r>
+          </a:p>
+        </p:txBody>
+      </p:sp>
+      <p:sp>
+        <p:nvSpPr>
+          <p:cNvPr id="12" name="Rectangle 11">
+            <a:extLst>
+              <a:ext uri="{FF2B5EF4-FFF2-40B4-BE49-F238E27FC236}">
+                <a16:creationId xmlns:a16="http://schemas.microsoft.com/office/drawing/2014/main" id="{753BA4C3-6F9A-9561-8B12-C8294E4AFCEB}"/>
+              </a:ext>
+            </a:extLst>
+          </p:cNvPr>
+          <p:cNvSpPr/>
+          <p:nvPr/>
+        </p:nvSpPr>
+        <p:spPr>
+          <a:xfrm>
+            <a:off x="8798640" y="2529104"/>
+            <a:ext cx="1452642" cy="545058"/>
+          </a:xfrm>
+          <a:prstGeom prst="rect">
+            <a:avLst/>
+          </a:prstGeom>
+        </p:spPr>
+        <p:style>
+          <a:lnRef idx="2">
+            <a:schemeClr val="accent1">
+              <a:shade val="15000"/>
+            </a:schemeClr>
+          </a:lnRef>
+          <a:fillRef idx="1">
+            <a:schemeClr val="accent1"/>
+          </a:fillRef>
+          <a:effectRef idx="0">
+            <a:schemeClr val="accent1"/>
+          </a:effectRef>
+          <a:fontRef idx="minor">
+            <a:schemeClr val="lt1"/>
+          </a:fontRef>
+        </p:style>
+        <p:txBody>
+          <a:bodyPr rtlCol="0" anchor="ctr"/>
+          <a:lstStyle/>
+          <a:p>
+            <a:pPr algn="ctr"/>
+            <a:r>
+              <a:rPr lang="en-US" sz="1000" dirty="0"/>
+              <a:t>First record will display Add Record</a:t>
+            </a:r>
+          </a:p>
+        </p:txBody>
+      </p:sp>
+      <p:sp>
+        <p:nvSpPr>
+          <p:cNvPr id="13" name="Rectangle 12">
+            <a:extLst>
+              <a:ext uri="{FF2B5EF4-FFF2-40B4-BE49-F238E27FC236}">
+                <a16:creationId xmlns:a16="http://schemas.microsoft.com/office/drawing/2014/main" id="{36B597FA-36BD-C3FD-73B6-E392C1EF5CCB}"/>
+              </a:ext>
+            </a:extLst>
+          </p:cNvPr>
+          <p:cNvSpPr/>
+          <p:nvPr/>
+        </p:nvSpPr>
+        <p:spPr>
+          <a:xfrm>
+            <a:off x="8930608" y="3295416"/>
+            <a:ext cx="1188707" cy="545058"/>
+          </a:xfrm>
+          <a:prstGeom prst="rect">
+            <a:avLst/>
+          </a:prstGeom>
+        </p:spPr>
+        <p:style>
+          <a:lnRef idx="2">
+            <a:schemeClr val="accent1">
+              <a:shade val="15000"/>
+            </a:schemeClr>
+          </a:lnRef>
+          <a:fillRef idx="1">
+            <a:schemeClr val="accent1"/>
+          </a:fillRef>
+          <a:effectRef idx="0">
+            <a:schemeClr val="accent1"/>
+          </a:effectRef>
+          <a:fontRef idx="minor">
+            <a:schemeClr val="lt1"/>
+          </a:fontRef>
+        </p:style>
+        <p:txBody>
+          <a:bodyPr rtlCol="0" anchor="ctr"/>
+          <a:lstStyle/>
+          <a:p>
+            <a:pPr algn="ctr"/>
+            <a:r>
+              <a:rPr lang="en-US" sz="1000" dirty="0"/>
+              <a:t>Blank text will delete record</a:t>
+            </a:r>
+          </a:p>
+        </p:txBody>
+      </p:sp>
+      <p:sp>
+        <p:nvSpPr>
+          <p:cNvPr id="14" name="Rectangle 13">
+            <a:extLst>
+              <a:ext uri="{FF2B5EF4-FFF2-40B4-BE49-F238E27FC236}">
+                <a16:creationId xmlns:a16="http://schemas.microsoft.com/office/drawing/2014/main" id="{5700B13F-6394-D1CA-325A-2E386AB2A5F0}"/>
+              </a:ext>
+            </a:extLst>
+          </p:cNvPr>
+          <p:cNvSpPr/>
+          <p:nvPr/>
+        </p:nvSpPr>
+        <p:spPr>
+          <a:xfrm>
+            <a:off x="8930609" y="4282983"/>
+            <a:ext cx="1188707" cy="545058"/>
+          </a:xfrm>
+          <a:prstGeom prst="rect">
+            <a:avLst/>
+          </a:prstGeom>
+        </p:spPr>
+        <p:style>
+          <a:lnRef idx="2">
+            <a:schemeClr val="accent1">
+              <a:shade val="15000"/>
+            </a:schemeClr>
+          </a:lnRef>
+          <a:fillRef idx="1">
+            <a:schemeClr val="accent1"/>
+          </a:fillRef>
+          <a:effectRef idx="0">
+            <a:schemeClr val="accent1"/>
+          </a:effectRef>
+          <a:fontRef idx="minor">
+            <a:schemeClr val="lt1"/>
+          </a:fontRef>
+        </p:style>
+        <p:txBody>
+          <a:bodyPr rtlCol="0" anchor="ctr"/>
+          <a:lstStyle/>
+          <a:p>
+            <a:pPr algn="ctr"/>
+            <a:r>
+              <a:rPr lang="en-US" sz="1000" dirty="0"/>
+              <a:t>Record with </a:t>
+            </a:r>
+            <a:r>
+              <a:rPr lang="en-US" sz="1000" dirty="0" err="1"/>
+              <a:t>mId</a:t>
+            </a:r>
+            <a:r>
+              <a:rPr lang="en-US" sz="1000" dirty="0"/>
+              <a:t> = 0 will be added</a:t>
+            </a:r>
           </a:p>
         </p:txBody>
       </p:sp>

</xml_diff>

<commit_message>
July 13, 2024 Build junk configuration database screen
Next
Player’s Junk dialog screen for score card
</commit_message>
<xml_diff>
--- a/Documentation/TeamScoreLayout.pptx
+++ b/Documentation/TeamScoreLayout.pptx
@@ -843,7 +843,7 @@
           <a:p>
             <a:fld id="{955A69D3-FF78-44E1-BB41-3D13FA416A59}" type="datetimeFigureOut">
               <a:rPr lang="en-US" smtClean="0"/>
-              <a:t>07/12/24</a:t>
+              <a:t>07/13/24</a:t>
             </a:fld>
             <a:endParaRPr lang="en-US"/>
           </a:p>
@@ -1041,7 +1041,7 @@
           <a:p>
             <a:fld id="{955A69D3-FF78-44E1-BB41-3D13FA416A59}" type="datetimeFigureOut">
               <a:rPr lang="en-US" smtClean="0"/>
-              <a:t>07/12/24</a:t>
+              <a:t>07/13/24</a:t>
             </a:fld>
             <a:endParaRPr lang="en-US"/>
           </a:p>
@@ -1249,7 +1249,7 @@
           <a:p>
             <a:fld id="{955A69D3-FF78-44E1-BB41-3D13FA416A59}" type="datetimeFigureOut">
               <a:rPr lang="en-US" smtClean="0"/>
-              <a:t>07/12/24</a:t>
+              <a:t>07/13/24</a:t>
             </a:fld>
             <a:endParaRPr lang="en-US"/>
           </a:p>
@@ -1447,7 +1447,7 @@
           <a:p>
             <a:fld id="{955A69D3-FF78-44E1-BB41-3D13FA416A59}" type="datetimeFigureOut">
               <a:rPr lang="en-US" smtClean="0"/>
-              <a:t>07/12/24</a:t>
+              <a:t>07/13/24</a:t>
             </a:fld>
             <a:endParaRPr lang="en-US"/>
           </a:p>
@@ -1722,7 +1722,7 @@
           <a:p>
             <a:fld id="{955A69D3-FF78-44E1-BB41-3D13FA416A59}" type="datetimeFigureOut">
               <a:rPr lang="en-US" smtClean="0"/>
-              <a:t>07/12/24</a:t>
+              <a:t>07/13/24</a:t>
             </a:fld>
             <a:endParaRPr lang="en-US"/>
           </a:p>
@@ -1987,7 +1987,7 @@
           <a:p>
             <a:fld id="{955A69D3-FF78-44E1-BB41-3D13FA416A59}" type="datetimeFigureOut">
               <a:rPr lang="en-US" smtClean="0"/>
-              <a:t>07/12/24</a:t>
+              <a:t>07/13/24</a:t>
             </a:fld>
             <a:endParaRPr lang="en-US"/>
           </a:p>
@@ -2399,7 +2399,7 @@
           <a:p>
             <a:fld id="{955A69D3-FF78-44E1-BB41-3D13FA416A59}" type="datetimeFigureOut">
               <a:rPr lang="en-US" smtClean="0"/>
-              <a:t>07/12/24</a:t>
+              <a:t>07/13/24</a:t>
             </a:fld>
             <a:endParaRPr lang="en-US"/>
           </a:p>
@@ -2540,7 +2540,7 @@
           <a:p>
             <a:fld id="{955A69D3-FF78-44E1-BB41-3D13FA416A59}" type="datetimeFigureOut">
               <a:rPr lang="en-US" smtClean="0"/>
-              <a:t>07/12/24</a:t>
+              <a:t>07/13/24</a:t>
             </a:fld>
             <a:endParaRPr lang="en-US"/>
           </a:p>
@@ -2653,7 +2653,7 @@
           <a:p>
             <a:fld id="{955A69D3-FF78-44E1-BB41-3D13FA416A59}" type="datetimeFigureOut">
               <a:rPr lang="en-US" smtClean="0"/>
-              <a:t>07/12/24</a:t>
+              <a:t>07/13/24</a:t>
             </a:fld>
             <a:endParaRPr lang="en-US"/>
           </a:p>
@@ -2964,7 +2964,7 @@
           <a:p>
             <a:fld id="{955A69D3-FF78-44E1-BB41-3D13FA416A59}" type="datetimeFigureOut">
               <a:rPr lang="en-US" smtClean="0"/>
-              <a:t>07/12/24</a:t>
+              <a:t>07/13/24</a:t>
             </a:fld>
             <a:endParaRPr lang="en-US"/>
           </a:p>
@@ -3252,7 +3252,7 @@
           <a:p>
             <a:fld id="{955A69D3-FF78-44E1-BB41-3D13FA416A59}" type="datetimeFigureOut">
               <a:rPr lang="en-US" smtClean="0"/>
-              <a:t>07/12/24</a:t>
+              <a:t>07/13/24</a:t>
             </a:fld>
             <a:endParaRPr lang="en-US"/>
           </a:p>
@@ -3493,7 +3493,7 @@
           <a:p>
             <a:fld id="{955A69D3-FF78-44E1-BB41-3D13FA416A59}" type="datetimeFigureOut">
               <a:rPr lang="en-US" smtClean="0"/>
-              <a:t>07/12/24</a:t>
+              <a:t>07/13/24</a:t>
             </a:fld>
             <a:endParaRPr lang="en-US"/>
           </a:p>
@@ -20109,7 +20109,7 @@
         </p:nvSpPr>
         <p:spPr>
           <a:xfrm>
-            <a:off x="5455926" y="1417342"/>
+            <a:off x="5227328" y="932690"/>
             <a:ext cx="1188707" cy="457195"/>
           </a:xfrm>
           <a:prstGeom prst="rect">
@@ -20158,7 +20158,7 @@
         </p:nvSpPr>
         <p:spPr>
           <a:xfrm>
-            <a:off x="5501646" y="2148854"/>
+            <a:off x="5224282" y="1663243"/>
             <a:ext cx="1188707" cy="457195"/>
           </a:xfrm>
           <a:prstGeom prst="rect">
@@ -20207,7 +20207,7 @@
         </p:nvSpPr>
         <p:spPr>
           <a:xfrm>
-            <a:off x="5542175" y="2880366"/>
+            <a:off x="5224282" y="2481637"/>
             <a:ext cx="1188707" cy="457195"/>
           </a:xfrm>
           <a:prstGeom prst="rect">
@@ -20256,7 +20256,7 @@
         </p:nvSpPr>
         <p:spPr>
           <a:xfrm>
-            <a:off x="5544320" y="3611877"/>
+            <a:off x="5227333" y="3255263"/>
             <a:ext cx="1188707" cy="457195"/>
           </a:xfrm>
           <a:prstGeom prst="rect">
@@ -20305,7 +20305,7 @@
         </p:nvSpPr>
         <p:spPr>
           <a:xfrm>
-            <a:off x="7101829" y="3611877"/>
+            <a:off x="7376145" y="4069072"/>
             <a:ext cx="1188707" cy="457195"/>
           </a:xfrm>
           <a:prstGeom prst="rect">
@@ -20335,7 +20335,7 @@
             <a:pPr algn="ctr"/>
             <a:r>
               <a:rPr lang="en-US" sz="1200" dirty="0"/>
-              <a:t>Edit Record</a:t>
+              <a:t>Add/Edit Record</a:t>
             </a:r>
           </a:p>
         </p:txBody>
@@ -20354,7 +20354,7 @@
         </p:nvSpPr>
         <p:spPr>
           <a:xfrm>
-            <a:off x="6268496" y="4828041"/>
+            <a:off x="7627604" y="4800584"/>
             <a:ext cx="731512" cy="365756"/>
           </a:xfrm>
           <a:prstGeom prst="roundRect">
@@ -20384,7 +20384,7 @@
             <a:pPr algn="ctr"/>
             <a:r>
               <a:rPr lang="en-US" sz="1000" dirty="0"/>
-              <a:t>Cancel</a:t>
+              <a:t>Done</a:t>
             </a:r>
           </a:p>
         </p:txBody>
@@ -20403,7 +20403,7 @@
         </p:nvSpPr>
         <p:spPr>
           <a:xfrm>
-            <a:off x="5090170" y="4800585"/>
+            <a:off x="4328227" y="4714528"/>
             <a:ext cx="731512" cy="365756"/>
           </a:xfrm>
           <a:prstGeom prst="roundRect">
@@ -20433,7 +20433,7 @@
             <a:pPr algn="ctr"/>
             <a:r>
               <a:rPr lang="en-US" sz="1000" dirty="0"/>
-              <a:t>Save</a:t>
+              <a:t>Exit</a:t>
             </a:r>
           </a:p>
         </p:txBody>
@@ -20452,7 +20452,7 @@
         </p:nvSpPr>
         <p:spPr>
           <a:xfrm>
-            <a:off x="8798640" y="2529104"/>
+            <a:off x="1432612" y="4441999"/>
             <a:ext cx="1452642" cy="545058"/>
           </a:xfrm>
           <a:prstGeom prst="rect">
@@ -20501,7 +20501,7 @@
         </p:nvSpPr>
         <p:spPr>
           <a:xfrm>
-            <a:off x="8930608" y="3295416"/>
+            <a:off x="9570681" y="4693419"/>
             <a:ext cx="1188707" cy="545058"/>
           </a:xfrm>
           <a:prstGeom prst="rect">
@@ -20550,8 +20550,8 @@
         </p:nvSpPr>
         <p:spPr>
           <a:xfrm>
-            <a:off x="8930609" y="4282983"/>
-            <a:ext cx="1188707" cy="545058"/>
+            <a:off x="6202082" y="4642939"/>
+            <a:ext cx="914400" cy="681046"/>
           </a:xfrm>
           <a:prstGeom prst="rect">
             <a:avLst/>
@@ -20580,19 +20580,566 @@
             <a:pPr algn="ctr"/>
             <a:r>
               <a:rPr lang="en-US" sz="1000" dirty="0"/>
-              <a:t>Record with </a:t>
-            </a:r>
-            <a:r>
-              <a:rPr lang="en-US" sz="1000" dirty="0" err="1"/>
-              <a:t>mId</a:t>
-            </a:r>
+              <a:t>Text – Add/Update</a:t>
+            </a:r>
+          </a:p>
+          <a:p>
+            <a:pPr algn="ctr"/>
             <a:r>
               <a:rPr lang="en-US" sz="1000" dirty="0"/>
-              <a:t> = 0 will be added</a:t>
-            </a:r>
-          </a:p>
-        </p:txBody>
-      </p:sp>
+              <a:t>Record</a:t>
+            </a:r>
+          </a:p>
+        </p:txBody>
+      </p:sp>
+      <p:sp>
+        <p:nvSpPr>
+          <p:cNvPr id="15" name="Rectangle 14">
+            <a:extLst>
+              <a:ext uri="{FF2B5EF4-FFF2-40B4-BE49-F238E27FC236}">
+                <a16:creationId xmlns:a16="http://schemas.microsoft.com/office/drawing/2014/main" id="{AC50FDE1-61E7-CB73-4A98-9ADD55EE39AA}"/>
+              </a:ext>
+            </a:extLst>
+          </p:cNvPr>
+          <p:cNvSpPr/>
+          <p:nvPr/>
+        </p:nvSpPr>
+        <p:spPr>
+          <a:xfrm>
+            <a:off x="6910700" y="2133195"/>
+            <a:ext cx="1188707" cy="457195"/>
+          </a:xfrm>
+          <a:prstGeom prst="rect">
+            <a:avLst/>
+          </a:prstGeom>
+        </p:spPr>
+        <p:style>
+          <a:lnRef idx="2">
+            <a:schemeClr val="accent1">
+              <a:shade val="15000"/>
+            </a:schemeClr>
+          </a:lnRef>
+          <a:fillRef idx="1">
+            <a:schemeClr val="accent1"/>
+          </a:fillRef>
+          <a:effectRef idx="0">
+            <a:schemeClr val="accent1"/>
+          </a:effectRef>
+          <a:fontRef idx="minor">
+            <a:schemeClr val="lt1"/>
+          </a:fontRef>
+        </p:style>
+        <p:txBody>
+          <a:bodyPr rtlCol="0" anchor="ctr"/>
+          <a:lstStyle/>
+          <a:p>
+            <a:pPr algn="ctr"/>
+            <a:r>
+              <a:rPr lang="en-US" sz="1200" dirty="0"/>
+              <a:t>No Records</a:t>
+            </a:r>
+          </a:p>
+          <a:p>
+            <a:pPr algn="ctr"/>
+            <a:r>
+              <a:rPr lang="en-US" sz="1200" dirty="0"/>
+              <a:t>Add one</a:t>
+            </a:r>
+          </a:p>
+        </p:txBody>
+      </p:sp>
+      <p:cxnSp>
+        <p:nvCxnSpPr>
+          <p:cNvPr id="17" name="Connector: Elbow 16">
+            <a:extLst>
+              <a:ext uri="{FF2B5EF4-FFF2-40B4-BE49-F238E27FC236}">
+                <a16:creationId xmlns:a16="http://schemas.microsoft.com/office/drawing/2014/main" id="{2795A77D-572A-9F38-DF83-2EA28DDC95E4}"/>
+              </a:ext>
+            </a:extLst>
+          </p:cNvPr>
+          <p:cNvCxnSpPr>
+            <a:cxnSpLocks/>
+            <a:stCxn id="6" idx="3"/>
+            <a:endCxn id="15" idx="0"/>
+          </p:cNvCxnSpPr>
+          <p:nvPr/>
+        </p:nvCxnSpPr>
+        <p:spPr>
+          <a:xfrm>
+            <a:off x="6412989" y="1891841"/>
+            <a:ext cx="1092065" cy="241354"/>
+          </a:xfrm>
+          <a:prstGeom prst="bentConnector2">
+            <a:avLst/>
+          </a:prstGeom>
+          <a:ln>
+            <a:tailEnd type="triangle"/>
+          </a:ln>
+        </p:spPr>
+        <p:style>
+          <a:lnRef idx="2">
+            <a:schemeClr val="accent1"/>
+          </a:lnRef>
+          <a:fillRef idx="0">
+            <a:schemeClr val="accent1"/>
+          </a:fillRef>
+          <a:effectRef idx="1">
+            <a:schemeClr val="accent1"/>
+          </a:effectRef>
+          <a:fontRef idx="minor">
+            <a:schemeClr val="tx1"/>
+          </a:fontRef>
+        </p:style>
+      </p:cxnSp>
+      <p:cxnSp>
+        <p:nvCxnSpPr>
+          <p:cNvPr id="22" name="Connector: Elbow 21">
+            <a:extLst>
+              <a:ext uri="{FF2B5EF4-FFF2-40B4-BE49-F238E27FC236}">
+                <a16:creationId xmlns:a16="http://schemas.microsoft.com/office/drawing/2014/main" id="{ED5DD44F-01D4-7814-9F20-E1BBAE27F00B}"/>
+              </a:ext>
+            </a:extLst>
+          </p:cNvPr>
+          <p:cNvCxnSpPr>
+            <a:cxnSpLocks/>
+            <a:stCxn id="15" idx="2"/>
+            <a:endCxn id="7" idx="3"/>
+          </p:cNvCxnSpPr>
+          <p:nvPr/>
+        </p:nvCxnSpPr>
+        <p:spPr>
+          <a:xfrm rot="5400000">
+            <a:off x="6899100" y="2104280"/>
+            <a:ext cx="119845" cy="1092065"/>
+          </a:xfrm>
+          <a:prstGeom prst="bentConnector2">
+            <a:avLst/>
+          </a:prstGeom>
+          <a:ln>
+            <a:tailEnd type="triangle"/>
+          </a:ln>
+        </p:spPr>
+        <p:style>
+          <a:lnRef idx="2">
+            <a:schemeClr val="accent1"/>
+          </a:lnRef>
+          <a:fillRef idx="0">
+            <a:schemeClr val="accent1"/>
+          </a:fillRef>
+          <a:effectRef idx="1">
+            <a:schemeClr val="accent1"/>
+          </a:effectRef>
+          <a:fontRef idx="minor">
+            <a:schemeClr val="tx1"/>
+          </a:fontRef>
+        </p:style>
+      </p:cxnSp>
+      <p:sp>
+        <p:nvSpPr>
+          <p:cNvPr id="25" name="Rectangle 24">
+            <a:extLst>
+              <a:ext uri="{FF2B5EF4-FFF2-40B4-BE49-F238E27FC236}">
+                <a16:creationId xmlns:a16="http://schemas.microsoft.com/office/drawing/2014/main" id="{DBBCF389-DAB6-A8B7-6E60-A1BB0352668A}"/>
+              </a:ext>
+            </a:extLst>
+          </p:cNvPr>
+          <p:cNvSpPr/>
+          <p:nvPr/>
+        </p:nvSpPr>
+        <p:spPr>
+          <a:xfrm>
+            <a:off x="7376146" y="3250697"/>
+            <a:ext cx="1188707" cy="457195"/>
+          </a:xfrm>
+          <a:prstGeom prst="rect">
+            <a:avLst/>
+          </a:prstGeom>
+        </p:spPr>
+        <p:style>
+          <a:lnRef idx="2">
+            <a:schemeClr val="accent1">
+              <a:shade val="15000"/>
+            </a:schemeClr>
+          </a:lnRef>
+          <a:fillRef idx="1">
+            <a:schemeClr val="accent1"/>
+          </a:fillRef>
+          <a:effectRef idx="0">
+            <a:schemeClr val="accent1"/>
+          </a:effectRef>
+          <a:fontRef idx="minor">
+            <a:schemeClr val="lt1"/>
+          </a:fontRef>
+        </p:style>
+        <p:txBody>
+          <a:bodyPr rtlCol="0" anchor="ctr"/>
+          <a:lstStyle/>
+          <a:p>
+            <a:pPr algn="ctr"/>
+            <a:r>
+              <a:rPr lang="en-US" sz="1200" dirty="0"/>
+              <a:t>Display</a:t>
+            </a:r>
+          </a:p>
+          <a:p>
+            <a:pPr algn="ctr"/>
+            <a:r>
+              <a:rPr lang="en-US" sz="1200" dirty="0"/>
+              <a:t>Record Dialog</a:t>
+            </a:r>
+          </a:p>
+        </p:txBody>
+      </p:sp>
+      <p:cxnSp>
+        <p:nvCxnSpPr>
+          <p:cNvPr id="27" name="Connector: Elbow 26">
+            <a:extLst>
+              <a:ext uri="{FF2B5EF4-FFF2-40B4-BE49-F238E27FC236}">
+                <a16:creationId xmlns:a16="http://schemas.microsoft.com/office/drawing/2014/main" id="{E5EBE8B3-77B1-CCCF-EA7E-28C69D93CA53}"/>
+              </a:ext>
+            </a:extLst>
+          </p:cNvPr>
+          <p:cNvCxnSpPr>
+            <a:cxnSpLocks/>
+            <a:stCxn id="8" idx="3"/>
+            <a:endCxn id="25" idx="1"/>
+          </p:cNvCxnSpPr>
+          <p:nvPr/>
+        </p:nvCxnSpPr>
+        <p:spPr>
+          <a:xfrm flipV="1">
+            <a:off x="6416040" y="3479295"/>
+            <a:ext cx="960106" cy="4566"/>
+          </a:xfrm>
+          <a:prstGeom prst="bentConnector3">
+            <a:avLst>
+              <a:gd name="adj1" fmla="val 50000"/>
+            </a:avLst>
+          </a:prstGeom>
+          <a:ln>
+            <a:tailEnd type="triangle"/>
+          </a:ln>
+        </p:spPr>
+        <p:style>
+          <a:lnRef idx="2">
+            <a:schemeClr val="accent1"/>
+          </a:lnRef>
+          <a:fillRef idx="0">
+            <a:schemeClr val="accent1"/>
+          </a:fillRef>
+          <a:effectRef idx="1">
+            <a:schemeClr val="accent1"/>
+          </a:effectRef>
+          <a:fontRef idx="minor">
+            <a:schemeClr val="tx1"/>
+          </a:fontRef>
+        </p:style>
+      </p:cxnSp>
+      <p:cxnSp>
+        <p:nvCxnSpPr>
+          <p:cNvPr id="33" name="Straight Arrow Connector 32">
+            <a:extLst>
+              <a:ext uri="{FF2B5EF4-FFF2-40B4-BE49-F238E27FC236}">
+                <a16:creationId xmlns:a16="http://schemas.microsoft.com/office/drawing/2014/main" id="{D3044149-2A3C-CDAB-9B41-DF2AE52E6B96}"/>
+              </a:ext>
+            </a:extLst>
+          </p:cNvPr>
+          <p:cNvCxnSpPr>
+            <a:cxnSpLocks/>
+            <a:stCxn id="6" idx="2"/>
+            <a:endCxn id="7" idx="0"/>
+          </p:cNvCxnSpPr>
+          <p:nvPr/>
+        </p:nvCxnSpPr>
+        <p:spPr>
+          <a:xfrm>
+            <a:off x="5818636" y="2120438"/>
+            <a:ext cx="0" cy="361199"/>
+          </a:xfrm>
+          <a:prstGeom prst="straightConnector1">
+            <a:avLst/>
+          </a:prstGeom>
+          <a:ln>
+            <a:tailEnd type="triangle"/>
+          </a:ln>
+        </p:spPr>
+        <p:style>
+          <a:lnRef idx="2">
+            <a:schemeClr val="accent1"/>
+          </a:lnRef>
+          <a:fillRef idx="0">
+            <a:schemeClr val="accent1"/>
+          </a:fillRef>
+          <a:effectRef idx="1">
+            <a:schemeClr val="accent1"/>
+          </a:effectRef>
+          <a:fontRef idx="minor">
+            <a:schemeClr val="tx1"/>
+          </a:fontRef>
+        </p:style>
+      </p:cxnSp>
+      <p:cxnSp>
+        <p:nvCxnSpPr>
+          <p:cNvPr id="37" name="Straight Arrow Connector 36">
+            <a:extLst>
+              <a:ext uri="{FF2B5EF4-FFF2-40B4-BE49-F238E27FC236}">
+                <a16:creationId xmlns:a16="http://schemas.microsoft.com/office/drawing/2014/main" id="{4593A49E-0AAC-7FB1-69A4-910DDE867F0D}"/>
+              </a:ext>
+            </a:extLst>
+          </p:cNvPr>
+          <p:cNvCxnSpPr>
+            <a:cxnSpLocks/>
+            <a:stCxn id="25" idx="2"/>
+            <a:endCxn id="9" idx="0"/>
+          </p:cNvCxnSpPr>
+          <p:nvPr/>
+        </p:nvCxnSpPr>
+        <p:spPr>
+          <a:xfrm flipH="1">
+            <a:off x="7970499" y="3707892"/>
+            <a:ext cx="1" cy="361180"/>
+          </a:xfrm>
+          <a:prstGeom prst="straightConnector1">
+            <a:avLst/>
+          </a:prstGeom>
+          <a:ln>
+            <a:tailEnd type="triangle"/>
+          </a:ln>
+        </p:spPr>
+        <p:style>
+          <a:lnRef idx="2">
+            <a:schemeClr val="accent1"/>
+          </a:lnRef>
+          <a:fillRef idx="0">
+            <a:schemeClr val="accent1"/>
+          </a:fillRef>
+          <a:effectRef idx="1">
+            <a:schemeClr val="accent1"/>
+          </a:effectRef>
+          <a:fontRef idx="minor">
+            <a:schemeClr val="tx1"/>
+          </a:fontRef>
+        </p:style>
+      </p:cxnSp>
+      <p:cxnSp>
+        <p:nvCxnSpPr>
+          <p:cNvPr id="41" name="Straight Arrow Connector 40">
+            <a:extLst>
+              <a:ext uri="{FF2B5EF4-FFF2-40B4-BE49-F238E27FC236}">
+                <a16:creationId xmlns:a16="http://schemas.microsoft.com/office/drawing/2014/main" id="{2A885F2D-6370-BAC3-22A6-D82D1318775B}"/>
+              </a:ext>
+            </a:extLst>
+          </p:cNvPr>
+          <p:cNvCxnSpPr>
+            <a:cxnSpLocks/>
+            <a:stCxn id="10" idx="3"/>
+            <a:endCxn id="13" idx="1"/>
+          </p:cNvCxnSpPr>
+          <p:nvPr/>
+        </p:nvCxnSpPr>
+        <p:spPr>
+          <a:xfrm flipV="1">
+            <a:off x="8359116" y="4965948"/>
+            <a:ext cx="1211565" cy="17514"/>
+          </a:xfrm>
+          <a:prstGeom prst="straightConnector1">
+            <a:avLst/>
+          </a:prstGeom>
+          <a:ln>
+            <a:tailEnd type="triangle"/>
+          </a:ln>
+        </p:spPr>
+        <p:style>
+          <a:lnRef idx="2">
+            <a:schemeClr val="accent1"/>
+          </a:lnRef>
+          <a:fillRef idx="0">
+            <a:schemeClr val="accent1"/>
+          </a:fillRef>
+          <a:effectRef idx="1">
+            <a:schemeClr val="accent1"/>
+          </a:effectRef>
+          <a:fontRef idx="minor">
+            <a:schemeClr val="tx1"/>
+          </a:fontRef>
+        </p:style>
+      </p:cxnSp>
+      <p:cxnSp>
+        <p:nvCxnSpPr>
+          <p:cNvPr id="45" name="Connector: Elbow 44">
+            <a:extLst>
+              <a:ext uri="{FF2B5EF4-FFF2-40B4-BE49-F238E27FC236}">
+                <a16:creationId xmlns:a16="http://schemas.microsoft.com/office/drawing/2014/main" id="{D5E2A5CF-7EB8-6ABD-9C02-859E27255649}"/>
+              </a:ext>
+            </a:extLst>
+          </p:cNvPr>
+          <p:cNvCxnSpPr>
+            <a:cxnSpLocks/>
+            <a:stCxn id="13" idx="2"/>
+            <a:endCxn id="8" idx="2"/>
+          </p:cNvCxnSpPr>
+          <p:nvPr/>
+        </p:nvCxnSpPr>
+        <p:spPr>
+          <a:xfrm rot="5400000" flipH="1">
+            <a:off x="7230351" y="2303794"/>
+            <a:ext cx="1526019" cy="4343348"/>
+          </a:xfrm>
+          <a:prstGeom prst="bentConnector3">
+            <a:avLst>
+              <a:gd name="adj1" fmla="val -58722"/>
+            </a:avLst>
+          </a:prstGeom>
+          <a:ln>
+            <a:tailEnd type="triangle"/>
+          </a:ln>
+        </p:spPr>
+        <p:style>
+          <a:lnRef idx="2">
+            <a:schemeClr val="accent1"/>
+          </a:lnRef>
+          <a:fillRef idx="0">
+            <a:schemeClr val="accent1"/>
+          </a:fillRef>
+          <a:effectRef idx="1">
+            <a:schemeClr val="accent1"/>
+          </a:effectRef>
+          <a:fontRef idx="minor">
+            <a:schemeClr val="tx1"/>
+          </a:fontRef>
+        </p:style>
+      </p:cxnSp>
+      <p:cxnSp>
+        <p:nvCxnSpPr>
+          <p:cNvPr id="55" name="Connector: Elbow 54">
+            <a:extLst>
+              <a:ext uri="{FF2B5EF4-FFF2-40B4-BE49-F238E27FC236}">
+                <a16:creationId xmlns:a16="http://schemas.microsoft.com/office/drawing/2014/main" id="{60265634-7FF7-F187-A8F1-F8DC86A77347}"/>
+              </a:ext>
+            </a:extLst>
+          </p:cNvPr>
+          <p:cNvCxnSpPr>
+            <a:cxnSpLocks/>
+            <a:stCxn id="10" idx="1"/>
+            <a:endCxn id="14" idx="3"/>
+          </p:cNvCxnSpPr>
+          <p:nvPr/>
+        </p:nvCxnSpPr>
+        <p:spPr>
+          <a:xfrm rot="10800000">
+            <a:off x="7116482" y="4983462"/>
+            <a:ext cx="511122" cy="12700"/>
+          </a:xfrm>
+          <a:prstGeom prst="bentConnector3">
+            <a:avLst>
+              <a:gd name="adj1" fmla="val 50000"/>
+            </a:avLst>
+          </a:prstGeom>
+          <a:ln>
+            <a:tailEnd type="triangle"/>
+          </a:ln>
+        </p:spPr>
+        <p:style>
+          <a:lnRef idx="2">
+            <a:schemeClr val="accent1"/>
+          </a:lnRef>
+          <a:fillRef idx="0">
+            <a:schemeClr val="accent1"/>
+          </a:fillRef>
+          <a:effectRef idx="1">
+            <a:schemeClr val="accent1"/>
+          </a:effectRef>
+          <a:fontRef idx="minor">
+            <a:schemeClr val="tx1"/>
+          </a:fontRef>
+        </p:style>
+      </p:cxnSp>
+      <p:cxnSp>
+        <p:nvCxnSpPr>
+          <p:cNvPr id="60" name="Straight Arrow Connector 59">
+            <a:extLst>
+              <a:ext uri="{FF2B5EF4-FFF2-40B4-BE49-F238E27FC236}">
+                <a16:creationId xmlns:a16="http://schemas.microsoft.com/office/drawing/2014/main" id="{21F88942-61BD-2A29-5C2E-E6AFD6FD9AF7}"/>
+              </a:ext>
+            </a:extLst>
+          </p:cNvPr>
+          <p:cNvCxnSpPr>
+            <a:cxnSpLocks/>
+            <a:stCxn id="7" idx="2"/>
+            <a:endCxn id="8" idx="0"/>
+          </p:cNvCxnSpPr>
+          <p:nvPr/>
+        </p:nvCxnSpPr>
+        <p:spPr>
+          <a:xfrm>
+            <a:off x="5818636" y="2938832"/>
+            <a:ext cx="3051" cy="316431"/>
+          </a:xfrm>
+          <a:prstGeom prst="straightConnector1">
+            <a:avLst/>
+          </a:prstGeom>
+          <a:ln>
+            <a:tailEnd type="triangle"/>
+          </a:ln>
+        </p:spPr>
+        <p:style>
+          <a:lnRef idx="2">
+            <a:schemeClr val="accent1"/>
+          </a:lnRef>
+          <a:fillRef idx="0">
+            <a:schemeClr val="accent1"/>
+          </a:fillRef>
+          <a:effectRef idx="1">
+            <a:schemeClr val="accent1"/>
+          </a:effectRef>
+          <a:fontRef idx="minor">
+            <a:schemeClr val="tx1"/>
+          </a:fontRef>
+        </p:style>
+      </p:cxnSp>
+      <p:cxnSp>
+        <p:nvCxnSpPr>
+          <p:cNvPr id="64" name="Connector: Elbow 63">
+            <a:extLst>
+              <a:ext uri="{FF2B5EF4-FFF2-40B4-BE49-F238E27FC236}">
+                <a16:creationId xmlns:a16="http://schemas.microsoft.com/office/drawing/2014/main" id="{943020BB-C123-F9E8-10AF-A1E1C07EA462}"/>
+              </a:ext>
+            </a:extLst>
+          </p:cNvPr>
+          <p:cNvCxnSpPr>
+            <a:cxnSpLocks/>
+            <a:stCxn id="7" idx="1"/>
+            <a:endCxn id="11" idx="0"/>
+          </p:cNvCxnSpPr>
+          <p:nvPr/>
+        </p:nvCxnSpPr>
+        <p:spPr>
+          <a:xfrm rot="10800000" flipV="1">
+            <a:off x="4693984" y="2710234"/>
+            <a:ext cx="530299" cy="2004293"/>
+          </a:xfrm>
+          <a:prstGeom prst="bentConnector2">
+            <a:avLst/>
+          </a:prstGeom>
+          <a:ln>
+            <a:tailEnd type="triangle"/>
+          </a:ln>
+        </p:spPr>
+        <p:style>
+          <a:lnRef idx="2">
+            <a:schemeClr val="accent1"/>
+          </a:lnRef>
+          <a:fillRef idx="0">
+            <a:schemeClr val="accent1"/>
+          </a:fillRef>
+          <a:effectRef idx="1">
+            <a:schemeClr val="accent1"/>
+          </a:effectRef>
+          <a:fontRef idx="minor">
+            <a:schemeClr val="tx1"/>
+          </a:fontRef>
+        </p:style>
+      </p:cxnSp>
     </p:spTree>
     <p:extLst>
       <p:ext uri="{BB962C8B-B14F-4D97-AF65-F5344CB8AC3E}">

</xml_diff>